<commit_message>
update avance escritura euler
</commit_message>
<xml_diff>
--- a/Escritura_Plantilla Modificada/imagenes/planteamiento_del_problema/Presentación1.pptx
+++ b/Escritura_Plantilla Modificada/imagenes/planteamiento_del_problema/Presentación1.pptx
@@ -8,7 +8,8 @@
     <p:sldId id="256" r:id="rId2"/>
     <p:sldId id="257" r:id="rId3"/>
     <p:sldId id="259" r:id="rId4"/>
-    <p:sldId id="258" r:id="rId5"/>
+    <p:sldId id="260" r:id="rId5"/>
+    <p:sldId id="258" r:id="rId6"/>
   </p:sldIdLst>
   <p:sldSz cx="12192000" cy="6858000"/>
   <p:notesSz cx="6858000" cy="9144000"/>
@@ -107,6 +108,11 @@
       </a:defRPr>
     </a:lvl9pPr>
   </p:defaultTextStyle>
+  <p:extLst>
+    <p:ext uri="{EFAFB233-063F-42B5-8137-9DF3F51BA10A}">
+      <p15:sldGuideLst xmlns:p15="http://schemas.microsoft.com/office/powerpoint/2012/main"/>
+    </p:ext>
+  </p:extLst>
 </p:presentation>
 </file>
 
@@ -259,7 +265,7 @@
           <a:p>
             <a:fld id="{07BB1A35-2394-4C34-9134-7D1FC92D3E74}" type="datetimeFigureOut">
               <a:rPr lang="en-US" smtClean="0"/>
-              <a:t>10/4/2023</a:t>
+              <a:t>10/5/2023</a:t>
             </a:fld>
             <a:endParaRPr lang="en-US"/>
           </a:p>
@@ -459,7 +465,7 @@
           <a:p>
             <a:fld id="{07BB1A35-2394-4C34-9134-7D1FC92D3E74}" type="datetimeFigureOut">
               <a:rPr lang="en-US" smtClean="0"/>
-              <a:t>10/4/2023</a:t>
+              <a:t>10/5/2023</a:t>
             </a:fld>
             <a:endParaRPr lang="en-US"/>
           </a:p>
@@ -669,7 +675,7 @@
           <a:p>
             <a:fld id="{07BB1A35-2394-4C34-9134-7D1FC92D3E74}" type="datetimeFigureOut">
               <a:rPr lang="en-US" smtClean="0"/>
-              <a:t>10/4/2023</a:t>
+              <a:t>10/5/2023</a:t>
             </a:fld>
             <a:endParaRPr lang="en-US"/>
           </a:p>
@@ -869,7 +875,7 @@
           <a:p>
             <a:fld id="{07BB1A35-2394-4C34-9134-7D1FC92D3E74}" type="datetimeFigureOut">
               <a:rPr lang="en-US" smtClean="0"/>
-              <a:t>10/4/2023</a:t>
+              <a:t>10/5/2023</a:t>
             </a:fld>
             <a:endParaRPr lang="en-US"/>
           </a:p>
@@ -1145,7 +1151,7 @@
           <a:p>
             <a:fld id="{07BB1A35-2394-4C34-9134-7D1FC92D3E74}" type="datetimeFigureOut">
               <a:rPr lang="en-US" smtClean="0"/>
-              <a:t>10/4/2023</a:t>
+              <a:t>10/5/2023</a:t>
             </a:fld>
             <a:endParaRPr lang="en-US"/>
           </a:p>
@@ -1413,7 +1419,7 @@
           <a:p>
             <a:fld id="{07BB1A35-2394-4C34-9134-7D1FC92D3E74}" type="datetimeFigureOut">
               <a:rPr lang="en-US" smtClean="0"/>
-              <a:t>10/4/2023</a:t>
+              <a:t>10/5/2023</a:t>
             </a:fld>
             <a:endParaRPr lang="en-US"/>
           </a:p>
@@ -1828,7 +1834,7 @@
           <a:p>
             <a:fld id="{07BB1A35-2394-4C34-9134-7D1FC92D3E74}" type="datetimeFigureOut">
               <a:rPr lang="en-US" smtClean="0"/>
-              <a:t>10/4/2023</a:t>
+              <a:t>10/5/2023</a:t>
             </a:fld>
             <a:endParaRPr lang="en-US"/>
           </a:p>
@@ -1970,7 +1976,7 @@
           <a:p>
             <a:fld id="{07BB1A35-2394-4C34-9134-7D1FC92D3E74}" type="datetimeFigureOut">
               <a:rPr lang="en-US" smtClean="0"/>
-              <a:t>10/4/2023</a:t>
+              <a:t>10/5/2023</a:t>
             </a:fld>
             <a:endParaRPr lang="en-US"/>
           </a:p>
@@ -2083,7 +2089,7 @@
           <a:p>
             <a:fld id="{07BB1A35-2394-4C34-9134-7D1FC92D3E74}" type="datetimeFigureOut">
               <a:rPr lang="en-US" smtClean="0"/>
-              <a:t>10/4/2023</a:t>
+              <a:t>10/5/2023</a:t>
             </a:fld>
             <a:endParaRPr lang="en-US"/>
           </a:p>
@@ -2396,7 +2402,7 @@
           <a:p>
             <a:fld id="{07BB1A35-2394-4C34-9134-7D1FC92D3E74}" type="datetimeFigureOut">
               <a:rPr lang="en-US" smtClean="0"/>
-              <a:t>10/4/2023</a:t>
+              <a:t>10/5/2023</a:t>
             </a:fld>
             <a:endParaRPr lang="en-US"/>
           </a:p>
@@ -2685,7 +2691,7 @@
           <a:p>
             <a:fld id="{07BB1A35-2394-4C34-9134-7D1FC92D3E74}" type="datetimeFigureOut">
               <a:rPr lang="en-US" smtClean="0"/>
-              <a:t>10/4/2023</a:t>
+              <a:t>10/5/2023</a:t>
             </a:fld>
             <a:endParaRPr lang="en-US"/>
           </a:p>
@@ -2928,7 +2934,7 @@
           <a:p>
             <a:fld id="{07BB1A35-2394-4C34-9134-7D1FC92D3E74}" type="datetimeFigureOut">
               <a:rPr lang="en-US" smtClean="0"/>
-              <a:t>10/4/2023</a:t>
+              <a:t>10/5/2023</a:t>
             </a:fld>
             <a:endParaRPr lang="en-US"/>
           </a:p>
@@ -3684,8 +3690,8 @@
           </a:fontRef>
         </p:style>
       </p:cxnSp>
-      <mc:AlternateContent xmlns:mc="http://schemas.openxmlformats.org/markup-compatibility/2006">
-        <mc:Choice xmlns:a14="http://schemas.microsoft.com/office/drawing/2010/main" Requires="a14">
+      <mc:AlternateContent xmlns:mc="http://schemas.openxmlformats.org/markup-compatibility/2006" xmlns:a14="http://schemas.microsoft.com/office/drawing/2010/main">
+        <mc:Choice Requires="a14">
           <p:sp>
             <p:nvSpPr>
               <p:cNvPr id="16" name="CuadroTexto 15">
@@ -3714,6 +3720,7 @@
               </a:bodyPr>
               <a:lstStyle/>
               <a:p>
+                <a:pPr/>
                 <a14:m>
                   <m:oMathPara xmlns:m="http://schemas.openxmlformats.org/officeDocument/2006/math">
                     <m:oMathParaPr>
@@ -3765,7 +3772,7 @@
             </p:txBody>
           </p:sp>
         </mc:Choice>
-        <mc:Fallback>
+        <mc:Fallback xmlns="">
           <p:sp>
             <p:nvSpPr>
               <p:cNvPr id="16" name="CuadroTexto 15">
@@ -3810,8 +3817,8 @@
           </p:sp>
         </mc:Fallback>
       </mc:AlternateContent>
-      <mc:AlternateContent xmlns:mc="http://schemas.openxmlformats.org/markup-compatibility/2006">
-        <mc:Choice xmlns:a14="http://schemas.microsoft.com/office/drawing/2010/main" Requires="a14">
+      <mc:AlternateContent xmlns:mc="http://schemas.openxmlformats.org/markup-compatibility/2006" xmlns:a14="http://schemas.microsoft.com/office/drawing/2010/main">
+        <mc:Choice Requires="a14">
           <p:sp>
             <p:nvSpPr>
               <p:cNvPr id="19" name="CuadroTexto 18">
@@ -3840,6 +3847,7 @@
               </a:bodyPr>
               <a:lstStyle/>
               <a:p>
+                <a:pPr/>
                 <a14:m>
                   <m:oMathPara xmlns:m="http://schemas.openxmlformats.org/officeDocument/2006/math">
                     <m:oMathParaPr>
@@ -3891,7 +3899,7 @@
             </p:txBody>
           </p:sp>
         </mc:Choice>
-        <mc:Fallback>
+        <mc:Fallback xmlns="">
           <p:sp>
             <p:nvSpPr>
               <p:cNvPr id="19" name="CuadroTexto 18">
@@ -3936,8 +3944,8 @@
           </p:sp>
         </mc:Fallback>
       </mc:AlternateContent>
-      <mc:AlternateContent xmlns:mc="http://schemas.openxmlformats.org/markup-compatibility/2006">
-        <mc:Choice xmlns:a14="http://schemas.microsoft.com/office/drawing/2010/main" Requires="a14">
+      <mc:AlternateContent xmlns:mc="http://schemas.openxmlformats.org/markup-compatibility/2006" xmlns:a14="http://schemas.microsoft.com/office/drawing/2010/main">
+        <mc:Choice Requires="a14">
           <p:sp>
             <p:nvSpPr>
               <p:cNvPr id="20" name="CuadroTexto 19">
@@ -3966,6 +3974,7 @@
               </a:bodyPr>
               <a:lstStyle/>
               <a:p>
+                <a:pPr/>
                 <a14:m>
                   <m:oMathPara xmlns:m="http://schemas.openxmlformats.org/officeDocument/2006/math">
                     <m:oMathParaPr>
@@ -4017,7 +4026,7 @@
             </p:txBody>
           </p:sp>
         </mc:Choice>
-        <mc:Fallback>
+        <mc:Fallback xmlns="">
           <p:sp>
             <p:nvSpPr>
               <p:cNvPr id="20" name="CuadroTexto 19">
@@ -4168,8 +4177,8 @@
           </a:p>
         </p:txBody>
       </p:sp>
-      <mc:AlternateContent xmlns:mc="http://schemas.openxmlformats.org/markup-compatibility/2006">
-        <mc:Choice xmlns:a14="http://schemas.microsoft.com/office/drawing/2010/main" Requires="a14">
+      <mc:AlternateContent xmlns:mc="http://schemas.openxmlformats.org/markup-compatibility/2006" xmlns:a14="http://schemas.microsoft.com/office/drawing/2010/main">
+        <mc:Choice Requires="a14">
           <p:sp>
             <p:nvSpPr>
               <p:cNvPr id="23" name="CuadroTexto 22">
@@ -4198,6 +4207,7 @@
               </a:bodyPr>
               <a:lstStyle/>
               <a:p>
+                <a:pPr/>
                 <a14:m>
                   <m:oMathPara xmlns:m="http://schemas.openxmlformats.org/officeDocument/2006/math">
                     <m:oMathParaPr>
@@ -4279,7 +4289,7 @@
             </p:txBody>
           </p:sp>
         </mc:Choice>
-        <mc:Fallback>
+        <mc:Fallback xmlns="">
           <p:sp>
             <p:nvSpPr>
               <p:cNvPr id="23" name="CuadroTexto 22">
@@ -4324,8 +4334,8 @@
           </p:sp>
         </mc:Fallback>
       </mc:AlternateContent>
-      <mc:AlternateContent xmlns:mc="http://schemas.openxmlformats.org/markup-compatibility/2006">
-        <mc:Choice xmlns:a14="http://schemas.microsoft.com/office/drawing/2010/main" Requires="a14">
+      <mc:AlternateContent xmlns:mc="http://schemas.openxmlformats.org/markup-compatibility/2006" xmlns:a14="http://schemas.microsoft.com/office/drawing/2010/main">
+        <mc:Choice Requires="a14">
           <p:sp>
             <p:nvSpPr>
               <p:cNvPr id="24" name="CuadroTexto 23">
@@ -4354,6 +4364,7 @@
               </a:bodyPr>
               <a:lstStyle/>
               <a:p>
+                <a:pPr/>
                 <a14:m>
                   <m:oMathPara xmlns:m="http://schemas.openxmlformats.org/officeDocument/2006/math">
                     <m:oMathParaPr>
@@ -4377,7 +4388,7 @@
             </p:txBody>
           </p:sp>
         </mc:Choice>
-        <mc:Fallback>
+        <mc:Fallback xmlns="">
           <p:sp>
             <p:nvSpPr>
               <p:cNvPr id="24" name="CuadroTexto 23">
@@ -4516,8 +4527,8 @@
           </a:fontRef>
         </p:style>
       </p:cxnSp>
-      <mc:AlternateContent xmlns:mc="http://schemas.openxmlformats.org/markup-compatibility/2006">
-        <mc:Choice xmlns:a14="http://schemas.microsoft.com/office/drawing/2010/main" Requires="a14">
+      <mc:AlternateContent xmlns:mc="http://schemas.openxmlformats.org/markup-compatibility/2006" xmlns:a14="http://schemas.microsoft.com/office/drawing/2010/main">
+        <mc:Choice Requires="a14">
           <p:sp>
             <p:nvSpPr>
               <p:cNvPr id="1028" name="CuadroTexto 1027">
@@ -4546,6 +4557,7 @@
               </a:bodyPr>
               <a:lstStyle/>
               <a:p>
+                <a:pPr/>
                 <a14:m>
                   <m:oMathPara xmlns:m="http://schemas.openxmlformats.org/officeDocument/2006/math">
                     <m:oMathParaPr>
@@ -4639,7 +4651,7 @@
             </p:txBody>
           </p:sp>
         </mc:Choice>
-        <mc:Fallback>
+        <mc:Fallback xmlns="">
           <p:sp>
             <p:nvSpPr>
               <p:cNvPr id="1028" name="CuadroTexto 1027">
@@ -5240,8 +5252,8 @@
           </a:fontRef>
         </p:style>
       </p:cxnSp>
-      <mc:AlternateContent xmlns:mc="http://schemas.openxmlformats.org/markup-compatibility/2006">
-        <mc:Choice xmlns:a14="http://schemas.microsoft.com/office/drawing/2010/main" Requires="a14">
+      <mc:AlternateContent xmlns:mc="http://schemas.openxmlformats.org/markup-compatibility/2006" xmlns:a14="http://schemas.microsoft.com/office/drawing/2010/main">
+        <mc:Choice Requires="a14">
           <p:sp>
             <p:nvSpPr>
               <p:cNvPr id="16" name="CuadroTexto 15">
@@ -5270,6 +5282,7 @@
               </a:bodyPr>
               <a:lstStyle/>
               <a:p>
+                <a:pPr/>
                 <a14:m>
                   <m:oMathPara xmlns:m="http://schemas.openxmlformats.org/officeDocument/2006/math">
                     <m:oMathParaPr>
@@ -5321,7 +5334,7 @@
             </p:txBody>
           </p:sp>
         </mc:Choice>
-        <mc:Fallback>
+        <mc:Fallback xmlns="">
           <p:sp>
             <p:nvSpPr>
               <p:cNvPr id="16" name="CuadroTexto 15">
@@ -5366,8 +5379,8 @@
           </p:sp>
         </mc:Fallback>
       </mc:AlternateContent>
-      <mc:AlternateContent xmlns:mc="http://schemas.openxmlformats.org/markup-compatibility/2006">
-        <mc:Choice xmlns:a14="http://schemas.microsoft.com/office/drawing/2010/main" Requires="a14">
+      <mc:AlternateContent xmlns:mc="http://schemas.openxmlformats.org/markup-compatibility/2006" xmlns:a14="http://schemas.microsoft.com/office/drawing/2010/main">
+        <mc:Choice Requires="a14">
           <p:sp>
             <p:nvSpPr>
               <p:cNvPr id="19" name="CuadroTexto 18">
@@ -5396,6 +5409,7 @@
               </a:bodyPr>
               <a:lstStyle/>
               <a:p>
+                <a:pPr/>
                 <a14:m>
                   <m:oMathPara xmlns:m="http://schemas.openxmlformats.org/officeDocument/2006/math">
                     <m:oMathParaPr>
@@ -5447,7 +5461,7 @@
             </p:txBody>
           </p:sp>
         </mc:Choice>
-        <mc:Fallback>
+        <mc:Fallback xmlns="">
           <p:sp>
             <p:nvSpPr>
               <p:cNvPr id="19" name="CuadroTexto 18">
@@ -5492,8 +5506,8 @@
           </p:sp>
         </mc:Fallback>
       </mc:AlternateContent>
-      <mc:AlternateContent xmlns:mc="http://schemas.openxmlformats.org/markup-compatibility/2006">
-        <mc:Choice xmlns:a14="http://schemas.microsoft.com/office/drawing/2010/main" Requires="a14">
+      <mc:AlternateContent xmlns:mc="http://schemas.openxmlformats.org/markup-compatibility/2006" xmlns:a14="http://schemas.microsoft.com/office/drawing/2010/main">
+        <mc:Choice Requires="a14">
           <p:sp>
             <p:nvSpPr>
               <p:cNvPr id="20" name="CuadroTexto 19">
@@ -5522,6 +5536,7 @@
               </a:bodyPr>
               <a:lstStyle/>
               <a:p>
+                <a:pPr/>
                 <a14:m>
                   <m:oMathPara xmlns:m="http://schemas.openxmlformats.org/officeDocument/2006/math">
                     <m:oMathParaPr>
@@ -5573,7 +5588,7 @@
             </p:txBody>
           </p:sp>
         </mc:Choice>
-        <mc:Fallback>
+        <mc:Fallback xmlns="">
           <p:sp>
             <p:nvSpPr>
               <p:cNvPr id="20" name="CuadroTexto 19">
@@ -5818,8 +5833,8 @@
           </a:fontRef>
         </p:style>
       </p:cxnSp>
-      <mc:AlternateContent xmlns:mc="http://schemas.openxmlformats.org/markup-compatibility/2006">
-        <mc:Choice xmlns:a14="http://schemas.microsoft.com/office/drawing/2010/main" Requires="a14">
+      <mc:AlternateContent xmlns:mc="http://schemas.openxmlformats.org/markup-compatibility/2006" xmlns:a14="http://schemas.microsoft.com/office/drawing/2010/main">
+        <mc:Choice Requires="a14">
           <p:sp>
             <p:nvSpPr>
               <p:cNvPr id="1028" name="CuadroTexto 1027">
@@ -5848,6 +5863,7 @@
               </a:bodyPr>
               <a:lstStyle/>
               <a:p>
+                <a:pPr/>
                 <a14:m>
                   <m:oMathPara xmlns:m="http://schemas.openxmlformats.org/officeDocument/2006/math">
                     <m:oMathParaPr>
@@ -5941,7 +5957,7 @@
             </p:txBody>
           </p:sp>
         </mc:Choice>
-        <mc:Fallback>
+        <mc:Fallback xmlns="">
           <p:sp>
             <p:nvSpPr>
               <p:cNvPr id="1028" name="CuadroTexto 1027">
@@ -7958,8 +7974,8 @@
           </a:p>
         </p:txBody>
       </p:sp>
-      <mc:AlternateContent xmlns:mc="http://schemas.openxmlformats.org/markup-compatibility/2006">
-        <mc:Choice xmlns:a14="http://schemas.microsoft.com/office/drawing/2010/main" Requires="a14">
+      <mc:AlternateContent xmlns:mc="http://schemas.openxmlformats.org/markup-compatibility/2006" xmlns:a14="http://schemas.microsoft.com/office/drawing/2010/main">
+        <mc:Choice Requires="a14">
           <p:sp>
             <p:nvSpPr>
               <p:cNvPr id="2053" name="CuadroTexto 2052">
@@ -7988,6 +8004,7 @@
               </a:bodyPr>
               <a:lstStyle/>
               <a:p>
+                <a:pPr/>
                 <a14:m>
                   <m:oMathPara xmlns:m="http://schemas.openxmlformats.org/officeDocument/2006/math">
                     <m:oMathParaPr>
@@ -8078,7 +8095,7 @@
             </p:txBody>
           </p:sp>
         </mc:Choice>
-        <mc:Fallback>
+        <mc:Fallback xmlns="">
           <p:sp>
             <p:nvSpPr>
               <p:cNvPr id="2053" name="CuadroTexto 2052">
@@ -8123,8 +8140,8 @@
           </p:sp>
         </mc:Fallback>
       </mc:AlternateContent>
-      <mc:AlternateContent xmlns:mc="http://schemas.openxmlformats.org/markup-compatibility/2006">
-        <mc:Choice xmlns:a14="http://schemas.microsoft.com/office/drawing/2010/main" Requires="a14">
+      <mc:AlternateContent xmlns:mc="http://schemas.openxmlformats.org/markup-compatibility/2006" xmlns:a14="http://schemas.microsoft.com/office/drawing/2010/main">
+        <mc:Choice Requires="a14">
           <p:sp>
             <p:nvSpPr>
               <p:cNvPr id="2054" name="CuadroTexto 2053">
@@ -8153,6 +8170,7 @@
               </a:bodyPr>
               <a:lstStyle/>
               <a:p>
+                <a:pPr/>
                 <a14:m>
                   <m:oMathPara xmlns:m="http://schemas.openxmlformats.org/officeDocument/2006/math">
                     <m:oMathParaPr>
@@ -8185,7 +8203,7 @@
             </p:txBody>
           </p:sp>
         </mc:Choice>
-        <mc:Fallback>
+        <mc:Fallback xmlns="">
           <p:sp>
             <p:nvSpPr>
               <p:cNvPr id="2054" name="CuadroTexto 2053">
@@ -8786,8 +8804,8 @@
           </a:fontRef>
         </p:style>
       </p:cxnSp>
-      <mc:AlternateContent xmlns:mc="http://schemas.openxmlformats.org/markup-compatibility/2006">
-        <mc:Choice xmlns:a14="http://schemas.microsoft.com/office/drawing/2010/main" Requires="a14">
+      <mc:AlternateContent xmlns:mc="http://schemas.openxmlformats.org/markup-compatibility/2006" xmlns:a14="http://schemas.microsoft.com/office/drawing/2010/main">
+        <mc:Choice Requires="a14">
           <p:sp>
             <p:nvSpPr>
               <p:cNvPr id="16" name="CuadroTexto 15">
@@ -8816,6 +8834,7 @@
               </a:bodyPr>
               <a:lstStyle/>
               <a:p>
+                <a:pPr/>
                 <a14:m>
                   <m:oMathPara xmlns:m="http://schemas.openxmlformats.org/officeDocument/2006/math">
                     <m:oMathParaPr>
@@ -8867,7 +8886,7 @@
             </p:txBody>
           </p:sp>
         </mc:Choice>
-        <mc:Fallback>
+        <mc:Fallback xmlns="">
           <p:sp>
             <p:nvSpPr>
               <p:cNvPr id="16" name="CuadroTexto 15">
@@ -8912,8 +8931,8 @@
           </p:sp>
         </mc:Fallback>
       </mc:AlternateContent>
-      <mc:AlternateContent xmlns:mc="http://schemas.openxmlformats.org/markup-compatibility/2006">
-        <mc:Choice xmlns:a14="http://schemas.microsoft.com/office/drawing/2010/main" Requires="a14">
+      <mc:AlternateContent xmlns:mc="http://schemas.openxmlformats.org/markup-compatibility/2006" xmlns:a14="http://schemas.microsoft.com/office/drawing/2010/main">
+        <mc:Choice Requires="a14">
           <p:sp>
             <p:nvSpPr>
               <p:cNvPr id="19" name="CuadroTexto 18">
@@ -8942,6 +8961,7 @@
               </a:bodyPr>
               <a:lstStyle/>
               <a:p>
+                <a:pPr/>
                 <a14:m>
                   <m:oMathPara xmlns:m="http://schemas.openxmlformats.org/officeDocument/2006/math">
                     <m:oMathParaPr>
@@ -8993,7 +9013,7 @@
             </p:txBody>
           </p:sp>
         </mc:Choice>
-        <mc:Fallback>
+        <mc:Fallback xmlns="">
           <p:sp>
             <p:nvSpPr>
               <p:cNvPr id="19" name="CuadroTexto 18">
@@ -9038,8 +9058,8 @@
           </p:sp>
         </mc:Fallback>
       </mc:AlternateContent>
-      <mc:AlternateContent xmlns:mc="http://schemas.openxmlformats.org/markup-compatibility/2006">
-        <mc:Choice xmlns:a14="http://schemas.microsoft.com/office/drawing/2010/main" Requires="a14">
+      <mc:AlternateContent xmlns:mc="http://schemas.openxmlformats.org/markup-compatibility/2006" xmlns:a14="http://schemas.microsoft.com/office/drawing/2010/main">
+        <mc:Choice Requires="a14">
           <p:sp>
             <p:nvSpPr>
               <p:cNvPr id="20" name="CuadroTexto 19">
@@ -9068,6 +9088,7 @@
               </a:bodyPr>
               <a:lstStyle/>
               <a:p>
+                <a:pPr/>
                 <a14:m>
                   <m:oMathPara xmlns:m="http://schemas.openxmlformats.org/officeDocument/2006/math">
                     <m:oMathParaPr>
@@ -9119,7 +9140,7 @@
             </p:txBody>
           </p:sp>
         </mc:Choice>
-        <mc:Fallback>
+        <mc:Fallback xmlns="">
           <p:sp>
             <p:nvSpPr>
               <p:cNvPr id="20" name="CuadroTexto 19">
@@ -9364,8 +9385,8 @@
           </a:fontRef>
         </p:style>
       </p:cxnSp>
-      <mc:AlternateContent xmlns:mc="http://schemas.openxmlformats.org/markup-compatibility/2006">
-        <mc:Choice xmlns:a14="http://schemas.microsoft.com/office/drawing/2010/main" Requires="a14">
+      <mc:AlternateContent xmlns:mc="http://schemas.openxmlformats.org/markup-compatibility/2006" xmlns:a14="http://schemas.microsoft.com/office/drawing/2010/main">
+        <mc:Choice Requires="a14">
           <p:sp>
             <p:nvSpPr>
               <p:cNvPr id="1028" name="CuadroTexto 1027">
@@ -9394,6 +9415,7 @@
               </a:bodyPr>
               <a:lstStyle/>
               <a:p>
+                <a:pPr/>
                 <a14:m>
                   <m:oMathPara xmlns:m="http://schemas.openxmlformats.org/officeDocument/2006/math">
                     <m:oMathParaPr>
@@ -9487,7 +9509,7 @@
             </p:txBody>
           </p:sp>
         </mc:Choice>
-        <mc:Fallback>
+        <mc:Fallback xmlns="">
           <p:sp>
             <p:nvSpPr>
               <p:cNvPr id="1028" name="CuadroTexto 1027">
@@ -11412,8 +11434,8 @@
           </a:p>
         </p:txBody>
       </p:sp>
-      <mc:AlternateContent xmlns:mc="http://schemas.openxmlformats.org/markup-compatibility/2006">
-        <mc:Choice xmlns:a14="http://schemas.microsoft.com/office/drawing/2010/main" Requires="a14">
+      <mc:AlternateContent xmlns:mc="http://schemas.openxmlformats.org/markup-compatibility/2006" xmlns:a14="http://schemas.microsoft.com/office/drawing/2010/main">
+        <mc:Choice Requires="a14">
           <p:sp>
             <p:nvSpPr>
               <p:cNvPr id="2053" name="CuadroTexto 2052">
@@ -11442,6 +11464,7 @@
               </a:bodyPr>
               <a:lstStyle/>
               <a:p>
+                <a:pPr/>
                 <a14:m>
                   <m:oMathPara xmlns:m="http://schemas.openxmlformats.org/officeDocument/2006/math">
                     <m:oMathParaPr>
@@ -11532,7 +11555,7 @@
             </p:txBody>
           </p:sp>
         </mc:Choice>
-        <mc:Fallback>
+        <mc:Fallback xmlns="">
           <p:sp>
             <p:nvSpPr>
               <p:cNvPr id="2053" name="CuadroTexto 2052">
@@ -11577,8 +11600,8 @@
           </p:sp>
         </mc:Fallback>
       </mc:AlternateContent>
-      <mc:AlternateContent xmlns:mc="http://schemas.openxmlformats.org/markup-compatibility/2006">
-        <mc:Choice xmlns:a14="http://schemas.microsoft.com/office/drawing/2010/main" Requires="a14">
+      <mc:AlternateContent xmlns:mc="http://schemas.openxmlformats.org/markup-compatibility/2006" xmlns:a14="http://schemas.microsoft.com/office/drawing/2010/main">
+        <mc:Choice Requires="a14">
           <p:sp>
             <p:nvSpPr>
               <p:cNvPr id="2054" name="CuadroTexto 2053">
@@ -11607,6 +11630,7 @@
               </a:bodyPr>
               <a:lstStyle/>
               <a:p>
+                <a:pPr/>
                 <a14:m>
                   <m:oMathPara xmlns:m="http://schemas.openxmlformats.org/officeDocument/2006/math">
                     <m:oMathParaPr>
@@ -11639,7 +11663,7 @@
             </p:txBody>
           </p:sp>
         </mc:Choice>
-        <mc:Fallback>
+        <mc:Fallback xmlns="">
           <p:sp>
             <p:nvSpPr>
               <p:cNvPr id="2054" name="CuadroTexto 2053">
@@ -11808,10 +11832,10 @@
       </p:grpSpPr>
       <p:pic>
         <p:nvPicPr>
-          <p:cNvPr id="6" name="Imagen 5" descr="Diagrama&#10;&#10;Descripción generada automáticamente">
-            <a:extLst>
-              <a:ext uri="{FF2B5EF4-FFF2-40B4-BE49-F238E27FC236}">
-                <a16:creationId xmlns:a16="http://schemas.microsoft.com/office/drawing/2014/main" id="{81C894FB-E9FE-E400-CAA7-0F44E46425BA}"/>
+          <p:cNvPr id="2052" name="Imagen 2051" descr="Diagrama&#10;&#10;Descripción generada automáticamente">
+            <a:extLst>
+              <a:ext uri="{FF2B5EF4-FFF2-40B4-BE49-F238E27FC236}">
+                <a16:creationId xmlns:a16="http://schemas.microsoft.com/office/drawing/2014/main" id="{E11F0229-3B3A-499F-98A6-77611EFA5AC1}"/>
               </a:ext>
             </a:extLst>
           </p:cNvPr>
@@ -11851,7 +11875,7 @@
         </p:blipFill>
         <p:spPr>
           <a:xfrm>
-            <a:off x="2528991" y="1890515"/>
+            <a:off x="2534480" y="1906727"/>
             <a:ext cx="2781069" cy="2078617"/>
           </a:xfrm>
           <a:prstGeom prst="rect">
@@ -12138,59 +12162,53 @@
           </a:p>
         </p:txBody>
       </p:sp>
-      <p:sp>
-        <p:nvSpPr>
-          <p:cNvPr id="7" name="Elipse 6">
-            <a:extLst>
-              <a:ext uri="{FF2B5EF4-FFF2-40B4-BE49-F238E27FC236}">
-                <a16:creationId xmlns:a16="http://schemas.microsoft.com/office/drawing/2014/main" id="{8FA0D014-51AB-758E-5E67-C0FAC7AEF4DD}"/>
-              </a:ext>
-            </a:extLst>
-          </p:cNvPr>
-          <p:cNvSpPr/>
-          <p:nvPr/>
-        </p:nvSpPr>
-        <p:spPr>
-          <a:xfrm rot="19923087">
-            <a:off x="3301690" y="1286094"/>
-            <a:ext cx="6097462" cy="4048424"/>
-          </a:xfrm>
-          <a:prstGeom prst="ellipse">
-            <a:avLst/>
-          </a:prstGeom>
-          <a:noFill/>
-          <a:ln w="38100">
+      <p:cxnSp>
+        <p:nvCxnSpPr>
+          <p:cNvPr id="9" name="Conector recto 8">
+            <a:extLst>
+              <a:ext uri="{FF2B5EF4-FFF2-40B4-BE49-F238E27FC236}">
+                <a16:creationId xmlns:a16="http://schemas.microsoft.com/office/drawing/2014/main" id="{E7F06EBB-EDE2-8FC7-99DE-96415522C893}"/>
+              </a:ext>
+            </a:extLst>
+          </p:cNvPr>
+          <p:cNvCxnSpPr>
+            <a:cxnSpLocks/>
+          </p:cNvCxnSpPr>
+          <p:nvPr/>
+        </p:nvCxnSpPr>
+        <p:spPr>
+          <a:xfrm flipH="1" flipV="1">
+            <a:off x="3905450" y="1310396"/>
+            <a:ext cx="7621" cy="1555745"/>
+          </a:xfrm>
+          <a:prstGeom prst="line">
+            <a:avLst/>
+          </a:prstGeom>
+          <a:ln w="57150" cap="flat" cmpd="sng" algn="ctr">
             <a:solidFill>
-              <a:schemeClr val="tx1"/>
+              <a:schemeClr val="accent1"/>
             </a:solidFill>
-            <a:prstDash val="dash"/>
+            <a:prstDash val="solid"/>
+            <a:round/>
+            <a:headEnd type="none" w="med" len="med"/>
+            <a:tailEnd type="arrow" w="med" len="med"/>
           </a:ln>
         </p:spPr>
         <p:style>
-          <a:lnRef idx="2">
-            <a:schemeClr val="accent1">
-              <a:shade val="15000"/>
-            </a:schemeClr>
+          <a:lnRef idx="0">
+            <a:scrgbClr r="0" g="0" b="0"/>
           </a:lnRef>
-          <a:fillRef idx="1">
-            <a:schemeClr val="accent1"/>
+          <a:fillRef idx="0">
+            <a:scrgbClr r="0" g="0" b="0"/>
           </a:fillRef>
           <a:effectRef idx="0">
-            <a:schemeClr val="accent1"/>
+            <a:scrgbClr r="0" g="0" b="0"/>
           </a:effectRef>
           <a:fontRef idx="minor">
-            <a:schemeClr val="lt1"/>
+            <a:schemeClr val="tx1"/>
           </a:fontRef>
         </p:style>
-        <p:txBody>
-          <a:bodyPr rtlCol="0" anchor="ctr"/>
-          <a:lstStyle/>
-          <a:p>
-            <a:pPr algn="ctr"/>
-            <a:endParaRPr lang="en-US"/>
-          </a:p>
-        </p:txBody>
-      </p:sp>
+      </p:cxnSp>
       <p:cxnSp>
         <p:nvCxnSpPr>
           <p:cNvPr id="10" name="Conector recto 9">
@@ -12207,8 +12225,8 @@
         </p:nvCxnSpPr>
         <p:spPr>
           <a:xfrm flipH="1">
-            <a:off x="2640054" y="2874480"/>
-            <a:ext cx="1271645" cy="637549"/>
+            <a:off x="2438488" y="2844115"/>
+            <a:ext cx="1474781" cy="584885"/>
           </a:xfrm>
           <a:prstGeom prst="line">
             <a:avLst/>
@@ -12254,8 +12272,8 @@
         </p:nvCxnSpPr>
         <p:spPr>
           <a:xfrm>
-            <a:off x="3894059" y="2893586"/>
-            <a:ext cx="1423891" cy="610820"/>
+            <a:off x="3921965" y="2852278"/>
+            <a:ext cx="1404737" cy="602603"/>
           </a:xfrm>
           <a:prstGeom prst="line">
             <a:avLst/>
@@ -12301,7 +12319,7 @@
             </p:nvSpPr>
             <p:spPr>
               <a:xfrm>
-                <a:off x="5297914" y="3556920"/>
+                <a:off x="5249103" y="2987074"/>
                 <a:ext cx="448456" cy="288797"/>
               </a:xfrm>
               <a:prstGeom prst="rect">
@@ -12315,6 +12333,7 @@
               </a:bodyPr>
               <a:lstStyle/>
               <a:p>
+                <a:pPr/>
                 <a14:m>
                   <m:oMathPara xmlns:m="http://schemas.openxmlformats.org/officeDocument/2006/math">
                     <m:oMathParaPr>
@@ -12383,7 +12402,7 @@
             </p:nvSpPr>
             <p:spPr>
               <a:xfrm>
-                <a:off x="5297914" y="3556920"/>
+                <a:off x="5249103" y="2987074"/>
                 <a:ext cx="448456" cy="288797"/>
               </a:xfrm>
               <a:prstGeom prst="rect">
@@ -12392,7 +12411,7 @@
               <a:blipFill>
                 <a:blip r:embed="rId4"/>
                 <a:stretch>
-                  <a:fillRect l="-10811" t="-8333" r="-10811" b="-6250"/>
+                  <a:fillRect l="-10811" t="-8511" r="-10811" b="-8511"/>
                 </a:stretch>
               </a:blipFill>
             </p:spPr>
@@ -12427,7 +12446,7 @@
             </p:nvSpPr>
             <p:spPr>
               <a:xfrm>
-                <a:off x="2266334" y="3491522"/>
+                <a:off x="2257869" y="2996933"/>
                 <a:ext cx="459485" cy="288797"/>
               </a:xfrm>
               <a:prstGeom prst="rect">
@@ -12441,6 +12460,7 @@
               </a:bodyPr>
               <a:lstStyle/>
               <a:p>
+                <a:pPr/>
                 <a14:m>
                   <m:oMathPara xmlns:m="http://schemas.openxmlformats.org/officeDocument/2006/math">
                     <m:oMathParaPr>
@@ -12509,7 +12529,7 @@
             </p:nvSpPr>
             <p:spPr>
               <a:xfrm>
-                <a:off x="2266334" y="3491522"/>
+                <a:off x="2257869" y="2996933"/>
                 <a:ext cx="459485" cy="288797"/>
               </a:xfrm>
               <a:prstGeom prst="rect">
@@ -12518,7 +12538,7 @@
               <a:blipFill>
                 <a:blip r:embed="rId5"/>
                 <a:stretch>
-                  <a:fillRect l="-12000" t="-8511" r="-10667" b="-6383"/>
+                  <a:fillRect l="-10526" t="-8511" r="-10526" b="-6383"/>
                 </a:stretch>
               </a:blipFill>
             </p:spPr>
@@ -12537,8 +12557,8 @@
           </p:sp>
         </mc:Fallback>
       </mc:AlternateContent>
-      <mc:AlternateContent xmlns:mc="http://schemas.openxmlformats.org/markup-compatibility/2006">
-        <mc:Choice xmlns:a14="http://schemas.microsoft.com/office/drawing/2010/main" Requires="a14">
+      <mc:AlternateContent xmlns:mc="http://schemas.openxmlformats.org/markup-compatibility/2006" xmlns:a14="http://schemas.microsoft.com/office/drawing/2010/main">
+        <mc:Choice Requires="a14">
           <p:sp>
             <p:nvSpPr>
               <p:cNvPr id="20" name="CuadroTexto 19">
@@ -12553,7 +12573,7 @@
             </p:nvSpPr>
             <p:spPr>
               <a:xfrm>
-                <a:off x="4031967" y="1326608"/>
+                <a:off x="4052049" y="1301926"/>
                 <a:ext cx="445250" cy="288797"/>
               </a:xfrm>
               <a:prstGeom prst="rect">
@@ -12567,6 +12587,7 @@
               </a:bodyPr>
               <a:lstStyle/>
               <a:p>
+                <a:pPr/>
                 <a14:m>
                   <m:oMathPara xmlns:m="http://schemas.openxmlformats.org/officeDocument/2006/math">
                     <m:oMathParaPr>
@@ -12618,7 +12639,7 @@
             </p:txBody>
           </p:sp>
         </mc:Choice>
-        <mc:Fallback>
+        <mc:Fallback xmlns="">
           <p:sp>
             <p:nvSpPr>
               <p:cNvPr id="20" name="CuadroTexto 19">
@@ -12635,7 +12656,7 @@
             </p:nvSpPr>
             <p:spPr>
               <a:xfrm>
-                <a:off x="4031967" y="1326608"/>
+                <a:off x="4052049" y="1301926"/>
                 <a:ext cx="445250" cy="288797"/>
               </a:xfrm>
               <a:prstGeom prst="rect">
@@ -12644,7 +12665,7 @@
               <a:blipFill>
                 <a:blip r:embed="rId6"/>
                 <a:stretch>
-                  <a:fillRect l="-10959" t="-8511" r="-10959" b="-6383"/>
+                  <a:fillRect l="-12329" t="-8511" r="-9589" b="-6383"/>
                 </a:stretch>
               </a:blipFill>
             </p:spPr>
@@ -12663,480 +12684,8 @@
           </p:sp>
         </mc:Fallback>
       </mc:AlternateContent>
-      <p:sp>
-        <p:nvSpPr>
-          <p:cNvPr id="21" name="Rectángulo 20">
-            <a:extLst>
-              <a:ext uri="{FF2B5EF4-FFF2-40B4-BE49-F238E27FC236}">
-                <a16:creationId xmlns:a16="http://schemas.microsoft.com/office/drawing/2014/main" id="{FAD1BB8D-5B8A-FB59-9255-7F476F222D65}"/>
-              </a:ext>
-            </a:extLst>
-          </p:cNvPr>
-          <p:cNvSpPr/>
-          <p:nvPr/>
-        </p:nvSpPr>
-        <p:spPr>
-          <a:xfrm>
-            <a:off x="3576638" y="2614613"/>
-            <a:ext cx="762000" cy="385762"/>
-          </a:xfrm>
-          <a:prstGeom prst="rect">
-            <a:avLst/>
-          </a:prstGeom>
-          <a:noFill/>
-          <a:ln w="19050">
-            <a:solidFill>
-              <a:srgbClr val="FF0000"/>
-            </a:solidFill>
-            <a:prstDash val="lgDash"/>
-          </a:ln>
-        </p:spPr>
-        <p:style>
-          <a:lnRef idx="2">
-            <a:schemeClr val="accent1">
-              <a:shade val="15000"/>
-            </a:schemeClr>
-          </a:lnRef>
-          <a:fillRef idx="1">
-            <a:schemeClr val="accent1"/>
-          </a:fillRef>
-          <a:effectRef idx="0">
-            <a:schemeClr val="accent1"/>
-          </a:effectRef>
-          <a:fontRef idx="minor">
-            <a:schemeClr val="lt1"/>
-          </a:fontRef>
-        </p:style>
-        <p:txBody>
-          <a:bodyPr rtlCol="0" anchor="ctr"/>
-          <a:lstStyle/>
-          <a:p>
-            <a:pPr algn="ctr"/>
-            <a:endParaRPr lang="en-US"/>
-          </a:p>
-        </p:txBody>
-      </p:sp>
-      <p:sp>
-        <p:nvSpPr>
-          <p:cNvPr id="22" name="Rectángulo 21">
-            <a:extLst>
-              <a:ext uri="{FF2B5EF4-FFF2-40B4-BE49-F238E27FC236}">
-                <a16:creationId xmlns:a16="http://schemas.microsoft.com/office/drawing/2014/main" id="{9CD95D21-5694-F587-4051-F5009511B577}"/>
-              </a:ext>
-            </a:extLst>
-          </p:cNvPr>
-          <p:cNvSpPr/>
-          <p:nvPr/>
-        </p:nvSpPr>
-        <p:spPr>
-          <a:xfrm>
-            <a:off x="3242524" y="3262778"/>
-            <a:ext cx="762000" cy="385762"/>
-          </a:xfrm>
-          <a:prstGeom prst="rect">
-            <a:avLst/>
-          </a:prstGeom>
-          <a:noFill/>
-          <a:ln w="19050">
-            <a:solidFill>
-              <a:srgbClr val="FF0000"/>
-            </a:solidFill>
-            <a:prstDash val="lgDash"/>
-          </a:ln>
-        </p:spPr>
-        <p:style>
-          <a:lnRef idx="2">
-            <a:schemeClr val="accent1">
-              <a:shade val="15000"/>
-            </a:schemeClr>
-          </a:lnRef>
-          <a:fillRef idx="1">
-            <a:schemeClr val="accent1"/>
-          </a:fillRef>
-          <a:effectRef idx="0">
-            <a:schemeClr val="accent1"/>
-          </a:effectRef>
-          <a:fontRef idx="minor">
-            <a:schemeClr val="lt1"/>
-          </a:fontRef>
-        </p:style>
-        <p:txBody>
-          <a:bodyPr rtlCol="0" anchor="ctr"/>
-          <a:lstStyle/>
-          <a:p>
-            <a:pPr algn="ctr"/>
-            <a:endParaRPr lang="en-US"/>
-          </a:p>
-        </p:txBody>
-      </p:sp>
-      <mc:AlternateContent xmlns:mc="http://schemas.openxmlformats.org/markup-compatibility/2006">
-        <mc:Choice xmlns:a14="http://schemas.microsoft.com/office/drawing/2010/main" Requires="a14">
-          <p:sp>
-            <p:nvSpPr>
-              <p:cNvPr id="23" name="CuadroTexto 22">
-                <a:extLst>
-                  <a:ext uri="{FF2B5EF4-FFF2-40B4-BE49-F238E27FC236}">
-                    <a16:creationId xmlns:a16="http://schemas.microsoft.com/office/drawing/2014/main" id="{14BF393F-7011-5BDF-FFDC-8C3DFA989FB0}"/>
-                  </a:ext>
-                </a:extLst>
-              </p:cNvPr>
-              <p:cNvSpPr txBox="1"/>
-              <p:nvPr/>
-            </p:nvSpPr>
-            <p:spPr>
-              <a:xfrm>
-                <a:off x="2046668" y="1877404"/>
-                <a:ext cx="1816395" cy="215444"/>
-              </a:xfrm>
-              <a:prstGeom prst="rect">
-                <a:avLst/>
-              </a:prstGeom>
-              <a:noFill/>
-            </p:spPr>
-            <p:txBody>
-              <a:bodyPr wrap="none" lIns="0" tIns="0" rIns="0" bIns="0" rtlCol="0">
-                <a:spAutoFit/>
-              </a:bodyPr>
-              <a:lstStyle/>
-              <a:p>
-                <a14:m>
-                  <m:oMathPara xmlns:m="http://schemas.openxmlformats.org/officeDocument/2006/math">
-                    <m:oMathParaPr>
-                      <m:jc m:val="centerGroup"/>
-                    </m:oMathParaPr>
-                    <m:oMath xmlns:m="http://schemas.openxmlformats.org/officeDocument/2006/math">
-                      <m:r>
-                        <a:rPr lang="es-ES" sz="1400" b="0" i="1" smtClean="0">
-                          <a:solidFill>
-                            <a:srgbClr val="FF0000"/>
-                          </a:solidFill>
-                          <a:latin typeface="Cambria Math" panose="02040503050406030204" pitchFamily="18" charset="0"/>
-                        </a:rPr>
-                        <m:t>𝑅𝑢𝑒𝑑𝑎</m:t>
-                      </m:r>
-                      <m:r>
-                        <a:rPr lang="es-ES" sz="1400" b="0" i="1" smtClean="0">
-                          <a:solidFill>
-                            <a:srgbClr val="FF0000"/>
-                          </a:solidFill>
-                          <a:latin typeface="Cambria Math" panose="02040503050406030204" pitchFamily="18" charset="0"/>
-                        </a:rPr>
-                        <m:t> </m:t>
-                      </m:r>
-                      <m:r>
-                        <a:rPr lang="es-ES" sz="1400" b="0" i="1" smtClean="0">
-                          <a:solidFill>
-                            <a:srgbClr val="FF0000"/>
-                          </a:solidFill>
-                          <a:latin typeface="Cambria Math" panose="02040503050406030204" pitchFamily="18" charset="0"/>
-                        </a:rPr>
-                        <m:t>𝑑𝑒</m:t>
-                      </m:r>
-                      <m:r>
-                        <a:rPr lang="es-ES" sz="1400" b="0" i="1" smtClean="0">
-                          <a:solidFill>
-                            <a:srgbClr val="FF0000"/>
-                          </a:solidFill>
-                          <a:latin typeface="Cambria Math" panose="02040503050406030204" pitchFamily="18" charset="0"/>
-                        </a:rPr>
-                        <m:t> </m:t>
-                      </m:r>
-                      <m:r>
-                        <a:rPr lang="es-ES" sz="1400" b="0" i="1" smtClean="0">
-                          <a:solidFill>
-                            <a:srgbClr val="FF0000"/>
-                          </a:solidFill>
-                          <a:latin typeface="Cambria Math" panose="02040503050406030204" pitchFamily="18" charset="0"/>
-                        </a:rPr>
-                        <m:t>𝑟𝑒𝑎𝑐𝑐𝑖</m:t>
-                      </m:r>
-                      <m:r>
-                        <a:rPr lang="es-ES" sz="1400" b="0" i="1" smtClean="0">
-                          <a:solidFill>
-                            <a:srgbClr val="FF0000"/>
-                          </a:solidFill>
-                          <a:latin typeface="Cambria Math" panose="02040503050406030204" pitchFamily="18" charset="0"/>
-                        </a:rPr>
-                        <m:t>ó</m:t>
-                      </m:r>
-                      <m:r>
-                        <a:rPr lang="es-ES" sz="1400" b="0" i="1" smtClean="0">
-                          <a:solidFill>
-                            <a:srgbClr val="FF0000"/>
-                          </a:solidFill>
-                          <a:latin typeface="Cambria Math" panose="02040503050406030204" pitchFamily="18" charset="0"/>
-                        </a:rPr>
-                        <m:t>𝑛</m:t>
-                      </m:r>
-                      <m:r>
-                        <a:rPr lang="es-ES" sz="1400" b="0" i="1" smtClean="0">
-                          <a:solidFill>
-                            <a:srgbClr val="FF0000"/>
-                          </a:solidFill>
-                          <a:latin typeface="Cambria Math" panose="02040503050406030204" pitchFamily="18" charset="0"/>
-                        </a:rPr>
-                        <m:t> (1)</m:t>
-                      </m:r>
-                    </m:oMath>
-                  </m:oMathPara>
-                </a14:m>
-                <a:endParaRPr lang="en-US" sz="1400" dirty="0">
-                  <a:solidFill>
-                    <a:srgbClr val="FF0000"/>
-                  </a:solidFill>
-                </a:endParaRPr>
-              </a:p>
-            </p:txBody>
-          </p:sp>
-        </mc:Choice>
-        <mc:Fallback>
-          <p:sp>
-            <p:nvSpPr>
-              <p:cNvPr id="23" name="CuadroTexto 22">
-                <a:extLst>
-                  <a:ext uri="{FF2B5EF4-FFF2-40B4-BE49-F238E27FC236}">
-                    <a16:creationId xmlns:a16="http://schemas.microsoft.com/office/drawing/2014/main" id="{14BF393F-7011-5BDF-FFDC-8C3DFA989FB0}"/>
-                  </a:ext>
-                </a:extLst>
-              </p:cNvPr>
-              <p:cNvSpPr txBox="1">
-                <a:spLocks noRot="1" noChangeAspect="1" noMove="1" noResize="1" noEditPoints="1" noAdjustHandles="1" noChangeArrowheads="1" noChangeShapeType="1" noTextEdit="1"/>
-              </p:cNvSpPr>
-              <p:nvPr/>
-            </p:nvSpPr>
-            <p:spPr>
-              <a:xfrm>
-                <a:off x="2046668" y="1877404"/>
-                <a:ext cx="1816395" cy="215444"/>
-              </a:xfrm>
-              <a:prstGeom prst="rect">
-                <a:avLst/>
-              </a:prstGeom>
-              <a:blipFill>
-                <a:blip r:embed="rId7"/>
-                <a:stretch>
-                  <a:fillRect l="-2013" r="-2685" b="-31429"/>
-                </a:stretch>
-              </a:blipFill>
-            </p:spPr>
-            <p:txBody>
-              <a:bodyPr/>
-              <a:lstStyle/>
-              <a:p>
-                <a:r>
-                  <a:rPr lang="en-US">
-                    <a:noFill/>
-                  </a:rPr>
-                  <a:t> </a:t>
-                </a:r>
-              </a:p>
-            </p:txBody>
-          </p:sp>
-        </mc:Fallback>
-      </mc:AlternateContent>
-      <mc:AlternateContent xmlns:mc="http://schemas.openxmlformats.org/markup-compatibility/2006">
-        <mc:Choice xmlns:a14="http://schemas.microsoft.com/office/drawing/2010/main" Requires="a14">
-          <p:sp>
-            <p:nvSpPr>
-              <p:cNvPr id="24" name="CuadroTexto 23">
-                <a:extLst>
-                  <a:ext uri="{FF2B5EF4-FFF2-40B4-BE49-F238E27FC236}">
-                    <a16:creationId xmlns:a16="http://schemas.microsoft.com/office/drawing/2014/main" id="{CFE74190-D059-9E9D-8220-D1F1CBAF3301}"/>
-                  </a:ext>
-                </a:extLst>
-              </p:cNvPr>
-              <p:cNvSpPr txBox="1"/>
-              <p:nvPr/>
-            </p:nvSpPr>
-            <p:spPr>
-              <a:xfrm>
-                <a:off x="3727669" y="4109295"/>
-                <a:ext cx="1593833" cy="215444"/>
-              </a:xfrm>
-              <a:prstGeom prst="rect">
-                <a:avLst/>
-              </a:prstGeom>
-              <a:noFill/>
-            </p:spPr>
-            <p:txBody>
-              <a:bodyPr wrap="none" lIns="0" tIns="0" rIns="0" bIns="0" rtlCol="0">
-                <a:spAutoFit/>
-              </a:bodyPr>
-              <a:lstStyle/>
-              <a:p>
-                <a14:m>
-                  <m:oMathPara xmlns:m="http://schemas.openxmlformats.org/officeDocument/2006/math">
-                    <m:oMathParaPr>
-                      <m:jc m:val="centerGroup"/>
-                    </m:oMathParaPr>
-                    <m:oMath xmlns:m="http://schemas.openxmlformats.org/officeDocument/2006/math">
-                      <m:r>
-                        <a:rPr lang="es-ES" sz="1400" b="0" i="1" smtClean="0">
-                          <a:solidFill>
-                            <a:srgbClr val="FF0000"/>
-                          </a:solidFill>
-                          <a:latin typeface="Cambria Math" panose="02040503050406030204" pitchFamily="18" charset="0"/>
-                        </a:rPr>
-                        <m:t>𝑀𝑎𝑔𝑛𝑒𝑡𝑜𝑟𝑞𝑢𝑒𝑟𝑠</m:t>
-                      </m:r>
-                      <m:r>
-                        <a:rPr lang="es-ES" sz="1400" b="0" i="1" smtClean="0">
-                          <a:solidFill>
-                            <a:srgbClr val="FF0000"/>
-                          </a:solidFill>
-                          <a:latin typeface="Cambria Math" panose="02040503050406030204" pitchFamily="18" charset="0"/>
-                        </a:rPr>
-                        <m:t> (2)</m:t>
-                      </m:r>
-                    </m:oMath>
-                  </m:oMathPara>
-                </a14:m>
-                <a:endParaRPr lang="en-US" sz="1400" dirty="0"/>
-              </a:p>
-            </p:txBody>
-          </p:sp>
-        </mc:Choice>
-        <mc:Fallback>
-          <p:sp>
-            <p:nvSpPr>
-              <p:cNvPr id="24" name="CuadroTexto 23">
-                <a:extLst>
-                  <a:ext uri="{FF2B5EF4-FFF2-40B4-BE49-F238E27FC236}">
-                    <a16:creationId xmlns:a16="http://schemas.microsoft.com/office/drawing/2014/main" id="{CFE74190-D059-9E9D-8220-D1F1CBAF3301}"/>
-                  </a:ext>
-                </a:extLst>
-              </p:cNvPr>
-              <p:cNvSpPr txBox="1">
-                <a:spLocks noRot="1" noChangeAspect="1" noMove="1" noResize="1" noEditPoints="1" noAdjustHandles="1" noChangeArrowheads="1" noChangeShapeType="1" noTextEdit="1"/>
-              </p:cNvSpPr>
-              <p:nvPr/>
-            </p:nvSpPr>
-            <p:spPr>
-              <a:xfrm>
-                <a:off x="3727669" y="4109295"/>
-                <a:ext cx="1593833" cy="215444"/>
-              </a:xfrm>
-              <a:prstGeom prst="rect">
-                <a:avLst/>
-              </a:prstGeom>
-              <a:blipFill>
-                <a:blip r:embed="rId8"/>
-                <a:stretch>
-                  <a:fillRect l="-3435" r="-3435" b="-34286"/>
-                </a:stretch>
-              </a:blipFill>
-            </p:spPr>
-            <p:txBody>
-              <a:bodyPr/>
-              <a:lstStyle/>
-              <a:p>
-                <a:r>
-                  <a:rPr lang="en-US">
-                    <a:noFill/>
-                  </a:rPr>
-                  <a:t> </a:t>
-                </a:r>
-              </a:p>
-            </p:txBody>
-          </p:sp>
-        </mc:Fallback>
-      </mc:AlternateContent>
-      <p:cxnSp>
-        <p:nvCxnSpPr>
-          <p:cNvPr id="26" name="Conector: curvado 25">
-            <a:extLst>
-              <a:ext uri="{FF2B5EF4-FFF2-40B4-BE49-F238E27FC236}">
-                <a16:creationId xmlns:a16="http://schemas.microsoft.com/office/drawing/2014/main" id="{29E8B0AE-BB75-5F67-EDFB-FC3EBD42DAB2}"/>
-              </a:ext>
-            </a:extLst>
-          </p:cNvPr>
-          <p:cNvCxnSpPr>
-            <a:cxnSpLocks/>
-            <a:stCxn id="23" idx="2"/>
-            <a:endCxn id="21" idx="1"/>
-          </p:cNvCxnSpPr>
-          <p:nvPr/>
-        </p:nvCxnSpPr>
-        <p:spPr>
-          <a:xfrm rot="16200000" flipH="1">
-            <a:off x="2908429" y="2139285"/>
-            <a:ext cx="714646" cy="621772"/>
-          </a:xfrm>
-          <a:prstGeom prst="curvedConnector2">
-            <a:avLst/>
-          </a:prstGeom>
-          <a:ln w="28575">
-            <a:solidFill>
-              <a:srgbClr val="FF0000"/>
-            </a:solidFill>
-            <a:tailEnd type="triangle"/>
-          </a:ln>
-        </p:spPr>
-        <p:style>
-          <a:lnRef idx="1">
-            <a:schemeClr val="accent1"/>
-          </a:lnRef>
-          <a:fillRef idx="0">
-            <a:schemeClr val="accent1"/>
-          </a:fillRef>
-          <a:effectRef idx="0">
-            <a:schemeClr val="accent1"/>
-          </a:effectRef>
-          <a:fontRef idx="minor">
-            <a:schemeClr val="tx1"/>
-          </a:fontRef>
-        </p:style>
-      </p:cxnSp>
-      <p:cxnSp>
-        <p:nvCxnSpPr>
-          <p:cNvPr id="30" name="Conector: curvado 29">
-            <a:extLst>
-              <a:ext uri="{FF2B5EF4-FFF2-40B4-BE49-F238E27FC236}">
-                <a16:creationId xmlns:a16="http://schemas.microsoft.com/office/drawing/2014/main" id="{CD834C55-4E54-1C30-60C1-C768C653979E}"/>
-              </a:ext>
-            </a:extLst>
-          </p:cNvPr>
-          <p:cNvCxnSpPr>
-            <a:cxnSpLocks/>
-            <a:stCxn id="24" idx="0"/>
-            <a:endCxn id="22" idx="2"/>
-          </p:cNvCxnSpPr>
-          <p:nvPr/>
-        </p:nvCxnSpPr>
-        <p:spPr>
-          <a:xfrm rot="16200000" flipV="1">
-            <a:off x="3843678" y="3428387"/>
-            <a:ext cx="460755" cy="901062"/>
-          </a:xfrm>
-          <a:prstGeom prst="curvedConnector3">
-            <a:avLst>
-              <a:gd name="adj1" fmla="val 50000"/>
-            </a:avLst>
-          </a:prstGeom>
-          <a:ln w="28575">
-            <a:solidFill>
-              <a:srgbClr val="FF0000"/>
-            </a:solidFill>
-            <a:tailEnd type="triangle"/>
-          </a:ln>
-        </p:spPr>
-        <p:style>
-          <a:lnRef idx="1">
-            <a:schemeClr val="accent1"/>
-          </a:lnRef>
-          <a:fillRef idx="0">
-            <a:schemeClr val="accent1"/>
-          </a:fillRef>
-          <a:effectRef idx="0">
-            <a:schemeClr val="accent1"/>
-          </a:effectRef>
-          <a:fontRef idx="minor">
-            <a:schemeClr val="tx1"/>
-          </a:fontRef>
-        </p:style>
-      </p:cxnSp>
-      <mc:AlternateContent xmlns:mc="http://schemas.openxmlformats.org/markup-compatibility/2006">
-        <mc:Choice xmlns:a14="http://schemas.microsoft.com/office/drawing/2010/main" Requires="a14">
+      <mc:AlternateContent xmlns:mc="http://schemas.openxmlformats.org/markup-compatibility/2006" xmlns:a14="http://schemas.microsoft.com/office/drawing/2010/main">
+        <mc:Choice Requires="a14">
           <p:sp>
             <p:nvSpPr>
               <p:cNvPr id="1028" name="CuadroTexto 1027">
@@ -13165,6 +12714,7 @@
               </a:bodyPr>
               <a:lstStyle/>
               <a:p>
+                <a:pPr/>
                 <a14:m>
                   <m:oMathPara xmlns:m="http://schemas.openxmlformats.org/officeDocument/2006/math">
                     <m:oMathParaPr>
@@ -13258,7 +12808,3512 @@
             </p:txBody>
           </p:sp>
         </mc:Choice>
-        <mc:Fallback>
+        <mc:Fallback xmlns="">
+          <p:sp>
+            <p:nvSpPr>
+              <p:cNvPr id="1028" name="CuadroTexto 1027">
+                <a:extLst>
+                  <a:ext uri="{FF2B5EF4-FFF2-40B4-BE49-F238E27FC236}">
+                    <a16:creationId xmlns:a16="http://schemas.microsoft.com/office/drawing/2014/main" id="{B91310CE-6326-C735-369B-61614A1AAF1E}"/>
+                  </a:ext>
+                </a:extLst>
+              </p:cNvPr>
+              <p:cNvSpPr txBox="1">
+                <a:spLocks noRot="1" noChangeAspect="1" noMove="1" noResize="1" noEditPoints="1" noAdjustHandles="1" noChangeArrowheads="1" noChangeShapeType="1" noTextEdit="1"/>
+              </p:cNvSpPr>
+              <p:nvPr/>
+            </p:nvSpPr>
+            <p:spPr>
+              <a:xfrm>
+                <a:off x="6441859" y="741080"/>
+                <a:ext cx="2074862" cy="241605"/>
+              </a:xfrm>
+              <a:prstGeom prst="rect">
+                <a:avLst/>
+              </a:prstGeom>
+              <a:blipFill>
+                <a:blip r:embed="rId7"/>
+                <a:stretch>
+                  <a:fillRect l="-1471" r="-294" b="-30769"/>
+                </a:stretch>
+              </a:blipFill>
+            </p:spPr>
+            <p:txBody>
+              <a:bodyPr/>
+              <a:lstStyle/>
+              <a:p>
+                <a:r>
+                  <a:rPr lang="en-US">
+                    <a:noFill/>
+                  </a:rPr>
+                  <a:t> </a:t>
+                </a:r>
+              </a:p>
+            </p:txBody>
+          </p:sp>
+        </mc:Fallback>
+      </mc:AlternateContent>
+      <p:sp>
+        <p:nvSpPr>
+          <p:cNvPr id="1029" name="Elipse 1028">
+            <a:extLst>
+              <a:ext uri="{FF2B5EF4-FFF2-40B4-BE49-F238E27FC236}">
+                <a16:creationId xmlns:a16="http://schemas.microsoft.com/office/drawing/2014/main" id="{970F1127-CB6C-5778-5F8C-6F2BC4931A3F}"/>
+              </a:ext>
+            </a:extLst>
+          </p:cNvPr>
+          <p:cNvSpPr>
+            <a:spLocks/>
+          </p:cNvSpPr>
+          <p:nvPr/>
+        </p:nvSpPr>
+        <p:spPr>
+          <a:xfrm>
+            <a:off x="5802594" y="1456187"/>
+            <a:ext cx="1736481" cy="1871896"/>
+          </a:xfrm>
+          <a:prstGeom prst="ellipse">
+            <a:avLst/>
+          </a:prstGeom>
+          <a:noFill/>
+          <a:ln w="28575">
+            <a:solidFill>
+              <a:srgbClr val="00B050"/>
+            </a:solidFill>
+          </a:ln>
+        </p:spPr>
+        <p:style>
+          <a:lnRef idx="2">
+            <a:schemeClr val="accent1">
+              <a:shade val="15000"/>
+            </a:schemeClr>
+          </a:lnRef>
+          <a:fillRef idx="1">
+            <a:schemeClr val="accent1"/>
+          </a:fillRef>
+          <a:effectRef idx="0">
+            <a:schemeClr val="accent1"/>
+          </a:effectRef>
+          <a:fontRef idx="minor">
+            <a:schemeClr val="lt1"/>
+          </a:fontRef>
+        </p:style>
+        <p:txBody>
+          <a:bodyPr rtlCol="0" anchor="ctr"/>
+          <a:lstStyle/>
+          <a:p>
+            <a:pPr algn="ctr"/>
+            <a:endParaRPr lang="en-US"/>
+          </a:p>
+        </p:txBody>
+      </p:sp>
+      <p:sp>
+        <p:nvSpPr>
+          <p:cNvPr id="1030" name="Triángulo isósceles 1029">
+            <a:extLst>
+              <a:ext uri="{FF2B5EF4-FFF2-40B4-BE49-F238E27FC236}">
+                <a16:creationId xmlns:a16="http://schemas.microsoft.com/office/drawing/2014/main" id="{5759C549-8E04-5F4A-9A3B-C8F33657CCE4}"/>
+              </a:ext>
+            </a:extLst>
+          </p:cNvPr>
+          <p:cNvSpPr>
+            <a:spLocks/>
+          </p:cNvSpPr>
+          <p:nvPr/>
+        </p:nvSpPr>
+        <p:spPr>
+          <a:xfrm rot="314574">
+            <a:off x="5737083" y="2296539"/>
+            <a:ext cx="138857" cy="176150"/>
+          </a:xfrm>
+          <a:prstGeom prst="triangle">
+            <a:avLst/>
+          </a:prstGeom>
+          <a:solidFill>
+            <a:srgbClr val="00B050"/>
+          </a:solidFill>
+          <a:ln>
+            <a:solidFill>
+              <a:srgbClr val="00B050"/>
+            </a:solidFill>
+          </a:ln>
+        </p:spPr>
+        <p:style>
+          <a:lnRef idx="2">
+            <a:schemeClr val="accent1">
+              <a:shade val="15000"/>
+            </a:schemeClr>
+          </a:lnRef>
+          <a:fillRef idx="1">
+            <a:schemeClr val="accent1"/>
+          </a:fillRef>
+          <a:effectRef idx="0">
+            <a:schemeClr val="accent1"/>
+          </a:effectRef>
+          <a:fontRef idx="minor">
+            <a:schemeClr val="lt1"/>
+          </a:fontRef>
+        </p:style>
+        <p:txBody>
+          <a:bodyPr rtlCol="0" anchor="ctr"/>
+          <a:lstStyle/>
+          <a:p>
+            <a:pPr algn="ctr"/>
+            <a:endParaRPr lang="en-US" dirty="0"/>
+          </a:p>
+        </p:txBody>
+      </p:sp>
+      <p:sp>
+        <p:nvSpPr>
+          <p:cNvPr id="1031" name="Triángulo isósceles 1030">
+            <a:extLst>
+              <a:ext uri="{FF2B5EF4-FFF2-40B4-BE49-F238E27FC236}">
+                <a16:creationId xmlns:a16="http://schemas.microsoft.com/office/drawing/2014/main" id="{0629460D-B714-7819-82E6-738C83D123BD}"/>
+              </a:ext>
+            </a:extLst>
+          </p:cNvPr>
+          <p:cNvSpPr>
+            <a:spLocks/>
+          </p:cNvSpPr>
+          <p:nvPr/>
+        </p:nvSpPr>
+        <p:spPr>
+          <a:xfrm rot="7005036">
+            <a:off x="6917745" y="1420439"/>
+            <a:ext cx="129450" cy="164217"/>
+          </a:xfrm>
+          <a:prstGeom prst="triangle">
+            <a:avLst/>
+          </a:prstGeom>
+          <a:solidFill>
+            <a:srgbClr val="00B050"/>
+          </a:solidFill>
+          <a:ln>
+            <a:solidFill>
+              <a:srgbClr val="00B050"/>
+            </a:solidFill>
+          </a:ln>
+        </p:spPr>
+        <p:style>
+          <a:lnRef idx="2">
+            <a:schemeClr val="accent1">
+              <a:shade val="15000"/>
+            </a:schemeClr>
+          </a:lnRef>
+          <a:fillRef idx="1">
+            <a:schemeClr val="accent1"/>
+          </a:fillRef>
+          <a:effectRef idx="0">
+            <a:schemeClr val="accent1"/>
+          </a:effectRef>
+          <a:fontRef idx="minor">
+            <a:schemeClr val="lt1"/>
+          </a:fontRef>
+        </p:style>
+        <p:txBody>
+          <a:bodyPr rtlCol="0" anchor="ctr"/>
+          <a:lstStyle/>
+          <a:p>
+            <a:pPr algn="ctr"/>
+            <a:endParaRPr lang="en-US" dirty="0"/>
+          </a:p>
+        </p:txBody>
+      </p:sp>
+      <p:sp>
+        <p:nvSpPr>
+          <p:cNvPr id="2" name="Elipse 1">
+            <a:extLst>
+              <a:ext uri="{FF2B5EF4-FFF2-40B4-BE49-F238E27FC236}">
+                <a16:creationId xmlns:a16="http://schemas.microsoft.com/office/drawing/2014/main" id="{D78F5E5C-126E-D66E-AE8C-705EDA98A061}"/>
+              </a:ext>
+            </a:extLst>
+          </p:cNvPr>
+          <p:cNvSpPr>
+            <a:spLocks/>
+          </p:cNvSpPr>
+          <p:nvPr/>
+        </p:nvSpPr>
+        <p:spPr>
+          <a:xfrm>
+            <a:off x="6040376" y="1630459"/>
+            <a:ext cx="1408173" cy="1488931"/>
+          </a:xfrm>
+          <a:prstGeom prst="ellipse">
+            <a:avLst/>
+          </a:prstGeom>
+          <a:noFill/>
+          <a:ln w="28575">
+            <a:solidFill>
+              <a:srgbClr val="00B050"/>
+            </a:solidFill>
+          </a:ln>
+        </p:spPr>
+        <p:style>
+          <a:lnRef idx="2">
+            <a:schemeClr val="accent1">
+              <a:shade val="15000"/>
+            </a:schemeClr>
+          </a:lnRef>
+          <a:fillRef idx="1">
+            <a:schemeClr val="accent1"/>
+          </a:fillRef>
+          <a:effectRef idx="0">
+            <a:schemeClr val="accent1"/>
+          </a:effectRef>
+          <a:fontRef idx="minor">
+            <a:schemeClr val="lt1"/>
+          </a:fontRef>
+        </p:style>
+        <p:txBody>
+          <a:bodyPr rtlCol="0" anchor="ctr"/>
+          <a:lstStyle/>
+          <a:p>
+            <a:pPr algn="ctr"/>
+            <a:endParaRPr lang="en-US" dirty="0"/>
+          </a:p>
+        </p:txBody>
+      </p:sp>
+      <p:sp>
+        <p:nvSpPr>
+          <p:cNvPr id="5" name="Triángulo isósceles 4">
+            <a:extLst>
+              <a:ext uri="{FF2B5EF4-FFF2-40B4-BE49-F238E27FC236}">
+                <a16:creationId xmlns:a16="http://schemas.microsoft.com/office/drawing/2014/main" id="{FFC48863-8D69-2A80-9250-187EAE2588ED}"/>
+              </a:ext>
+            </a:extLst>
+          </p:cNvPr>
+          <p:cNvSpPr>
+            <a:spLocks/>
+          </p:cNvSpPr>
+          <p:nvPr/>
+        </p:nvSpPr>
+        <p:spPr>
+          <a:xfrm rot="6872023">
+            <a:off x="6907862" y="1602061"/>
+            <a:ext cx="111870" cy="141915"/>
+          </a:xfrm>
+          <a:prstGeom prst="triangle">
+            <a:avLst/>
+          </a:prstGeom>
+          <a:solidFill>
+            <a:srgbClr val="00B050"/>
+          </a:solidFill>
+          <a:ln>
+            <a:solidFill>
+              <a:srgbClr val="00B050"/>
+            </a:solidFill>
+          </a:ln>
+        </p:spPr>
+        <p:style>
+          <a:lnRef idx="2">
+            <a:schemeClr val="accent1">
+              <a:shade val="15000"/>
+            </a:schemeClr>
+          </a:lnRef>
+          <a:fillRef idx="1">
+            <a:schemeClr val="accent1"/>
+          </a:fillRef>
+          <a:effectRef idx="0">
+            <a:schemeClr val="accent1"/>
+          </a:effectRef>
+          <a:fontRef idx="minor">
+            <a:schemeClr val="lt1"/>
+          </a:fontRef>
+        </p:style>
+        <p:txBody>
+          <a:bodyPr rtlCol="0" anchor="ctr"/>
+          <a:lstStyle/>
+          <a:p>
+            <a:pPr algn="ctr"/>
+            <a:endParaRPr lang="en-US"/>
+          </a:p>
+        </p:txBody>
+      </p:sp>
+      <p:sp>
+        <p:nvSpPr>
+          <p:cNvPr id="8" name="Triángulo isósceles 7">
+            <a:extLst>
+              <a:ext uri="{FF2B5EF4-FFF2-40B4-BE49-F238E27FC236}">
+                <a16:creationId xmlns:a16="http://schemas.microsoft.com/office/drawing/2014/main" id="{E42FA19C-2288-B49D-2A3C-DA92B9ADA149}"/>
+              </a:ext>
+            </a:extLst>
+          </p:cNvPr>
+          <p:cNvSpPr>
+            <a:spLocks/>
+          </p:cNvSpPr>
+          <p:nvPr/>
+        </p:nvSpPr>
+        <p:spPr>
+          <a:xfrm rot="15110246">
+            <a:off x="6874981" y="3021561"/>
+            <a:ext cx="111870" cy="141915"/>
+          </a:xfrm>
+          <a:prstGeom prst="triangle">
+            <a:avLst/>
+          </a:prstGeom>
+          <a:solidFill>
+            <a:srgbClr val="00B050"/>
+          </a:solidFill>
+          <a:ln>
+            <a:solidFill>
+              <a:srgbClr val="00B050"/>
+            </a:solidFill>
+          </a:ln>
+        </p:spPr>
+        <p:style>
+          <a:lnRef idx="2">
+            <a:schemeClr val="accent1">
+              <a:shade val="15000"/>
+            </a:schemeClr>
+          </a:lnRef>
+          <a:fillRef idx="1">
+            <a:schemeClr val="accent1"/>
+          </a:fillRef>
+          <a:effectRef idx="0">
+            <a:schemeClr val="accent1"/>
+          </a:effectRef>
+          <a:fontRef idx="minor">
+            <a:schemeClr val="lt1"/>
+          </a:fontRef>
+        </p:style>
+        <p:txBody>
+          <a:bodyPr rtlCol="0" anchor="ctr"/>
+          <a:lstStyle/>
+          <a:p>
+            <a:pPr algn="ctr"/>
+            <a:endParaRPr lang="en-US"/>
+          </a:p>
+        </p:txBody>
+      </p:sp>
+      <p:sp>
+        <p:nvSpPr>
+          <p:cNvPr id="11" name="Elipse 10">
+            <a:extLst>
+              <a:ext uri="{FF2B5EF4-FFF2-40B4-BE49-F238E27FC236}">
+                <a16:creationId xmlns:a16="http://schemas.microsoft.com/office/drawing/2014/main" id="{3611A39F-B574-CD11-AEE1-6CCBAE725953}"/>
+              </a:ext>
+            </a:extLst>
+          </p:cNvPr>
+          <p:cNvSpPr>
+            <a:spLocks/>
+          </p:cNvSpPr>
+          <p:nvPr/>
+        </p:nvSpPr>
+        <p:spPr>
+          <a:xfrm>
+            <a:off x="6441859" y="1907272"/>
+            <a:ext cx="978116" cy="1016772"/>
+          </a:xfrm>
+          <a:prstGeom prst="ellipse">
+            <a:avLst/>
+          </a:prstGeom>
+          <a:noFill/>
+          <a:ln w="28575">
+            <a:solidFill>
+              <a:srgbClr val="00B050"/>
+            </a:solidFill>
+          </a:ln>
+        </p:spPr>
+        <p:style>
+          <a:lnRef idx="2">
+            <a:schemeClr val="accent1">
+              <a:shade val="15000"/>
+            </a:schemeClr>
+          </a:lnRef>
+          <a:fillRef idx="1">
+            <a:schemeClr val="accent1"/>
+          </a:fillRef>
+          <a:effectRef idx="0">
+            <a:schemeClr val="accent1"/>
+          </a:effectRef>
+          <a:fontRef idx="minor">
+            <a:schemeClr val="lt1"/>
+          </a:fontRef>
+        </p:style>
+        <p:txBody>
+          <a:bodyPr rtlCol="0" anchor="ctr"/>
+          <a:lstStyle/>
+          <a:p>
+            <a:pPr algn="ctr"/>
+            <a:endParaRPr lang="en-US" dirty="0"/>
+          </a:p>
+        </p:txBody>
+      </p:sp>
+      <p:sp>
+        <p:nvSpPr>
+          <p:cNvPr id="13" name="Triángulo isósceles 12">
+            <a:extLst>
+              <a:ext uri="{FF2B5EF4-FFF2-40B4-BE49-F238E27FC236}">
+                <a16:creationId xmlns:a16="http://schemas.microsoft.com/office/drawing/2014/main" id="{DF2DC8C5-187B-DF89-AD68-D94517179908}"/>
+              </a:ext>
+            </a:extLst>
+          </p:cNvPr>
+          <p:cNvSpPr>
+            <a:spLocks/>
+          </p:cNvSpPr>
+          <p:nvPr/>
+        </p:nvSpPr>
+        <p:spPr>
+          <a:xfrm rot="403042">
+            <a:off x="6382442" y="2343376"/>
+            <a:ext cx="111870" cy="141915"/>
+          </a:xfrm>
+          <a:prstGeom prst="triangle">
+            <a:avLst/>
+          </a:prstGeom>
+          <a:solidFill>
+            <a:srgbClr val="00B050"/>
+          </a:solidFill>
+          <a:ln>
+            <a:solidFill>
+              <a:srgbClr val="00B050"/>
+            </a:solidFill>
+          </a:ln>
+        </p:spPr>
+        <p:style>
+          <a:lnRef idx="2">
+            <a:schemeClr val="accent1">
+              <a:shade val="15000"/>
+            </a:schemeClr>
+          </a:lnRef>
+          <a:fillRef idx="1">
+            <a:schemeClr val="accent1"/>
+          </a:fillRef>
+          <a:effectRef idx="0">
+            <a:schemeClr val="accent1"/>
+          </a:effectRef>
+          <a:fontRef idx="minor">
+            <a:schemeClr val="lt1"/>
+          </a:fontRef>
+        </p:style>
+        <p:txBody>
+          <a:bodyPr rtlCol="0" anchor="ctr"/>
+          <a:lstStyle/>
+          <a:p>
+            <a:pPr algn="ctr"/>
+            <a:endParaRPr lang="en-US"/>
+          </a:p>
+        </p:txBody>
+      </p:sp>
+      <p:sp>
+        <p:nvSpPr>
+          <p:cNvPr id="14" name="Elipse 13">
+            <a:extLst>
+              <a:ext uri="{FF2B5EF4-FFF2-40B4-BE49-F238E27FC236}">
+                <a16:creationId xmlns:a16="http://schemas.microsoft.com/office/drawing/2014/main" id="{9DAABD93-FBC1-0E2D-9FF3-79B4A019AD0B}"/>
+              </a:ext>
+            </a:extLst>
+          </p:cNvPr>
+          <p:cNvSpPr>
+            <a:spLocks/>
+          </p:cNvSpPr>
+          <p:nvPr/>
+        </p:nvSpPr>
+        <p:spPr>
+          <a:xfrm>
+            <a:off x="6863070" y="2081107"/>
+            <a:ext cx="599766" cy="704262"/>
+          </a:xfrm>
+          <a:prstGeom prst="ellipse">
+            <a:avLst/>
+          </a:prstGeom>
+          <a:noFill/>
+          <a:ln w="28575">
+            <a:solidFill>
+              <a:srgbClr val="00B050"/>
+            </a:solidFill>
+          </a:ln>
+        </p:spPr>
+        <p:style>
+          <a:lnRef idx="2">
+            <a:schemeClr val="accent1">
+              <a:shade val="15000"/>
+            </a:schemeClr>
+          </a:lnRef>
+          <a:fillRef idx="1">
+            <a:schemeClr val="accent1"/>
+          </a:fillRef>
+          <a:effectRef idx="0">
+            <a:schemeClr val="accent1"/>
+          </a:effectRef>
+          <a:fontRef idx="minor">
+            <a:schemeClr val="lt1"/>
+          </a:fontRef>
+        </p:style>
+        <p:txBody>
+          <a:bodyPr rtlCol="0" anchor="ctr"/>
+          <a:lstStyle/>
+          <a:p>
+            <a:pPr algn="ctr"/>
+            <a:endParaRPr lang="en-US" dirty="0"/>
+          </a:p>
+        </p:txBody>
+      </p:sp>
+      <p:sp>
+        <p:nvSpPr>
+          <p:cNvPr id="15" name="Triángulo isósceles 14">
+            <a:extLst>
+              <a:ext uri="{FF2B5EF4-FFF2-40B4-BE49-F238E27FC236}">
+                <a16:creationId xmlns:a16="http://schemas.microsoft.com/office/drawing/2014/main" id="{82250624-0240-DEF2-5963-230666F97069}"/>
+              </a:ext>
+            </a:extLst>
+          </p:cNvPr>
+          <p:cNvSpPr>
+            <a:spLocks/>
+          </p:cNvSpPr>
+          <p:nvPr/>
+        </p:nvSpPr>
+        <p:spPr>
+          <a:xfrm rot="209440">
+            <a:off x="6808314" y="2346783"/>
+            <a:ext cx="111870" cy="141915"/>
+          </a:xfrm>
+          <a:prstGeom prst="triangle">
+            <a:avLst/>
+          </a:prstGeom>
+          <a:solidFill>
+            <a:srgbClr val="00B050"/>
+          </a:solidFill>
+          <a:ln>
+            <a:solidFill>
+              <a:srgbClr val="00B050"/>
+            </a:solidFill>
+          </a:ln>
+        </p:spPr>
+        <p:style>
+          <a:lnRef idx="2">
+            <a:schemeClr val="accent1">
+              <a:shade val="15000"/>
+            </a:schemeClr>
+          </a:lnRef>
+          <a:fillRef idx="1">
+            <a:schemeClr val="accent1"/>
+          </a:fillRef>
+          <a:effectRef idx="0">
+            <a:schemeClr val="accent1"/>
+          </a:effectRef>
+          <a:fontRef idx="minor">
+            <a:schemeClr val="lt1"/>
+          </a:fontRef>
+        </p:style>
+        <p:txBody>
+          <a:bodyPr rtlCol="0" anchor="ctr"/>
+          <a:lstStyle/>
+          <a:p>
+            <a:pPr algn="ctr"/>
+            <a:endParaRPr lang="en-US"/>
+          </a:p>
+        </p:txBody>
+      </p:sp>
+      <p:sp>
+        <p:nvSpPr>
+          <p:cNvPr id="18" name="Elipse 17">
+            <a:extLst>
+              <a:ext uri="{FF2B5EF4-FFF2-40B4-BE49-F238E27FC236}">
+                <a16:creationId xmlns:a16="http://schemas.microsoft.com/office/drawing/2014/main" id="{3566BB2F-69AB-2248-880E-BFB2F3F3DCC8}"/>
+              </a:ext>
+            </a:extLst>
+          </p:cNvPr>
+          <p:cNvSpPr>
+            <a:spLocks/>
+          </p:cNvSpPr>
+          <p:nvPr/>
+        </p:nvSpPr>
+        <p:spPr>
+          <a:xfrm>
+            <a:off x="7023161" y="2222223"/>
+            <a:ext cx="351061" cy="422552"/>
+          </a:xfrm>
+          <a:prstGeom prst="ellipse">
+            <a:avLst/>
+          </a:prstGeom>
+          <a:noFill/>
+          <a:ln w="28575">
+            <a:solidFill>
+              <a:srgbClr val="00B050"/>
+            </a:solidFill>
+          </a:ln>
+        </p:spPr>
+        <p:style>
+          <a:lnRef idx="2">
+            <a:schemeClr val="accent1">
+              <a:shade val="15000"/>
+            </a:schemeClr>
+          </a:lnRef>
+          <a:fillRef idx="1">
+            <a:schemeClr val="accent1"/>
+          </a:fillRef>
+          <a:effectRef idx="0">
+            <a:schemeClr val="accent1"/>
+          </a:effectRef>
+          <a:fontRef idx="minor">
+            <a:schemeClr val="lt1"/>
+          </a:fontRef>
+        </p:style>
+        <p:txBody>
+          <a:bodyPr rtlCol="0" anchor="ctr"/>
+          <a:lstStyle/>
+          <a:p>
+            <a:pPr algn="ctr"/>
+            <a:endParaRPr lang="en-US" dirty="0"/>
+          </a:p>
+        </p:txBody>
+      </p:sp>
+      <p:sp>
+        <p:nvSpPr>
+          <p:cNvPr id="25" name="Triángulo isósceles 24">
+            <a:extLst>
+              <a:ext uri="{FF2B5EF4-FFF2-40B4-BE49-F238E27FC236}">
+                <a16:creationId xmlns:a16="http://schemas.microsoft.com/office/drawing/2014/main" id="{58AD0B52-4671-CBD6-905B-F2E190D9ED8E}"/>
+              </a:ext>
+            </a:extLst>
+          </p:cNvPr>
+          <p:cNvSpPr>
+            <a:spLocks/>
+          </p:cNvSpPr>
+          <p:nvPr/>
+        </p:nvSpPr>
+        <p:spPr>
+          <a:xfrm rot="15458321">
+            <a:off x="6905170" y="2847436"/>
+            <a:ext cx="117046" cy="135858"/>
+          </a:xfrm>
+          <a:prstGeom prst="triangle">
+            <a:avLst>
+              <a:gd name="adj" fmla="val 46624"/>
+            </a:avLst>
+          </a:prstGeom>
+          <a:solidFill>
+            <a:srgbClr val="00B050"/>
+          </a:solidFill>
+          <a:ln>
+            <a:solidFill>
+              <a:srgbClr val="00B050"/>
+            </a:solidFill>
+          </a:ln>
+        </p:spPr>
+        <p:style>
+          <a:lnRef idx="2">
+            <a:schemeClr val="accent1">
+              <a:shade val="15000"/>
+            </a:schemeClr>
+          </a:lnRef>
+          <a:fillRef idx="1">
+            <a:schemeClr val="accent1"/>
+          </a:fillRef>
+          <a:effectRef idx="0">
+            <a:schemeClr val="accent1"/>
+          </a:effectRef>
+          <a:fontRef idx="minor">
+            <a:schemeClr val="lt1"/>
+          </a:fontRef>
+        </p:style>
+        <p:txBody>
+          <a:bodyPr rtlCol="0" anchor="ctr"/>
+          <a:lstStyle/>
+          <a:p>
+            <a:pPr algn="ctr"/>
+            <a:endParaRPr lang="en-US"/>
+          </a:p>
+        </p:txBody>
+      </p:sp>
+      <p:sp>
+        <p:nvSpPr>
+          <p:cNvPr id="27" name="Triángulo isósceles 26">
+            <a:extLst>
+              <a:ext uri="{FF2B5EF4-FFF2-40B4-BE49-F238E27FC236}">
+                <a16:creationId xmlns:a16="http://schemas.microsoft.com/office/drawing/2014/main" id="{7AD68F7B-9A7D-2BED-A12D-976E536149E7}"/>
+              </a:ext>
+            </a:extLst>
+          </p:cNvPr>
+          <p:cNvSpPr>
+            <a:spLocks/>
+          </p:cNvSpPr>
+          <p:nvPr/>
+        </p:nvSpPr>
+        <p:spPr>
+          <a:xfrm rot="14594964" flipH="1">
+            <a:off x="8022658" y="1421314"/>
+            <a:ext cx="129450" cy="164217"/>
+          </a:xfrm>
+          <a:prstGeom prst="triangle">
+            <a:avLst/>
+          </a:prstGeom>
+          <a:solidFill>
+            <a:srgbClr val="00B050"/>
+          </a:solidFill>
+          <a:ln>
+            <a:solidFill>
+              <a:srgbClr val="00B050"/>
+            </a:solidFill>
+          </a:ln>
+        </p:spPr>
+        <p:style>
+          <a:lnRef idx="2">
+            <a:schemeClr val="accent1">
+              <a:shade val="15000"/>
+            </a:schemeClr>
+          </a:lnRef>
+          <a:fillRef idx="1">
+            <a:schemeClr val="accent1"/>
+          </a:fillRef>
+          <a:effectRef idx="0">
+            <a:schemeClr val="accent1"/>
+          </a:effectRef>
+          <a:fontRef idx="minor">
+            <a:schemeClr val="lt1"/>
+          </a:fontRef>
+        </p:style>
+        <p:txBody>
+          <a:bodyPr rtlCol="0" anchor="ctr"/>
+          <a:lstStyle/>
+          <a:p>
+            <a:pPr algn="ctr"/>
+            <a:endParaRPr lang="en-US" dirty="0"/>
+          </a:p>
+        </p:txBody>
+      </p:sp>
+      <p:sp>
+        <p:nvSpPr>
+          <p:cNvPr id="28" name="Elipse 27">
+            <a:extLst>
+              <a:ext uri="{FF2B5EF4-FFF2-40B4-BE49-F238E27FC236}">
+                <a16:creationId xmlns:a16="http://schemas.microsoft.com/office/drawing/2014/main" id="{A5652F18-FFDF-9C39-9ED7-0D2F1A81B352}"/>
+              </a:ext>
+            </a:extLst>
+          </p:cNvPr>
+          <p:cNvSpPr>
+            <a:spLocks/>
+          </p:cNvSpPr>
+          <p:nvPr/>
+        </p:nvSpPr>
+        <p:spPr>
+          <a:xfrm>
+            <a:off x="7597278" y="1632453"/>
+            <a:ext cx="1408173" cy="1488931"/>
+          </a:xfrm>
+          <a:prstGeom prst="ellipse">
+            <a:avLst/>
+          </a:prstGeom>
+          <a:noFill/>
+          <a:ln w="28575">
+            <a:solidFill>
+              <a:srgbClr val="00B050"/>
+            </a:solidFill>
+          </a:ln>
+        </p:spPr>
+        <p:style>
+          <a:lnRef idx="2">
+            <a:schemeClr val="accent1">
+              <a:shade val="15000"/>
+            </a:schemeClr>
+          </a:lnRef>
+          <a:fillRef idx="1">
+            <a:schemeClr val="accent1"/>
+          </a:fillRef>
+          <a:effectRef idx="0">
+            <a:schemeClr val="accent1"/>
+          </a:effectRef>
+          <a:fontRef idx="minor">
+            <a:schemeClr val="lt1"/>
+          </a:fontRef>
+        </p:style>
+        <p:txBody>
+          <a:bodyPr rtlCol="0" anchor="ctr"/>
+          <a:lstStyle/>
+          <a:p>
+            <a:pPr algn="ctr"/>
+            <a:endParaRPr lang="en-US" dirty="0"/>
+          </a:p>
+        </p:txBody>
+      </p:sp>
+      <p:sp>
+        <p:nvSpPr>
+          <p:cNvPr id="29" name="Triángulo isósceles 28">
+            <a:extLst>
+              <a:ext uri="{FF2B5EF4-FFF2-40B4-BE49-F238E27FC236}">
+                <a16:creationId xmlns:a16="http://schemas.microsoft.com/office/drawing/2014/main" id="{8B981E24-39FD-1D4F-D4E7-459356491C3D}"/>
+              </a:ext>
+            </a:extLst>
+          </p:cNvPr>
+          <p:cNvSpPr>
+            <a:spLocks/>
+          </p:cNvSpPr>
+          <p:nvPr/>
+        </p:nvSpPr>
+        <p:spPr>
+          <a:xfrm flipH="1">
+            <a:off x="8539142" y="2325121"/>
+            <a:ext cx="116319" cy="147559"/>
+          </a:xfrm>
+          <a:prstGeom prst="triangle">
+            <a:avLst/>
+          </a:prstGeom>
+          <a:solidFill>
+            <a:srgbClr val="00B050"/>
+          </a:solidFill>
+          <a:ln>
+            <a:solidFill>
+              <a:srgbClr val="00B050"/>
+            </a:solidFill>
+          </a:ln>
+        </p:spPr>
+        <p:style>
+          <a:lnRef idx="2">
+            <a:schemeClr val="accent1">
+              <a:shade val="15000"/>
+            </a:schemeClr>
+          </a:lnRef>
+          <a:fillRef idx="1">
+            <a:schemeClr val="accent1"/>
+          </a:fillRef>
+          <a:effectRef idx="0">
+            <a:schemeClr val="accent1"/>
+          </a:effectRef>
+          <a:fontRef idx="minor">
+            <a:schemeClr val="lt1"/>
+          </a:fontRef>
+        </p:style>
+        <p:txBody>
+          <a:bodyPr rtlCol="0" anchor="ctr"/>
+          <a:lstStyle/>
+          <a:p>
+            <a:pPr algn="ctr"/>
+            <a:endParaRPr lang="en-US"/>
+          </a:p>
+        </p:txBody>
+      </p:sp>
+      <p:sp>
+        <p:nvSpPr>
+          <p:cNvPr id="31" name="Triángulo isósceles 30">
+            <a:extLst>
+              <a:ext uri="{FF2B5EF4-FFF2-40B4-BE49-F238E27FC236}">
+                <a16:creationId xmlns:a16="http://schemas.microsoft.com/office/drawing/2014/main" id="{20B7994E-81FA-A53A-2237-41C38EFB2F4B}"/>
+              </a:ext>
+            </a:extLst>
+          </p:cNvPr>
+          <p:cNvSpPr>
+            <a:spLocks/>
+          </p:cNvSpPr>
+          <p:nvPr/>
+        </p:nvSpPr>
+        <p:spPr>
+          <a:xfrm rot="14934921" flipH="1">
+            <a:off x="8088555" y="1588864"/>
+            <a:ext cx="111870" cy="141915"/>
+          </a:xfrm>
+          <a:prstGeom prst="triangle">
+            <a:avLst/>
+          </a:prstGeom>
+          <a:solidFill>
+            <a:srgbClr val="00B050"/>
+          </a:solidFill>
+          <a:ln>
+            <a:solidFill>
+              <a:srgbClr val="00B050"/>
+            </a:solidFill>
+          </a:ln>
+        </p:spPr>
+        <p:style>
+          <a:lnRef idx="2">
+            <a:schemeClr val="accent1">
+              <a:shade val="15000"/>
+            </a:schemeClr>
+          </a:lnRef>
+          <a:fillRef idx="1">
+            <a:schemeClr val="accent1"/>
+          </a:fillRef>
+          <a:effectRef idx="0">
+            <a:schemeClr val="accent1"/>
+          </a:effectRef>
+          <a:fontRef idx="minor">
+            <a:schemeClr val="lt1"/>
+          </a:fontRef>
+        </p:style>
+        <p:txBody>
+          <a:bodyPr rtlCol="0" anchor="ctr"/>
+          <a:lstStyle/>
+          <a:p>
+            <a:pPr algn="ctr"/>
+            <a:endParaRPr lang="en-US"/>
+          </a:p>
+        </p:txBody>
+      </p:sp>
+      <p:sp>
+        <p:nvSpPr>
+          <p:cNvPr id="1024" name="Triángulo isósceles 1023">
+            <a:extLst>
+              <a:ext uri="{FF2B5EF4-FFF2-40B4-BE49-F238E27FC236}">
+                <a16:creationId xmlns:a16="http://schemas.microsoft.com/office/drawing/2014/main" id="{E58B848F-4457-59E3-0E6C-809986C4B583}"/>
+              </a:ext>
+            </a:extLst>
+          </p:cNvPr>
+          <p:cNvSpPr>
+            <a:spLocks/>
+          </p:cNvSpPr>
+          <p:nvPr/>
+        </p:nvSpPr>
+        <p:spPr>
+          <a:xfrm rot="6894555" flipH="1">
+            <a:off x="7988614" y="3236681"/>
+            <a:ext cx="102282" cy="123061"/>
+          </a:xfrm>
+          <a:prstGeom prst="triangle">
+            <a:avLst/>
+          </a:prstGeom>
+          <a:solidFill>
+            <a:srgbClr val="00B050"/>
+          </a:solidFill>
+          <a:ln>
+            <a:solidFill>
+              <a:srgbClr val="00B050"/>
+            </a:solidFill>
+          </a:ln>
+        </p:spPr>
+        <p:style>
+          <a:lnRef idx="2">
+            <a:schemeClr val="accent1">
+              <a:shade val="15000"/>
+            </a:schemeClr>
+          </a:lnRef>
+          <a:fillRef idx="1">
+            <a:schemeClr val="accent1"/>
+          </a:fillRef>
+          <a:effectRef idx="0">
+            <a:schemeClr val="accent1"/>
+          </a:effectRef>
+          <a:fontRef idx="minor">
+            <a:schemeClr val="lt1"/>
+          </a:fontRef>
+        </p:style>
+        <p:txBody>
+          <a:bodyPr rtlCol="0" anchor="ctr"/>
+          <a:lstStyle/>
+          <a:p>
+            <a:pPr algn="ctr"/>
+            <a:endParaRPr lang="en-US"/>
+          </a:p>
+        </p:txBody>
+      </p:sp>
+      <p:sp>
+        <p:nvSpPr>
+          <p:cNvPr id="1025" name="Elipse 1024">
+            <a:extLst>
+              <a:ext uri="{FF2B5EF4-FFF2-40B4-BE49-F238E27FC236}">
+                <a16:creationId xmlns:a16="http://schemas.microsoft.com/office/drawing/2014/main" id="{47D92C94-B851-5582-7074-1471A60F4C14}"/>
+              </a:ext>
+            </a:extLst>
+          </p:cNvPr>
+          <p:cNvSpPr>
+            <a:spLocks/>
+          </p:cNvSpPr>
+          <p:nvPr/>
+        </p:nvSpPr>
+        <p:spPr>
+          <a:xfrm flipH="1">
+            <a:off x="7624561" y="1890515"/>
+            <a:ext cx="978116" cy="1016772"/>
+          </a:xfrm>
+          <a:prstGeom prst="ellipse">
+            <a:avLst/>
+          </a:prstGeom>
+          <a:noFill/>
+          <a:ln w="28575">
+            <a:solidFill>
+              <a:srgbClr val="00B050"/>
+            </a:solidFill>
+          </a:ln>
+        </p:spPr>
+        <p:style>
+          <a:lnRef idx="2">
+            <a:schemeClr val="accent1">
+              <a:shade val="15000"/>
+            </a:schemeClr>
+          </a:lnRef>
+          <a:fillRef idx="1">
+            <a:schemeClr val="accent1"/>
+          </a:fillRef>
+          <a:effectRef idx="0">
+            <a:schemeClr val="accent1"/>
+          </a:effectRef>
+          <a:fontRef idx="minor">
+            <a:schemeClr val="lt1"/>
+          </a:fontRef>
+        </p:style>
+        <p:txBody>
+          <a:bodyPr rtlCol="0" anchor="ctr"/>
+          <a:lstStyle/>
+          <a:p>
+            <a:pPr algn="ctr"/>
+            <a:endParaRPr lang="en-US" dirty="0"/>
+          </a:p>
+        </p:txBody>
+      </p:sp>
+      <p:sp>
+        <p:nvSpPr>
+          <p:cNvPr id="1027" name="Triángulo isósceles 1026">
+            <a:extLst>
+              <a:ext uri="{FF2B5EF4-FFF2-40B4-BE49-F238E27FC236}">
+                <a16:creationId xmlns:a16="http://schemas.microsoft.com/office/drawing/2014/main" id="{918C4476-F9C7-254C-3AAD-B7AB8D210FEE}"/>
+              </a:ext>
+            </a:extLst>
+          </p:cNvPr>
+          <p:cNvSpPr>
+            <a:spLocks/>
+          </p:cNvSpPr>
+          <p:nvPr/>
+        </p:nvSpPr>
+        <p:spPr>
+          <a:xfrm flipH="1">
+            <a:off x="8948338" y="2325307"/>
+            <a:ext cx="111870" cy="141915"/>
+          </a:xfrm>
+          <a:prstGeom prst="triangle">
+            <a:avLst/>
+          </a:prstGeom>
+          <a:solidFill>
+            <a:srgbClr val="00B050"/>
+          </a:solidFill>
+          <a:ln>
+            <a:solidFill>
+              <a:srgbClr val="00B050"/>
+            </a:solidFill>
+          </a:ln>
+        </p:spPr>
+        <p:style>
+          <a:lnRef idx="2">
+            <a:schemeClr val="accent1">
+              <a:shade val="15000"/>
+            </a:schemeClr>
+          </a:lnRef>
+          <a:fillRef idx="1">
+            <a:schemeClr val="accent1"/>
+          </a:fillRef>
+          <a:effectRef idx="0">
+            <a:schemeClr val="accent1"/>
+          </a:effectRef>
+          <a:fontRef idx="minor">
+            <a:schemeClr val="lt1"/>
+          </a:fontRef>
+        </p:style>
+        <p:txBody>
+          <a:bodyPr rtlCol="0" anchor="ctr"/>
+          <a:lstStyle/>
+          <a:p>
+            <a:pPr algn="ctr"/>
+            <a:endParaRPr lang="en-US"/>
+          </a:p>
+        </p:txBody>
+      </p:sp>
+      <p:sp>
+        <p:nvSpPr>
+          <p:cNvPr id="1032" name="Elipse 1031">
+            <a:extLst>
+              <a:ext uri="{FF2B5EF4-FFF2-40B4-BE49-F238E27FC236}">
+                <a16:creationId xmlns:a16="http://schemas.microsoft.com/office/drawing/2014/main" id="{EBEBC0AF-F688-FCDF-8419-270A16E6FEEC}"/>
+              </a:ext>
+            </a:extLst>
+          </p:cNvPr>
+          <p:cNvSpPr>
+            <a:spLocks/>
+          </p:cNvSpPr>
+          <p:nvPr/>
+        </p:nvSpPr>
+        <p:spPr>
+          <a:xfrm flipH="1">
+            <a:off x="7600255" y="2079737"/>
+            <a:ext cx="566987" cy="662827"/>
+          </a:xfrm>
+          <a:prstGeom prst="ellipse">
+            <a:avLst/>
+          </a:prstGeom>
+          <a:noFill/>
+          <a:ln w="28575">
+            <a:solidFill>
+              <a:srgbClr val="00B050"/>
+            </a:solidFill>
+          </a:ln>
+        </p:spPr>
+        <p:style>
+          <a:lnRef idx="2">
+            <a:schemeClr val="accent1">
+              <a:shade val="15000"/>
+            </a:schemeClr>
+          </a:lnRef>
+          <a:fillRef idx="1">
+            <a:schemeClr val="accent1"/>
+          </a:fillRef>
+          <a:effectRef idx="0">
+            <a:schemeClr val="accent1"/>
+          </a:effectRef>
+          <a:fontRef idx="minor">
+            <a:schemeClr val="lt1"/>
+          </a:fontRef>
+        </p:style>
+        <p:txBody>
+          <a:bodyPr rtlCol="0" anchor="ctr"/>
+          <a:lstStyle/>
+          <a:p>
+            <a:pPr algn="ctr"/>
+            <a:endParaRPr lang="en-US" dirty="0"/>
+          </a:p>
+        </p:txBody>
+      </p:sp>
+      <p:sp>
+        <p:nvSpPr>
+          <p:cNvPr id="1033" name="Triángulo isósceles 1032">
+            <a:extLst>
+              <a:ext uri="{FF2B5EF4-FFF2-40B4-BE49-F238E27FC236}">
+                <a16:creationId xmlns:a16="http://schemas.microsoft.com/office/drawing/2014/main" id="{772DDDFF-48CC-B854-C529-1F98E20645A9}"/>
+              </a:ext>
+            </a:extLst>
+          </p:cNvPr>
+          <p:cNvSpPr>
+            <a:spLocks/>
+          </p:cNvSpPr>
+          <p:nvPr/>
+        </p:nvSpPr>
+        <p:spPr>
+          <a:xfrm rot="6887719" flipH="1">
+            <a:off x="7940047" y="2972038"/>
+            <a:ext cx="100856" cy="127943"/>
+          </a:xfrm>
+          <a:prstGeom prst="triangle">
+            <a:avLst/>
+          </a:prstGeom>
+          <a:solidFill>
+            <a:srgbClr val="00B050"/>
+          </a:solidFill>
+          <a:ln>
+            <a:solidFill>
+              <a:srgbClr val="00B050"/>
+            </a:solidFill>
+          </a:ln>
+        </p:spPr>
+        <p:style>
+          <a:lnRef idx="2">
+            <a:schemeClr val="accent1">
+              <a:shade val="15000"/>
+            </a:schemeClr>
+          </a:lnRef>
+          <a:fillRef idx="1">
+            <a:schemeClr val="accent1"/>
+          </a:fillRef>
+          <a:effectRef idx="0">
+            <a:schemeClr val="accent1"/>
+          </a:effectRef>
+          <a:fontRef idx="minor">
+            <a:schemeClr val="lt1"/>
+          </a:fontRef>
+        </p:style>
+        <p:txBody>
+          <a:bodyPr rtlCol="0" anchor="ctr"/>
+          <a:lstStyle/>
+          <a:p>
+            <a:pPr algn="ctr"/>
+            <a:endParaRPr lang="en-US"/>
+          </a:p>
+        </p:txBody>
+      </p:sp>
+      <p:sp>
+        <p:nvSpPr>
+          <p:cNvPr id="1034" name="Triángulo isósceles 1033">
+            <a:extLst>
+              <a:ext uri="{FF2B5EF4-FFF2-40B4-BE49-F238E27FC236}">
+                <a16:creationId xmlns:a16="http://schemas.microsoft.com/office/drawing/2014/main" id="{DED5DF93-0CEA-716E-B58A-F4411263163F}"/>
+              </a:ext>
+            </a:extLst>
+          </p:cNvPr>
+          <p:cNvSpPr>
+            <a:spLocks/>
+          </p:cNvSpPr>
+          <p:nvPr/>
+        </p:nvSpPr>
+        <p:spPr>
+          <a:xfrm flipH="1">
+            <a:off x="9240779" y="2336750"/>
+            <a:ext cx="111870" cy="141915"/>
+          </a:xfrm>
+          <a:prstGeom prst="triangle">
+            <a:avLst/>
+          </a:prstGeom>
+          <a:solidFill>
+            <a:srgbClr val="00B050"/>
+          </a:solidFill>
+          <a:ln>
+            <a:solidFill>
+              <a:srgbClr val="00B050"/>
+            </a:solidFill>
+          </a:ln>
+        </p:spPr>
+        <p:style>
+          <a:lnRef idx="2">
+            <a:schemeClr val="accent1">
+              <a:shade val="15000"/>
+            </a:schemeClr>
+          </a:lnRef>
+          <a:fillRef idx="1">
+            <a:schemeClr val="accent1"/>
+          </a:fillRef>
+          <a:effectRef idx="0">
+            <a:schemeClr val="accent1"/>
+          </a:effectRef>
+          <a:fontRef idx="minor">
+            <a:schemeClr val="lt1"/>
+          </a:fontRef>
+        </p:style>
+        <p:txBody>
+          <a:bodyPr rtlCol="0" anchor="ctr"/>
+          <a:lstStyle/>
+          <a:p>
+            <a:pPr algn="ctr"/>
+            <a:endParaRPr lang="en-US"/>
+          </a:p>
+        </p:txBody>
+      </p:sp>
+      <p:sp>
+        <p:nvSpPr>
+          <p:cNvPr id="1035" name="Elipse 1034">
+            <a:extLst>
+              <a:ext uri="{FF2B5EF4-FFF2-40B4-BE49-F238E27FC236}">
+                <a16:creationId xmlns:a16="http://schemas.microsoft.com/office/drawing/2014/main" id="{DFD97CA9-CA39-9DC2-1C4F-94AED2895FAC}"/>
+              </a:ext>
+            </a:extLst>
+          </p:cNvPr>
+          <p:cNvSpPr>
+            <a:spLocks/>
+          </p:cNvSpPr>
+          <p:nvPr/>
+        </p:nvSpPr>
+        <p:spPr>
+          <a:xfrm flipH="1">
+            <a:off x="7636396" y="2222223"/>
+            <a:ext cx="351061" cy="422552"/>
+          </a:xfrm>
+          <a:prstGeom prst="ellipse">
+            <a:avLst/>
+          </a:prstGeom>
+          <a:noFill/>
+          <a:ln w="28575">
+            <a:solidFill>
+              <a:srgbClr val="00B050"/>
+            </a:solidFill>
+          </a:ln>
+        </p:spPr>
+        <p:style>
+          <a:lnRef idx="2">
+            <a:schemeClr val="accent1">
+              <a:shade val="15000"/>
+            </a:schemeClr>
+          </a:lnRef>
+          <a:fillRef idx="1">
+            <a:schemeClr val="accent1"/>
+          </a:fillRef>
+          <a:effectRef idx="0">
+            <a:schemeClr val="accent1"/>
+          </a:effectRef>
+          <a:fontRef idx="minor">
+            <a:schemeClr val="lt1"/>
+          </a:fontRef>
+        </p:style>
+        <p:txBody>
+          <a:bodyPr rtlCol="0" anchor="ctr"/>
+          <a:lstStyle/>
+          <a:p>
+            <a:pPr algn="ctr"/>
+            <a:endParaRPr lang="en-US" dirty="0"/>
+          </a:p>
+        </p:txBody>
+      </p:sp>
+      <p:sp>
+        <p:nvSpPr>
+          <p:cNvPr id="1036" name="Triángulo isósceles 1035">
+            <a:extLst>
+              <a:ext uri="{FF2B5EF4-FFF2-40B4-BE49-F238E27FC236}">
+                <a16:creationId xmlns:a16="http://schemas.microsoft.com/office/drawing/2014/main" id="{6FC66A92-409F-07AD-7DEB-089C576F0C8A}"/>
+              </a:ext>
+            </a:extLst>
+          </p:cNvPr>
+          <p:cNvSpPr>
+            <a:spLocks/>
+          </p:cNvSpPr>
+          <p:nvPr/>
+        </p:nvSpPr>
+        <p:spPr>
+          <a:xfrm rot="6141679" flipH="1">
+            <a:off x="7976922" y="2829293"/>
+            <a:ext cx="117046" cy="135858"/>
+          </a:xfrm>
+          <a:prstGeom prst="triangle">
+            <a:avLst>
+              <a:gd name="adj" fmla="val 46624"/>
+            </a:avLst>
+          </a:prstGeom>
+          <a:solidFill>
+            <a:srgbClr val="00B050"/>
+          </a:solidFill>
+          <a:ln>
+            <a:solidFill>
+              <a:srgbClr val="00B050"/>
+            </a:solidFill>
+          </a:ln>
+        </p:spPr>
+        <p:style>
+          <a:lnRef idx="2">
+            <a:schemeClr val="accent1">
+              <a:shade val="15000"/>
+            </a:schemeClr>
+          </a:lnRef>
+          <a:fillRef idx="1">
+            <a:schemeClr val="accent1"/>
+          </a:fillRef>
+          <a:effectRef idx="0">
+            <a:schemeClr val="accent1"/>
+          </a:effectRef>
+          <a:fontRef idx="minor">
+            <a:schemeClr val="lt1"/>
+          </a:fontRef>
+        </p:style>
+        <p:txBody>
+          <a:bodyPr rtlCol="0" anchor="ctr"/>
+          <a:lstStyle/>
+          <a:p>
+            <a:pPr algn="ctr"/>
+            <a:endParaRPr lang="en-US"/>
+          </a:p>
+        </p:txBody>
+      </p:sp>
+      <p:sp>
+        <p:nvSpPr>
+          <p:cNvPr id="1037" name="Elipse 1036">
+            <a:extLst>
+              <a:ext uri="{FF2B5EF4-FFF2-40B4-BE49-F238E27FC236}">
+                <a16:creationId xmlns:a16="http://schemas.microsoft.com/office/drawing/2014/main" id="{14EA58B7-7773-5DF9-1806-9DD9A14C0357}"/>
+              </a:ext>
+            </a:extLst>
+          </p:cNvPr>
+          <p:cNvSpPr>
+            <a:spLocks/>
+          </p:cNvSpPr>
+          <p:nvPr/>
+        </p:nvSpPr>
+        <p:spPr>
+          <a:xfrm>
+            <a:off x="7510933" y="1445629"/>
+            <a:ext cx="1786539" cy="1937410"/>
+          </a:xfrm>
+          <a:prstGeom prst="ellipse">
+            <a:avLst/>
+          </a:prstGeom>
+          <a:noFill/>
+          <a:ln w="28575">
+            <a:solidFill>
+              <a:srgbClr val="00B050"/>
+            </a:solidFill>
+          </a:ln>
+        </p:spPr>
+        <p:style>
+          <a:lnRef idx="2">
+            <a:schemeClr val="accent1">
+              <a:shade val="15000"/>
+            </a:schemeClr>
+          </a:lnRef>
+          <a:fillRef idx="1">
+            <a:schemeClr val="accent1"/>
+          </a:fillRef>
+          <a:effectRef idx="0">
+            <a:schemeClr val="accent1"/>
+          </a:effectRef>
+          <a:fontRef idx="minor">
+            <a:schemeClr val="lt1"/>
+          </a:fontRef>
+        </p:style>
+        <p:txBody>
+          <a:bodyPr rtlCol="0" anchor="ctr"/>
+          <a:lstStyle/>
+          <a:p>
+            <a:pPr algn="ctr"/>
+            <a:endParaRPr lang="en-US"/>
+          </a:p>
+        </p:txBody>
+      </p:sp>
+      <p:sp>
+        <p:nvSpPr>
+          <p:cNvPr id="1038" name="Triángulo isósceles 1037">
+            <a:extLst>
+              <a:ext uri="{FF2B5EF4-FFF2-40B4-BE49-F238E27FC236}">
+                <a16:creationId xmlns:a16="http://schemas.microsoft.com/office/drawing/2014/main" id="{533D32CF-C115-B88A-7886-6355603AA2BA}"/>
+              </a:ext>
+            </a:extLst>
+          </p:cNvPr>
+          <p:cNvSpPr>
+            <a:spLocks/>
+          </p:cNvSpPr>
+          <p:nvPr/>
+        </p:nvSpPr>
+        <p:spPr>
+          <a:xfrm>
+            <a:off x="7935708" y="2372650"/>
+            <a:ext cx="103662" cy="131503"/>
+          </a:xfrm>
+          <a:prstGeom prst="triangle">
+            <a:avLst/>
+          </a:prstGeom>
+          <a:solidFill>
+            <a:srgbClr val="00B050"/>
+          </a:solidFill>
+          <a:ln>
+            <a:solidFill>
+              <a:srgbClr val="00B050"/>
+            </a:solidFill>
+          </a:ln>
+        </p:spPr>
+        <p:style>
+          <a:lnRef idx="2">
+            <a:schemeClr val="accent1">
+              <a:shade val="15000"/>
+            </a:schemeClr>
+          </a:lnRef>
+          <a:fillRef idx="1">
+            <a:schemeClr val="accent1"/>
+          </a:fillRef>
+          <a:effectRef idx="0">
+            <a:schemeClr val="accent1"/>
+          </a:effectRef>
+          <a:fontRef idx="minor">
+            <a:schemeClr val="lt1"/>
+          </a:fontRef>
+        </p:style>
+        <p:txBody>
+          <a:bodyPr rtlCol="0" anchor="ctr"/>
+          <a:lstStyle/>
+          <a:p>
+            <a:pPr algn="ctr"/>
+            <a:endParaRPr lang="en-US"/>
+          </a:p>
+        </p:txBody>
+      </p:sp>
+      <p:sp>
+        <p:nvSpPr>
+          <p:cNvPr id="1039" name="Triángulo isósceles 1038">
+            <a:extLst>
+              <a:ext uri="{FF2B5EF4-FFF2-40B4-BE49-F238E27FC236}">
+                <a16:creationId xmlns:a16="http://schemas.microsoft.com/office/drawing/2014/main" id="{FD23D00E-5688-7524-8C46-CA696DD4D71A}"/>
+              </a:ext>
+            </a:extLst>
+          </p:cNvPr>
+          <p:cNvSpPr>
+            <a:spLocks/>
+          </p:cNvSpPr>
+          <p:nvPr/>
+        </p:nvSpPr>
+        <p:spPr>
+          <a:xfrm>
+            <a:off x="8108071" y="2369235"/>
+            <a:ext cx="111870" cy="141915"/>
+          </a:xfrm>
+          <a:prstGeom prst="triangle">
+            <a:avLst/>
+          </a:prstGeom>
+          <a:solidFill>
+            <a:srgbClr val="00B050"/>
+          </a:solidFill>
+          <a:ln>
+            <a:solidFill>
+              <a:srgbClr val="00B050"/>
+            </a:solidFill>
+          </a:ln>
+        </p:spPr>
+        <p:style>
+          <a:lnRef idx="2">
+            <a:schemeClr val="accent1">
+              <a:shade val="15000"/>
+            </a:schemeClr>
+          </a:lnRef>
+          <a:fillRef idx="1">
+            <a:schemeClr val="accent1"/>
+          </a:fillRef>
+          <a:effectRef idx="0">
+            <a:schemeClr val="accent1"/>
+          </a:effectRef>
+          <a:fontRef idx="minor">
+            <a:schemeClr val="lt1"/>
+          </a:fontRef>
+        </p:style>
+        <p:txBody>
+          <a:bodyPr rtlCol="0" anchor="ctr"/>
+          <a:lstStyle/>
+          <a:p>
+            <a:pPr algn="ctr"/>
+            <a:endParaRPr lang="en-US"/>
+          </a:p>
+        </p:txBody>
+      </p:sp>
+      <p:sp>
+        <p:nvSpPr>
+          <p:cNvPr id="1051" name="Triángulo isósceles 1050">
+            <a:extLst>
+              <a:ext uri="{FF2B5EF4-FFF2-40B4-BE49-F238E27FC236}">
+                <a16:creationId xmlns:a16="http://schemas.microsoft.com/office/drawing/2014/main" id="{A9DECF84-E663-576C-59D0-96FD647A76BB}"/>
+              </a:ext>
+            </a:extLst>
+          </p:cNvPr>
+          <p:cNvSpPr>
+            <a:spLocks/>
+          </p:cNvSpPr>
+          <p:nvPr/>
+        </p:nvSpPr>
+        <p:spPr>
+          <a:xfrm rot="8710459" flipH="1">
+            <a:off x="7700308" y="3297519"/>
+            <a:ext cx="111870" cy="141915"/>
+          </a:xfrm>
+          <a:prstGeom prst="triangle">
+            <a:avLst/>
+          </a:prstGeom>
+          <a:solidFill>
+            <a:srgbClr val="00B050"/>
+          </a:solidFill>
+          <a:ln>
+            <a:solidFill>
+              <a:srgbClr val="00B050"/>
+            </a:solidFill>
+          </a:ln>
+        </p:spPr>
+        <p:style>
+          <a:lnRef idx="2">
+            <a:schemeClr val="accent1">
+              <a:shade val="15000"/>
+            </a:schemeClr>
+          </a:lnRef>
+          <a:fillRef idx="1">
+            <a:schemeClr val="accent1"/>
+          </a:fillRef>
+          <a:effectRef idx="0">
+            <a:schemeClr val="accent1"/>
+          </a:effectRef>
+          <a:fontRef idx="minor">
+            <a:schemeClr val="lt1"/>
+          </a:fontRef>
+        </p:style>
+        <p:txBody>
+          <a:bodyPr rtlCol="0" anchor="ctr"/>
+          <a:lstStyle/>
+          <a:p>
+            <a:pPr algn="ctr"/>
+            <a:endParaRPr lang="en-US"/>
+          </a:p>
+        </p:txBody>
+      </p:sp>
+      <p:sp>
+        <p:nvSpPr>
+          <p:cNvPr id="1052" name="Triángulo isósceles 1051">
+            <a:extLst>
+              <a:ext uri="{FF2B5EF4-FFF2-40B4-BE49-F238E27FC236}">
+                <a16:creationId xmlns:a16="http://schemas.microsoft.com/office/drawing/2014/main" id="{66B85BDD-9AFE-E7FE-5022-7A50033BF6AD}"/>
+              </a:ext>
+            </a:extLst>
+          </p:cNvPr>
+          <p:cNvSpPr>
+            <a:spLocks/>
+          </p:cNvSpPr>
+          <p:nvPr/>
+        </p:nvSpPr>
+        <p:spPr>
+          <a:xfrm rot="12501406" flipH="1">
+            <a:off x="7347466" y="3326463"/>
+            <a:ext cx="111870" cy="141915"/>
+          </a:xfrm>
+          <a:prstGeom prst="triangle">
+            <a:avLst/>
+          </a:prstGeom>
+          <a:solidFill>
+            <a:srgbClr val="00B050"/>
+          </a:solidFill>
+          <a:ln>
+            <a:solidFill>
+              <a:srgbClr val="00B050"/>
+            </a:solidFill>
+          </a:ln>
+        </p:spPr>
+        <p:style>
+          <a:lnRef idx="2">
+            <a:schemeClr val="accent1">
+              <a:shade val="15000"/>
+            </a:schemeClr>
+          </a:lnRef>
+          <a:fillRef idx="1">
+            <a:schemeClr val="accent1"/>
+          </a:fillRef>
+          <a:effectRef idx="0">
+            <a:schemeClr val="accent1"/>
+          </a:effectRef>
+          <a:fontRef idx="minor">
+            <a:schemeClr val="lt1"/>
+          </a:fontRef>
+        </p:style>
+        <p:txBody>
+          <a:bodyPr rtlCol="0" anchor="ctr"/>
+          <a:lstStyle/>
+          <a:p>
+            <a:pPr algn="ctr"/>
+            <a:endParaRPr lang="en-US"/>
+          </a:p>
+        </p:txBody>
+      </p:sp>
+      <p:sp>
+        <p:nvSpPr>
+          <p:cNvPr id="1053" name="Triángulo isósceles 1052">
+            <a:extLst>
+              <a:ext uri="{FF2B5EF4-FFF2-40B4-BE49-F238E27FC236}">
+                <a16:creationId xmlns:a16="http://schemas.microsoft.com/office/drawing/2014/main" id="{3A0A0346-CE9A-F75E-76BB-066697ABE460}"/>
+              </a:ext>
+            </a:extLst>
+          </p:cNvPr>
+          <p:cNvSpPr>
+            <a:spLocks/>
+          </p:cNvSpPr>
+          <p:nvPr/>
+        </p:nvSpPr>
+        <p:spPr>
+          <a:xfrm rot="12616645" flipH="1">
+            <a:off x="7625425" y="1426263"/>
+            <a:ext cx="111870" cy="141915"/>
+          </a:xfrm>
+          <a:prstGeom prst="triangle">
+            <a:avLst/>
+          </a:prstGeom>
+          <a:solidFill>
+            <a:srgbClr val="00B050"/>
+          </a:solidFill>
+          <a:ln>
+            <a:solidFill>
+              <a:srgbClr val="00B050"/>
+            </a:solidFill>
+          </a:ln>
+        </p:spPr>
+        <p:style>
+          <a:lnRef idx="2">
+            <a:schemeClr val="accent1">
+              <a:shade val="15000"/>
+            </a:schemeClr>
+          </a:lnRef>
+          <a:fillRef idx="1">
+            <a:schemeClr val="accent1"/>
+          </a:fillRef>
+          <a:effectRef idx="0">
+            <a:schemeClr val="accent1"/>
+          </a:effectRef>
+          <a:fontRef idx="minor">
+            <a:schemeClr val="lt1"/>
+          </a:fontRef>
+        </p:style>
+        <p:txBody>
+          <a:bodyPr rtlCol="0" anchor="ctr"/>
+          <a:lstStyle/>
+          <a:p>
+            <a:pPr algn="ctr"/>
+            <a:endParaRPr lang="en-US"/>
+          </a:p>
+        </p:txBody>
+      </p:sp>
+      <p:sp>
+        <p:nvSpPr>
+          <p:cNvPr id="1054" name="Triángulo isósceles 1053">
+            <a:extLst>
+              <a:ext uri="{FF2B5EF4-FFF2-40B4-BE49-F238E27FC236}">
+                <a16:creationId xmlns:a16="http://schemas.microsoft.com/office/drawing/2014/main" id="{B818C097-31E9-53AD-A084-66301A0D3E11}"/>
+              </a:ext>
+            </a:extLst>
+          </p:cNvPr>
+          <p:cNvSpPr>
+            <a:spLocks/>
+          </p:cNvSpPr>
+          <p:nvPr/>
+        </p:nvSpPr>
+        <p:spPr>
+          <a:xfrm rot="8699046" flipH="1">
+            <a:off x="7249070" y="1406263"/>
+            <a:ext cx="111870" cy="141915"/>
+          </a:xfrm>
+          <a:prstGeom prst="triangle">
+            <a:avLst/>
+          </a:prstGeom>
+          <a:solidFill>
+            <a:srgbClr val="00B050"/>
+          </a:solidFill>
+          <a:ln>
+            <a:solidFill>
+              <a:srgbClr val="00B050"/>
+            </a:solidFill>
+          </a:ln>
+        </p:spPr>
+        <p:style>
+          <a:lnRef idx="2">
+            <a:schemeClr val="accent1">
+              <a:shade val="15000"/>
+            </a:schemeClr>
+          </a:lnRef>
+          <a:fillRef idx="1">
+            <a:schemeClr val="accent1"/>
+          </a:fillRef>
+          <a:effectRef idx="0">
+            <a:schemeClr val="accent1"/>
+          </a:effectRef>
+          <a:fontRef idx="minor">
+            <a:schemeClr val="lt1"/>
+          </a:fontRef>
+        </p:style>
+        <p:txBody>
+          <a:bodyPr rtlCol="0" anchor="ctr"/>
+          <a:lstStyle/>
+          <a:p>
+            <a:pPr algn="ctr"/>
+            <a:endParaRPr lang="en-US"/>
+          </a:p>
+        </p:txBody>
+      </p:sp>
+      <p:sp>
+        <p:nvSpPr>
+          <p:cNvPr id="1055" name="Rectángulo 1054">
+            <a:extLst>
+              <a:ext uri="{FF2B5EF4-FFF2-40B4-BE49-F238E27FC236}">
+                <a16:creationId xmlns:a16="http://schemas.microsoft.com/office/drawing/2014/main" id="{CC5791F8-C2C2-D527-DDBB-1457CA372AC7}"/>
+              </a:ext>
+            </a:extLst>
+          </p:cNvPr>
+          <p:cNvSpPr/>
+          <p:nvPr/>
+        </p:nvSpPr>
+        <p:spPr>
+          <a:xfrm>
+            <a:off x="7911252" y="1216025"/>
+            <a:ext cx="158446" cy="94371"/>
+          </a:xfrm>
+          <a:prstGeom prst="rect">
+            <a:avLst/>
+          </a:prstGeom>
+          <a:solidFill>
+            <a:schemeClr val="bg1"/>
+          </a:solidFill>
+          <a:ln>
+            <a:noFill/>
+          </a:ln>
+        </p:spPr>
+        <p:style>
+          <a:lnRef idx="2">
+            <a:schemeClr val="accent1">
+              <a:shade val="15000"/>
+            </a:schemeClr>
+          </a:lnRef>
+          <a:fillRef idx="1">
+            <a:schemeClr val="accent1"/>
+          </a:fillRef>
+          <a:effectRef idx="0">
+            <a:schemeClr val="accent1"/>
+          </a:effectRef>
+          <a:fontRef idx="minor">
+            <a:schemeClr val="lt1"/>
+          </a:fontRef>
+        </p:style>
+        <p:txBody>
+          <a:bodyPr rtlCol="0" anchor="ctr"/>
+          <a:lstStyle/>
+          <a:p>
+            <a:pPr algn="ctr"/>
+            <a:endParaRPr lang="en-US"/>
+          </a:p>
+        </p:txBody>
+      </p:sp>
+      <p:sp>
+        <p:nvSpPr>
+          <p:cNvPr id="2048" name="Rectángulo 2047">
+            <a:extLst>
+              <a:ext uri="{FF2B5EF4-FFF2-40B4-BE49-F238E27FC236}">
+                <a16:creationId xmlns:a16="http://schemas.microsoft.com/office/drawing/2014/main" id="{6BB07F2D-FDDD-680C-8E34-4D32055F9D58}"/>
+              </a:ext>
+            </a:extLst>
+          </p:cNvPr>
+          <p:cNvSpPr/>
+          <p:nvPr/>
+        </p:nvSpPr>
+        <p:spPr>
+          <a:xfrm rot="20013155">
+            <a:off x="7047308" y="3573056"/>
+            <a:ext cx="158446" cy="94371"/>
+          </a:xfrm>
+          <a:prstGeom prst="rect">
+            <a:avLst/>
+          </a:prstGeom>
+          <a:solidFill>
+            <a:schemeClr val="bg1"/>
+          </a:solidFill>
+          <a:ln>
+            <a:noFill/>
+          </a:ln>
+        </p:spPr>
+        <p:style>
+          <a:lnRef idx="2">
+            <a:schemeClr val="accent1">
+              <a:shade val="15000"/>
+            </a:schemeClr>
+          </a:lnRef>
+          <a:fillRef idx="1">
+            <a:schemeClr val="accent1"/>
+          </a:fillRef>
+          <a:effectRef idx="0">
+            <a:schemeClr val="accent1"/>
+          </a:effectRef>
+          <a:fontRef idx="minor">
+            <a:schemeClr val="lt1"/>
+          </a:fontRef>
+        </p:style>
+        <p:txBody>
+          <a:bodyPr rtlCol="0" anchor="ctr"/>
+          <a:lstStyle/>
+          <a:p>
+            <a:pPr algn="ctr"/>
+            <a:endParaRPr lang="en-US"/>
+          </a:p>
+        </p:txBody>
+      </p:sp>
+      <p:sp>
+        <p:nvSpPr>
+          <p:cNvPr id="2049" name="Triángulo isósceles 2048">
+            <a:extLst>
+              <a:ext uri="{FF2B5EF4-FFF2-40B4-BE49-F238E27FC236}">
+                <a16:creationId xmlns:a16="http://schemas.microsoft.com/office/drawing/2014/main" id="{B0472CB6-77BE-D62B-FCA5-F86E830E45FC}"/>
+              </a:ext>
+            </a:extLst>
+          </p:cNvPr>
+          <p:cNvSpPr>
+            <a:spLocks/>
+          </p:cNvSpPr>
+          <p:nvPr/>
+        </p:nvSpPr>
+        <p:spPr>
+          <a:xfrm>
+            <a:off x="6978416" y="2358445"/>
+            <a:ext cx="103662" cy="131503"/>
+          </a:xfrm>
+          <a:prstGeom prst="triangle">
+            <a:avLst/>
+          </a:prstGeom>
+          <a:solidFill>
+            <a:srgbClr val="00B050"/>
+          </a:solidFill>
+          <a:ln>
+            <a:solidFill>
+              <a:srgbClr val="00B050"/>
+            </a:solidFill>
+          </a:ln>
+        </p:spPr>
+        <p:style>
+          <a:lnRef idx="2">
+            <a:schemeClr val="accent1">
+              <a:shade val="15000"/>
+            </a:schemeClr>
+          </a:lnRef>
+          <a:fillRef idx="1">
+            <a:schemeClr val="accent1"/>
+          </a:fillRef>
+          <a:effectRef idx="0">
+            <a:schemeClr val="accent1"/>
+          </a:effectRef>
+          <a:fontRef idx="minor">
+            <a:schemeClr val="lt1"/>
+          </a:fontRef>
+        </p:style>
+        <p:txBody>
+          <a:bodyPr rtlCol="0" anchor="ctr"/>
+          <a:lstStyle/>
+          <a:p>
+            <a:pPr algn="ctr"/>
+            <a:endParaRPr lang="en-US"/>
+          </a:p>
+        </p:txBody>
+      </p:sp>
+      <p:pic>
+        <p:nvPicPr>
+          <p:cNvPr id="2060" name="Imagen 2059">
+            <a:extLst>
+              <a:ext uri="{FF2B5EF4-FFF2-40B4-BE49-F238E27FC236}">
+                <a16:creationId xmlns:a16="http://schemas.microsoft.com/office/drawing/2014/main" id="{279001AE-C6D7-DBA6-8501-58FE877988B3}"/>
+              </a:ext>
+            </a:extLst>
+          </p:cNvPr>
+          <p:cNvPicPr>
+            <a:picLocks noChangeAspect="1"/>
+          </p:cNvPicPr>
+          <p:nvPr/>
+        </p:nvPicPr>
+        <p:blipFill>
+          <a:blip r:embed="rId8">
+            <a:extLst>
+              <a:ext uri="{28A0092B-C50C-407E-A947-70E740481C1C}">
+                <a14:useLocalDpi xmlns:a14="http://schemas.microsoft.com/office/drawing/2010/main" val="0"/>
+              </a:ext>
+            </a:extLst>
+          </a:blip>
+          <a:stretch>
+            <a:fillRect/>
+          </a:stretch>
+        </p:blipFill>
+        <p:spPr>
+          <a:xfrm>
+            <a:off x="7128714" y="1960331"/>
+            <a:ext cx="782233" cy="782233"/>
+          </a:xfrm>
+          <a:prstGeom prst="rect">
+            <a:avLst/>
+          </a:prstGeom>
+        </p:spPr>
+      </p:pic>
+      <p:sp>
+        <p:nvSpPr>
+          <p:cNvPr id="6" name="Triángulo isósceles 5">
+            <a:extLst>
+              <a:ext uri="{FF2B5EF4-FFF2-40B4-BE49-F238E27FC236}">
+                <a16:creationId xmlns:a16="http://schemas.microsoft.com/office/drawing/2014/main" id="{3768E5B5-77A2-F578-AD41-7CA181D02AFA}"/>
+              </a:ext>
+            </a:extLst>
+          </p:cNvPr>
+          <p:cNvSpPr>
+            <a:spLocks/>
+          </p:cNvSpPr>
+          <p:nvPr/>
+        </p:nvSpPr>
+        <p:spPr>
+          <a:xfrm rot="236233">
+            <a:off x="5973366" y="2304060"/>
+            <a:ext cx="138857" cy="176150"/>
+          </a:xfrm>
+          <a:prstGeom prst="triangle">
+            <a:avLst/>
+          </a:prstGeom>
+          <a:solidFill>
+            <a:srgbClr val="00B050"/>
+          </a:solidFill>
+          <a:ln>
+            <a:solidFill>
+              <a:srgbClr val="00B050"/>
+            </a:solidFill>
+          </a:ln>
+        </p:spPr>
+        <p:style>
+          <a:lnRef idx="2">
+            <a:schemeClr val="accent1">
+              <a:shade val="15000"/>
+            </a:schemeClr>
+          </a:lnRef>
+          <a:fillRef idx="1">
+            <a:schemeClr val="accent1"/>
+          </a:fillRef>
+          <a:effectRef idx="0">
+            <a:schemeClr val="accent1"/>
+          </a:effectRef>
+          <a:fontRef idx="minor">
+            <a:schemeClr val="lt1"/>
+          </a:fontRef>
+        </p:style>
+        <p:txBody>
+          <a:bodyPr rtlCol="0" anchor="ctr"/>
+          <a:lstStyle/>
+          <a:p>
+            <a:pPr algn="ctr"/>
+            <a:endParaRPr lang="en-US" dirty="0"/>
+          </a:p>
+        </p:txBody>
+      </p:sp>
+    </p:spTree>
+    <p:extLst>
+      <p:ext uri="{BB962C8B-B14F-4D97-AF65-F5344CB8AC3E}">
+        <p14:creationId xmlns:p14="http://schemas.microsoft.com/office/powerpoint/2010/main" val="3122114673"/>
+      </p:ext>
+    </p:extLst>
+  </p:cSld>
+  <p:clrMapOvr>
+    <a:masterClrMapping/>
+  </p:clrMapOvr>
+</p:sld>
+</file>
+
+<file path=ppt/slides/slide5.xml><?xml version="1.0" encoding="utf-8"?>
+<p:sld xmlns:a="http://schemas.openxmlformats.org/drawingml/2006/main" xmlns:r="http://schemas.openxmlformats.org/officeDocument/2006/relationships" xmlns:p="http://schemas.openxmlformats.org/presentationml/2006/main">
+  <p:cSld>
+    <p:spTree>
+      <p:nvGrpSpPr>
+        <p:cNvPr id="1" name=""/>
+        <p:cNvGrpSpPr/>
+        <p:nvPr/>
+      </p:nvGrpSpPr>
+      <p:grpSpPr>
+        <a:xfrm>
+          <a:off x="0" y="0"/>
+          <a:ext cx="0" cy="0"/>
+          <a:chOff x="0" y="0"/>
+          <a:chExt cx="0" cy="0"/>
+        </a:xfrm>
+      </p:grpSpPr>
+      <p:pic>
+        <p:nvPicPr>
+          <p:cNvPr id="6" name="Imagen 5" descr="Diagrama&#10;&#10;Descripción generada automáticamente">
+            <a:extLst>
+              <a:ext uri="{FF2B5EF4-FFF2-40B4-BE49-F238E27FC236}">
+                <a16:creationId xmlns:a16="http://schemas.microsoft.com/office/drawing/2014/main" id="{81C894FB-E9FE-E400-CAA7-0F44E46425BA}"/>
+              </a:ext>
+            </a:extLst>
+          </p:cNvPr>
+          <p:cNvPicPr>
+            <a:picLocks noChangeAspect="1"/>
+          </p:cNvPicPr>
+          <p:nvPr/>
+        </p:nvPicPr>
+        <p:blipFill>
+          <a:blip r:embed="rId2">
+            <a:extLst>
+              <a:ext uri="{BEBA8EAE-BF5A-486C-A8C5-ECC9F3942E4B}">
+                <a14:imgProps xmlns:a14="http://schemas.microsoft.com/office/drawing/2010/main">
+                  <a14:imgLayer r:embed="rId3">
+                    <a14:imgEffect>
+                      <a14:backgroundRemoval t="9524" b="89862" l="9989" r="89897">
+                        <a14:foregroundMark x1="51435" y1="9524" x2="53042" y2="9524"/>
+                        <a14:foregroundMark x1="45565" y1="11499" x2="47417" y2="11214"/>
+                        <a14:backgroundMark x1="44202" y1="11367" x2="45695" y2="11214"/>
+                        <a14:backgroundMark x1="52928" y1="9370" x2="52928" y2="9370"/>
+                        <a14:backgroundMark x1="12629" y1="11214" x2="9529" y2="10906"/>
+                        <a14:backgroundMark x1="13777" y1="10753" x2="13318" y2="11214"/>
+                        <a14:backgroundMark x1="12400" y1="9524" x2="15844" y2="11367"/>
+                      </a14:backgroundRemoval>
+                    </a14:imgEffect>
+                  </a14:imgLayer>
+                </a14:imgProps>
+              </a:ext>
+              <a:ext uri="{28A0092B-C50C-407E-A947-70E740481C1C}">
+                <a14:useLocalDpi xmlns:a14="http://schemas.microsoft.com/office/drawing/2010/main" val="0"/>
+              </a:ext>
+            </a:extLst>
+          </a:blip>
+          <a:stretch>
+            <a:fillRect/>
+          </a:stretch>
+        </p:blipFill>
+        <p:spPr>
+          <a:xfrm>
+            <a:off x="2528991" y="1890515"/>
+            <a:ext cx="2781069" cy="2078617"/>
+          </a:xfrm>
+          <a:prstGeom prst="rect">
+            <a:avLst/>
+          </a:prstGeom>
+        </p:spPr>
+      </p:pic>
+      <p:sp>
+        <p:nvSpPr>
+          <p:cNvPr id="1050" name="Forma libre: forma 1049">
+            <a:extLst>
+              <a:ext uri="{FF2B5EF4-FFF2-40B4-BE49-F238E27FC236}">
+                <a16:creationId xmlns:a16="http://schemas.microsoft.com/office/drawing/2014/main" id="{FF89E453-61E1-5309-05E1-90C4480EF09E}"/>
+              </a:ext>
+            </a:extLst>
+          </p:cNvPr>
+          <p:cNvSpPr>
+            <a:spLocks/>
+          </p:cNvSpPr>
+          <p:nvPr/>
+        </p:nvSpPr>
+        <p:spPr>
+          <a:xfrm rot="10800000">
+            <a:off x="7522086" y="1281506"/>
+            <a:ext cx="438200" cy="2346196"/>
+          </a:xfrm>
+          <a:custGeom>
+            <a:avLst/>
+            <a:gdLst>
+              <a:gd name="connsiteX0" fmla="*/ 0 w 558101"/>
+              <a:gd name="connsiteY0" fmla="*/ 0 h 2370389"/>
+              <a:gd name="connsiteX1" fmla="*/ 457200 w 558101"/>
+              <a:gd name="connsiteY1" fmla="*/ 585787 h 2370389"/>
+              <a:gd name="connsiteX2" fmla="*/ 552450 w 558101"/>
+              <a:gd name="connsiteY2" fmla="*/ 1443037 h 2370389"/>
+              <a:gd name="connsiteX3" fmla="*/ 352425 w 558101"/>
+              <a:gd name="connsiteY3" fmla="*/ 2152650 h 2370389"/>
+              <a:gd name="connsiteX4" fmla="*/ 23813 w 558101"/>
+              <a:gd name="connsiteY4" fmla="*/ 2362200 h 2370389"/>
+            </a:gdLst>
+            <a:ahLst/>
+            <a:cxnLst>
+              <a:cxn ang="0">
+                <a:pos x="connsiteX0" y="connsiteY0"/>
+              </a:cxn>
+              <a:cxn ang="0">
+                <a:pos x="connsiteX1" y="connsiteY1"/>
+              </a:cxn>
+              <a:cxn ang="0">
+                <a:pos x="connsiteX2" y="connsiteY2"/>
+              </a:cxn>
+              <a:cxn ang="0">
+                <a:pos x="connsiteX3" y="connsiteY3"/>
+              </a:cxn>
+              <a:cxn ang="0">
+                <a:pos x="connsiteX4" y="connsiteY4"/>
+              </a:cxn>
+            </a:cxnLst>
+            <a:rect l="l" t="t" r="r" b="b"/>
+            <a:pathLst>
+              <a:path w="558101" h="2370389">
+                <a:moveTo>
+                  <a:pt x="0" y="0"/>
+                </a:moveTo>
+                <a:cubicBezTo>
+                  <a:pt x="182562" y="172640"/>
+                  <a:pt x="365125" y="345281"/>
+                  <a:pt x="457200" y="585787"/>
+                </a:cubicBezTo>
+                <a:cubicBezTo>
+                  <a:pt x="549275" y="826293"/>
+                  <a:pt x="569912" y="1181893"/>
+                  <a:pt x="552450" y="1443037"/>
+                </a:cubicBezTo>
+                <a:cubicBezTo>
+                  <a:pt x="534988" y="1704181"/>
+                  <a:pt x="440531" y="1999456"/>
+                  <a:pt x="352425" y="2152650"/>
+                </a:cubicBezTo>
+                <a:cubicBezTo>
+                  <a:pt x="264319" y="2305844"/>
+                  <a:pt x="74613" y="2399506"/>
+                  <a:pt x="23813" y="2362200"/>
+                </a:cubicBezTo>
+              </a:path>
+            </a:pathLst>
+          </a:custGeom>
+          <a:noFill/>
+          <a:ln w="28575">
+            <a:solidFill>
+              <a:srgbClr val="00B050"/>
+            </a:solidFill>
+          </a:ln>
+        </p:spPr>
+        <p:style>
+          <a:lnRef idx="2">
+            <a:schemeClr val="accent1">
+              <a:shade val="15000"/>
+            </a:schemeClr>
+          </a:lnRef>
+          <a:fillRef idx="1">
+            <a:schemeClr val="accent1"/>
+          </a:fillRef>
+          <a:effectRef idx="0">
+            <a:schemeClr val="accent1"/>
+          </a:effectRef>
+          <a:fontRef idx="minor">
+            <a:schemeClr val="lt1"/>
+          </a:fontRef>
+        </p:style>
+        <p:txBody>
+          <a:bodyPr rot="0" spcFirstLastPara="0" vertOverflow="overflow" horzOverflow="overflow" vert="horz" wrap="square" lIns="91440" tIns="45720" rIns="91440" bIns="45720" numCol="1" spcCol="0" rtlCol="0" fromWordArt="0" anchor="ctr" anchorCtr="0" forceAA="0" compatLnSpc="1">
+            <a:prstTxWarp prst="textNoShape">
+              <a:avLst/>
+            </a:prstTxWarp>
+            <a:noAutofit/>
+          </a:bodyPr>
+          <a:lstStyle/>
+          <a:p>
+            <a:pPr algn="ctr"/>
+            <a:endParaRPr lang="en-US"/>
+          </a:p>
+        </p:txBody>
+      </p:sp>
+      <p:sp>
+        <p:nvSpPr>
+          <p:cNvPr id="1049" name="Forma libre: forma 1048">
+            <a:extLst>
+              <a:ext uri="{FF2B5EF4-FFF2-40B4-BE49-F238E27FC236}">
+                <a16:creationId xmlns:a16="http://schemas.microsoft.com/office/drawing/2014/main" id="{CF22B226-E69F-29AD-0F81-D758E2AA9371}"/>
+              </a:ext>
+            </a:extLst>
+          </p:cNvPr>
+          <p:cNvSpPr>
+            <a:spLocks/>
+          </p:cNvSpPr>
+          <p:nvPr/>
+        </p:nvSpPr>
+        <p:spPr>
+          <a:xfrm>
+            <a:off x="7146106" y="1257681"/>
+            <a:ext cx="404304" cy="2346196"/>
+          </a:xfrm>
+          <a:custGeom>
+            <a:avLst/>
+            <a:gdLst>
+              <a:gd name="connsiteX0" fmla="*/ 0 w 558101"/>
+              <a:gd name="connsiteY0" fmla="*/ 0 h 2370389"/>
+              <a:gd name="connsiteX1" fmla="*/ 457200 w 558101"/>
+              <a:gd name="connsiteY1" fmla="*/ 585787 h 2370389"/>
+              <a:gd name="connsiteX2" fmla="*/ 552450 w 558101"/>
+              <a:gd name="connsiteY2" fmla="*/ 1443037 h 2370389"/>
+              <a:gd name="connsiteX3" fmla="*/ 352425 w 558101"/>
+              <a:gd name="connsiteY3" fmla="*/ 2152650 h 2370389"/>
+              <a:gd name="connsiteX4" fmla="*/ 23813 w 558101"/>
+              <a:gd name="connsiteY4" fmla="*/ 2362200 h 2370389"/>
+            </a:gdLst>
+            <a:ahLst/>
+            <a:cxnLst>
+              <a:cxn ang="0">
+                <a:pos x="connsiteX0" y="connsiteY0"/>
+              </a:cxn>
+              <a:cxn ang="0">
+                <a:pos x="connsiteX1" y="connsiteY1"/>
+              </a:cxn>
+              <a:cxn ang="0">
+                <a:pos x="connsiteX2" y="connsiteY2"/>
+              </a:cxn>
+              <a:cxn ang="0">
+                <a:pos x="connsiteX3" y="connsiteY3"/>
+              </a:cxn>
+              <a:cxn ang="0">
+                <a:pos x="connsiteX4" y="connsiteY4"/>
+              </a:cxn>
+            </a:cxnLst>
+            <a:rect l="l" t="t" r="r" b="b"/>
+            <a:pathLst>
+              <a:path w="558101" h="2370389">
+                <a:moveTo>
+                  <a:pt x="0" y="0"/>
+                </a:moveTo>
+                <a:cubicBezTo>
+                  <a:pt x="182562" y="172640"/>
+                  <a:pt x="365125" y="345281"/>
+                  <a:pt x="457200" y="585787"/>
+                </a:cubicBezTo>
+                <a:cubicBezTo>
+                  <a:pt x="549275" y="826293"/>
+                  <a:pt x="569912" y="1181893"/>
+                  <a:pt x="552450" y="1443037"/>
+                </a:cubicBezTo>
+                <a:cubicBezTo>
+                  <a:pt x="534988" y="1704181"/>
+                  <a:pt x="440531" y="1999456"/>
+                  <a:pt x="352425" y="2152650"/>
+                </a:cubicBezTo>
+                <a:cubicBezTo>
+                  <a:pt x="264319" y="2305844"/>
+                  <a:pt x="74613" y="2399506"/>
+                  <a:pt x="23813" y="2362200"/>
+                </a:cubicBezTo>
+              </a:path>
+            </a:pathLst>
+          </a:custGeom>
+          <a:noFill/>
+          <a:ln w="28575">
+            <a:solidFill>
+              <a:srgbClr val="00B050"/>
+            </a:solidFill>
+          </a:ln>
+        </p:spPr>
+        <p:style>
+          <a:lnRef idx="2">
+            <a:schemeClr val="accent1">
+              <a:shade val="15000"/>
+            </a:schemeClr>
+          </a:lnRef>
+          <a:fillRef idx="1">
+            <a:schemeClr val="accent1"/>
+          </a:fillRef>
+          <a:effectRef idx="0">
+            <a:schemeClr val="accent1"/>
+          </a:effectRef>
+          <a:fontRef idx="minor">
+            <a:schemeClr val="lt1"/>
+          </a:fontRef>
+        </p:style>
+        <p:txBody>
+          <a:bodyPr rot="0" spcFirstLastPara="0" vertOverflow="overflow" horzOverflow="overflow" vert="horz" wrap="square" lIns="91440" tIns="45720" rIns="91440" bIns="45720" numCol="1" spcCol="0" rtlCol="0" fromWordArt="0" anchor="ctr" anchorCtr="0" forceAA="0" compatLnSpc="1">
+            <a:prstTxWarp prst="textNoShape">
+              <a:avLst/>
+            </a:prstTxWarp>
+            <a:noAutofit/>
+          </a:bodyPr>
+          <a:lstStyle/>
+          <a:p>
+            <a:pPr algn="ctr"/>
+            <a:endParaRPr lang="en-US"/>
+          </a:p>
+        </p:txBody>
+      </p:sp>
+      <p:sp>
+        <p:nvSpPr>
+          <p:cNvPr id="4" name="AutoShape 4">
+            <a:extLst>
+              <a:ext uri="{FF2B5EF4-FFF2-40B4-BE49-F238E27FC236}">
+                <a16:creationId xmlns:a16="http://schemas.microsoft.com/office/drawing/2014/main" id="{20C0EFE7-2FF8-1D99-FFB6-64066BEE951E}"/>
+              </a:ext>
+            </a:extLst>
+          </p:cNvPr>
+          <p:cNvSpPr>
+            <a:spLocks noChangeAspect="1"/>
+          </p:cNvSpPr>
+          <p:nvPr/>
+        </p:nvSpPr>
+        <p:spPr bwMode="auto">
+          <a:xfrm>
+            <a:off x="5943600" y="3276600"/>
+            <a:ext cx="304800" cy="304800"/>
+          </a:xfrm>
+          <a:prstGeom prst="rect">
+            <a:avLst/>
+          </a:prstGeom>
+          <a:noFill/>
+          <a:extLst>
+            <a:ext uri="{909E8E84-426E-40DD-AFC4-6F175D3DCCD1}">
+              <a14:hiddenFill xmlns:a14="http://schemas.microsoft.com/office/drawing/2010/main">
+                <a:solidFill>
+                  <a:srgbClr val="FFFFFF"/>
+                </a:solidFill>
+              </a14:hiddenFill>
+            </a:ext>
+          </a:extLst>
+        </p:spPr>
+        <p:txBody>
+          <a:bodyPr vert="horz" wrap="square" lIns="91440" tIns="45720" rIns="91440" bIns="45720" numCol="1" anchor="t" anchorCtr="0" compatLnSpc="1">
+            <a:prstTxWarp prst="textNoShape">
+              <a:avLst/>
+            </a:prstTxWarp>
+          </a:bodyPr>
+          <a:lstStyle/>
+          <a:p>
+            <a:endParaRPr lang="en-US"/>
+          </a:p>
+        </p:txBody>
+      </p:sp>
+      <p:sp>
+        <p:nvSpPr>
+          <p:cNvPr id="7" name="Elipse 6">
+            <a:extLst>
+              <a:ext uri="{FF2B5EF4-FFF2-40B4-BE49-F238E27FC236}">
+                <a16:creationId xmlns:a16="http://schemas.microsoft.com/office/drawing/2014/main" id="{8FA0D014-51AB-758E-5E67-C0FAC7AEF4DD}"/>
+              </a:ext>
+            </a:extLst>
+          </p:cNvPr>
+          <p:cNvSpPr/>
+          <p:nvPr/>
+        </p:nvSpPr>
+        <p:spPr>
+          <a:xfrm rot="19923087">
+            <a:off x="3301690" y="1286094"/>
+            <a:ext cx="6097462" cy="4048424"/>
+          </a:xfrm>
+          <a:prstGeom prst="ellipse">
+            <a:avLst/>
+          </a:prstGeom>
+          <a:noFill/>
+          <a:ln w="38100">
+            <a:solidFill>
+              <a:schemeClr val="tx1"/>
+            </a:solidFill>
+            <a:prstDash val="dash"/>
+          </a:ln>
+        </p:spPr>
+        <p:style>
+          <a:lnRef idx="2">
+            <a:schemeClr val="accent1">
+              <a:shade val="15000"/>
+            </a:schemeClr>
+          </a:lnRef>
+          <a:fillRef idx="1">
+            <a:schemeClr val="accent1"/>
+          </a:fillRef>
+          <a:effectRef idx="0">
+            <a:schemeClr val="accent1"/>
+          </a:effectRef>
+          <a:fontRef idx="minor">
+            <a:schemeClr val="lt1"/>
+          </a:fontRef>
+        </p:style>
+        <p:txBody>
+          <a:bodyPr rtlCol="0" anchor="ctr"/>
+          <a:lstStyle/>
+          <a:p>
+            <a:pPr algn="ctr"/>
+            <a:endParaRPr lang="en-US"/>
+          </a:p>
+        </p:txBody>
+      </p:sp>
+      <p:cxnSp>
+        <p:nvCxnSpPr>
+          <p:cNvPr id="10" name="Conector recto 9">
+            <a:extLst>
+              <a:ext uri="{FF2B5EF4-FFF2-40B4-BE49-F238E27FC236}">
+                <a16:creationId xmlns:a16="http://schemas.microsoft.com/office/drawing/2014/main" id="{59CE1A1D-FD87-A8A2-F557-3C20E1E2CB1A}"/>
+              </a:ext>
+            </a:extLst>
+          </p:cNvPr>
+          <p:cNvCxnSpPr>
+            <a:cxnSpLocks/>
+          </p:cNvCxnSpPr>
+          <p:nvPr/>
+        </p:nvCxnSpPr>
+        <p:spPr>
+          <a:xfrm flipH="1">
+            <a:off x="2640054" y="2874480"/>
+            <a:ext cx="1271645" cy="637549"/>
+          </a:xfrm>
+          <a:prstGeom prst="line">
+            <a:avLst/>
+          </a:prstGeom>
+          <a:ln w="57150" cap="flat" cmpd="sng" algn="ctr">
+            <a:solidFill>
+              <a:schemeClr val="accent1"/>
+            </a:solidFill>
+            <a:prstDash val="solid"/>
+            <a:round/>
+            <a:headEnd type="none" w="med" len="med"/>
+            <a:tailEnd type="arrow" w="med" len="med"/>
+          </a:ln>
+        </p:spPr>
+        <p:style>
+          <a:lnRef idx="0">
+            <a:scrgbClr r="0" g="0" b="0"/>
+          </a:lnRef>
+          <a:fillRef idx="0">
+            <a:scrgbClr r="0" g="0" b="0"/>
+          </a:fillRef>
+          <a:effectRef idx="0">
+            <a:scrgbClr r="0" g="0" b="0"/>
+          </a:effectRef>
+          <a:fontRef idx="minor">
+            <a:schemeClr val="tx1"/>
+          </a:fontRef>
+        </p:style>
+      </p:cxnSp>
+      <p:cxnSp>
+        <p:nvCxnSpPr>
+          <p:cNvPr id="12" name="Conector recto 11">
+            <a:extLst>
+              <a:ext uri="{FF2B5EF4-FFF2-40B4-BE49-F238E27FC236}">
+                <a16:creationId xmlns:a16="http://schemas.microsoft.com/office/drawing/2014/main" id="{13AD8F66-ED8C-D8A4-7DB0-99524AD7DBA5}"/>
+              </a:ext>
+            </a:extLst>
+          </p:cNvPr>
+          <p:cNvCxnSpPr>
+            <a:cxnSpLocks/>
+          </p:cNvCxnSpPr>
+          <p:nvPr/>
+        </p:nvCxnSpPr>
+        <p:spPr>
+          <a:xfrm>
+            <a:off x="3894059" y="2893586"/>
+            <a:ext cx="1423891" cy="610820"/>
+          </a:xfrm>
+          <a:prstGeom prst="line">
+            <a:avLst/>
+          </a:prstGeom>
+          <a:ln w="57150" cap="flat" cmpd="sng" algn="ctr">
+            <a:solidFill>
+              <a:schemeClr val="accent1"/>
+            </a:solidFill>
+            <a:prstDash val="solid"/>
+            <a:round/>
+            <a:headEnd type="none" w="med" len="med"/>
+            <a:tailEnd type="arrow" w="med" len="med"/>
+          </a:ln>
+        </p:spPr>
+        <p:style>
+          <a:lnRef idx="0">
+            <a:scrgbClr r="0" g="0" b="0"/>
+          </a:lnRef>
+          <a:fillRef idx="0">
+            <a:scrgbClr r="0" g="0" b="0"/>
+          </a:fillRef>
+          <a:effectRef idx="0">
+            <a:scrgbClr r="0" g="0" b="0"/>
+          </a:effectRef>
+          <a:fontRef idx="minor">
+            <a:schemeClr val="tx1"/>
+          </a:fontRef>
+        </p:style>
+      </p:cxnSp>
+      <mc:AlternateContent xmlns:mc="http://schemas.openxmlformats.org/markup-compatibility/2006" xmlns:a14="http://schemas.microsoft.com/office/drawing/2010/main">
+        <mc:Choice Requires="a14">
+          <p:sp>
+            <p:nvSpPr>
+              <p:cNvPr id="16" name="CuadroTexto 15">
+                <a:extLst>
+                  <a:ext uri="{FF2B5EF4-FFF2-40B4-BE49-F238E27FC236}">
+                    <a16:creationId xmlns:a16="http://schemas.microsoft.com/office/drawing/2014/main" id="{4A6CF06C-457C-20F3-4833-DE32A8091C9E}"/>
+                  </a:ext>
+                </a:extLst>
+              </p:cNvPr>
+              <p:cNvSpPr txBox="1"/>
+              <p:nvPr/>
+            </p:nvSpPr>
+            <p:spPr>
+              <a:xfrm>
+                <a:off x="5297914" y="3556920"/>
+                <a:ext cx="448456" cy="288797"/>
+              </a:xfrm>
+              <a:prstGeom prst="rect">
+                <a:avLst/>
+              </a:prstGeom>
+              <a:noFill/>
+            </p:spPr>
+            <p:txBody>
+              <a:bodyPr wrap="none" lIns="0" tIns="0" rIns="0" bIns="0" rtlCol="0">
+                <a:spAutoFit/>
+              </a:bodyPr>
+              <a:lstStyle/>
+              <a:p>
+                <a:pPr/>
+                <a14:m>
+                  <m:oMathPara xmlns:m="http://schemas.openxmlformats.org/officeDocument/2006/math">
+                    <m:oMathParaPr>
+                      <m:jc m:val="centerGroup"/>
+                    </m:oMathParaPr>
+                    <m:oMath xmlns:m="http://schemas.openxmlformats.org/officeDocument/2006/math">
+                      <m:sSup>
+                        <m:sSupPr>
+                          <m:ctrlPr>
+                            <a:rPr lang="es-ES" b="0" i="1" smtClean="0">
+                              <a:latin typeface="Cambria Math" panose="02040503050406030204" pitchFamily="18" charset="0"/>
+                            </a:rPr>
+                          </m:ctrlPr>
+                        </m:sSupPr>
+                        <m:e>
+                          <m:r>
+                            <a:rPr lang="es-ES" b="0" i="1" smtClean="0">
+                              <a:latin typeface="Cambria Math" panose="02040503050406030204" pitchFamily="18" charset="0"/>
+                            </a:rPr>
+                            <m:t>𝑌</m:t>
+                          </m:r>
+                        </m:e>
+                        <m:sup>
+                          <m:r>
+                            <a:rPr lang="es-ES" b="0" i="1" smtClean="0">
+                              <a:latin typeface="Cambria Math" panose="02040503050406030204" pitchFamily="18" charset="0"/>
+                            </a:rPr>
+                            <m:t>[</m:t>
+                          </m:r>
+                          <m:r>
+                            <a:rPr lang="es-ES" b="0" i="1" smtClean="0">
+                              <a:latin typeface="Cambria Math" panose="02040503050406030204" pitchFamily="18" charset="0"/>
+                            </a:rPr>
+                            <m:t>𝐵</m:t>
+                          </m:r>
+                          <m:r>
+                            <a:rPr lang="es-ES" b="0" i="1" smtClean="0">
+                              <a:latin typeface="Cambria Math" panose="02040503050406030204" pitchFamily="18" charset="0"/>
+                            </a:rPr>
+                            <m:t>]</m:t>
+                          </m:r>
+                        </m:sup>
+                      </m:sSup>
+                    </m:oMath>
+                  </m:oMathPara>
+                </a14:m>
+                <a:endParaRPr lang="en-US" dirty="0"/>
+              </a:p>
+            </p:txBody>
+          </p:sp>
+        </mc:Choice>
+        <mc:Fallback xmlns="">
+          <p:sp>
+            <p:nvSpPr>
+              <p:cNvPr id="16" name="CuadroTexto 15">
+                <a:extLst>
+                  <a:ext uri="{FF2B5EF4-FFF2-40B4-BE49-F238E27FC236}">
+                    <a16:creationId xmlns:a16="http://schemas.microsoft.com/office/drawing/2014/main" id="{4A6CF06C-457C-20F3-4833-DE32A8091C9E}"/>
+                  </a:ext>
+                </a:extLst>
+              </p:cNvPr>
+              <p:cNvSpPr txBox="1">
+                <a:spLocks noRot="1" noChangeAspect="1" noMove="1" noResize="1" noEditPoints="1" noAdjustHandles="1" noChangeArrowheads="1" noChangeShapeType="1" noTextEdit="1"/>
+              </p:cNvSpPr>
+              <p:nvPr/>
+            </p:nvSpPr>
+            <p:spPr>
+              <a:xfrm>
+                <a:off x="5297914" y="3556920"/>
+                <a:ext cx="448456" cy="288797"/>
+              </a:xfrm>
+              <a:prstGeom prst="rect">
+                <a:avLst/>
+              </a:prstGeom>
+              <a:blipFill>
+                <a:blip r:embed="rId4"/>
+                <a:stretch>
+                  <a:fillRect l="-10811" t="-8333" r="-10811" b="-6250"/>
+                </a:stretch>
+              </a:blipFill>
+            </p:spPr>
+            <p:txBody>
+              <a:bodyPr/>
+              <a:lstStyle/>
+              <a:p>
+                <a:r>
+                  <a:rPr lang="en-US">
+                    <a:noFill/>
+                  </a:rPr>
+                  <a:t> </a:t>
+                </a:r>
+              </a:p>
+            </p:txBody>
+          </p:sp>
+        </mc:Fallback>
+      </mc:AlternateContent>
+      <mc:AlternateContent xmlns:mc="http://schemas.openxmlformats.org/markup-compatibility/2006" xmlns:a14="http://schemas.microsoft.com/office/drawing/2010/main">
+        <mc:Choice Requires="a14">
+          <p:sp>
+            <p:nvSpPr>
+              <p:cNvPr id="19" name="CuadroTexto 18">
+                <a:extLst>
+                  <a:ext uri="{FF2B5EF4-FFF2-40B4-BE49-F238E27FC236}">
+                    <a16:creationId xmlns:a16="http://schemas.microsoft.com/office/drawing/2014/main" id="{12A473B7-970D-0261-21FE-0240FEF2684E}"/>
+                  </a:ext>
+                </a:extLst>
+              </p:cNvPr>
+              <p:cNvSpPr txBox="1"/>
+              <p:nvPr/>
+            </p:nvSpPr>
+            <p:spPr>
+              <a:xfrm>
+                <a:off x="2266334" y="3491522"/>
+                <a:ext cx="459485" cy="288797"/>
+              </a:xfrm>
+              <a:prstGeom prst="rect">
+                <a:avLst/>
+              </a:prstGeom>
+              <a:noFill/>
+            </p:spPr>
+            <p:txBody>
+              <a:bodyPr wrap="none" lIns="0" tIns="0" rIns="0" bIns="0" rtlCol="0">
+                <a:spAutoFit/>
+              </a:bodyPr>
+              <a:lstStyle/>
+              <a:p>
+                <a:pPr/>
+                <a14:m>
+                  <m:oMathPara xmlns:m="http://schemas.openxmlformats.org/officeDocument/2006/math">
+                    <m:oMathParaPr>
+                      <m:jc m:val="centerGroup"/>
+                    </m:oMathParaPr>
+                    <m:oMath xmlns:m="http://schemas.openxmlformats.org/officeDocument/2006/math">
+                      <m:sSup>
+                        <m:sSupPr>
+                          <m:ctrlPr>
+                            <a:rPr lang="es-ES" b="0" i="1" smtClean="0">
+                              <a:latin typeface="Cambria Math" panose="02040503050406030204" pitchFamily="18" charset="0"/>
+                            </a:rPr>
+                          </m:ctrlPr>
+                        </m:sSupPr>
+                        <m:e>
+                          <m:r>
+                            <a:rPr lang="es-ES" b="0" i="1" smtClean="0">
+                              <a:latin typeface="Cambria Math" panose="02040503050406030204" pitchFamily="18" charset="0"/>
+                            </a:rPr>
+                            <m:t>𝑋</m:t>
+                          </m:r>
+                        </m:e>
+                        <m:sup>
+                          <m:r>
+                            <a:rPr lang="es-ES" b="0" i="1" smtClean="0">
+                              <a:latin typeface="Cambria Math" panose="02040503050406030204" pitchFamily="18" charset="0"/>
+                            </a:rPr>
+                            <m:t>[</m:t>
+                          </m:r>
+                          <m:r>
+                            <a:rPr lang="es-ES" b="0" i="1" smtClean="0">
+                              <a:latin typeface="Cambria Math" panose="02040503050406030204" pitchFamily="18" charset="0"/>
+                            </a:rPr>
+                            <m:t>𝐵</m:t>
+                          </m:r>
+                          <m:r>
+                            <a:rPr lang="es-ES" b="0" i="1" smtClean="0">
+                              <a:latin typeface="Cambria Math" panose="02040503050406030204" pitchFamily="18" charset="0"/>
+                            </a:rPr>
+                            <m:t>]</m:t>
+                          </m:r>
+                        </m:sup>
+                      </m:sSup>
+                    </m:oMath>
+                  </m:oMathPara>
+                </a14:m>
+                <a:endParaRPr lang="en-US" dirty="0"/>
+              </a:p>
+            </p:txBody>
+          </p:sp>
+        </mc:Choice>
+        <mc:Fallback xmlns="">
+          <p:sp>
+            <p:nvSpPr>
+              <p:cNvPr id="19" name="CuadroTexto 18">
+                <a:extLst>
+                  <a:ext uri="{FF2B5EF4-FFF2-40B4-BE49-F238E27FC236}">
+                    <a16:creationId xmlns:a16="http://schemas.microsoft.com/office/drawing/2014/main" id="{12A473B7-970D-0261-21FE-0240FEF2684E}"/>
+                  </a:ext>
+                </a:extLst>
+              </p:cNvPr>
+              <p:cNvSpPr txBox="1">
+                <a:spLocks noRot="1" noChangeAspect="1" noMove="1" noResize="1" noEditPoints="1" noAdjustHandles="1" noChangeArrowheads="1" noChangeShapeType="1" noTextEdit="1"/>
+              </p:cNvSpPr>
+              <p:nvPr/>
+            </p:nvSpPr>
+            <p:spPr>
+              <a:xfrm>
+                <a:off x="2266334" y="3491522"/>
+                <a:ext cx="459485" cy="288797"/>
+              </a:xfrm>
+              <a:prstGeom prst="rect">
+                <a:avLst/>
+              </a:prstGeom>
+              <a:blipFill>
+                <a:blip r:embed="rId5"/>
+                <a:stretch>
+                  <a:fillRect l="-12000" t="-8511" r="-10667" b="-6383"/>
+                </a:stretch>
+              </a:blipFill>
+            </p:spPr>
+            <p:txBody>
+              <a:bodyPr/>
+              <a:lstStyle/>
+              <a:p>
+                <a:r>
+                  <a:rPr lang="en-US">
+                    <a:noFill/>
+                  </a:rPr>
+                  <a:t> </a:t>
+                </a:r>
+              </a:p>
+            </p:txBody>
+          </p:sp>
+        </mc:Fallback>
+      </mc:AlternateContent>
+      <mc:AlternateContent xmlns:mc="http://schemas.openxmlformats.org/markup-compatibility/2006" xmlns:a14="http://schemas.microsoft.com/office/drawing/2010/main">
+        <mc:Choice Requires="a14">
+          <p:sp>
+            <p:nvSpPr>
+              <p:cNvPr id="20" name="CuadroTexto 19">
+                <a:extLst>
+                  <a:ext uri="{FF2B5EF4-FFF2-40B4-BE49-F238E27FC236}">
+                    <a16:creationId xmlns:a16="http://schemas.microsoft.com/office/drawing/2014/main" id="{121E320F-591C-8770-0731-8502C261FB05}"/>
+                  </a:ext>
+                </a:extLst>
+              </p:cNvPr>
+              <p:cNvSpPr txBox="1"/>
+              <p:nvPr/>
+            </p:nvSpPr>
+            <p:spPr>
+              <a:xfrm>
+                <a:off x="4031967" y="1326608"/>
+                <a:ext cx="445250" cy="288797"/>
+              </a:xfrm>
+              <a:prstGeom prst="rect">
+                <a:avLst/>
+              </a:prstGeom>
+              <a:noFill/>
+            </p:spPr>
+            <p:txBody>
+              <a:bodyPr wrap="none" lIns="0" tIns="0" rIns="0" bIns="0" rtlCol="0">
+                <a:spAutoFit/>
+              </a:bodyPr>
+              <a:lstStyle/>
+              <a:p>
+                <a:pPr/>
+                <a14:m>
+                  <m:oMathPara xmlns:m="http://schemas.openxmlformats.org/officeDocument/2006/math">
+                    <m:oMathParaPr>
+                      <m:jc m:val="centerGroup"/>
+                    </m:oMathParaPr>
+                    <m:oMath xmlns:m="http://schemas.openxmlformats.org/officeDocument/2006/math">
+                      <m:sSup>
+                        <m:sSupPr>
+                          <m:ctrlPr>
+                            <a:rPr lang="es-ES" b="0" i="1" smtClean="0">
+                              <a:latin typeface="Cambria Math" panose="02040503050406030204" pitchFamily="18" charset="0"/>
+                            </a:rPr>
+                          </m:ctrlPr>
+                        </m:sSupPr>
+                        <m:e>
+                          <m:r>
+                            <a:rPr lang="es-ES" b="0" i="1" smtClean="0">
+                              <a:latin typeface="Cambria Math" panose="02040503050406030204" pitchFamily="18" charset="0"/>
+                            </a:rPr>
+                            <m:t>𝑍</m:t>
+                          </m:r>
+                        </m:e>
+                        <m:sup>
+                          <m:r>
+                            <a:rPr lang="es-ES" b="0" i="1" smtClean="0">
+                              <a:latin typeface="Cambria Math" panose="02040503050406030204" pitchFamily="18" charset="0"/>
+                            </a:rPr>
+                            <m:t>[</m:t>
+                          </m:r>
+                          <m:r>
+                            <a:rPr lang="es-ES" b="0" i="1" smtClean="0">
+                              <a:latin typeface="Cambria Math" panose="02040503050406030204" pitchFamily="18" charset="0"/>
+                            </a:rPr>
+                            <m:t>𝐵</m:t>
+                          </m:r>
+                          <m:r>
+                            <a:rPr lang="es-ES" b="0" i="1" smtClean="0">
+                              <a:latin typeface="Cambria Math" panose="02040503050406030204" pitchFamily="18" charset="0"/>
+                            </a:rPr>
+                            <m:t>]</m:t>
+                          </m:r>
+                        </m:sup>
+                      </m:sSup>
+                    </m:oMath>
+                  </m:oMathPara>
+                </a14:m>
+                <a:endParaRPr lang="en-US" dirty="0"/>
+              </a:p>
+            </p:txBody>
+          </p:sp>
+        </mc:Choice>
+        <mc:Fallback xmlns="">
+          <p:sp>
+            <p:nvSpPr>
+              <p:cNvPr id="20" name="CuadroTexto 19">
+                <a:extLst>
+                  <a:ext uri="{FF2B5EF4-FFF2-40B4-BE49-F238E27FC236}">
+                    <a16:creationId xmlns:a16="http://schemas.microsoft.com/office/drawing/2014/main" id="{121E320F-591C-8770-0731-8502C261FB05}"/>
+                  </a:ext>
+                </a:extLst>
+              </p:cNvPr>
+              <p:cNvSpPr txBox="1">
+                <a:spLocks noRot="1" noChangeAspect="1" noMove="1" noResize="1" noEditPoints="1" noAdjustHandles="1" noChangeArrowheads="1" noChangeShapeType="1" noTextEdit="1"/>
+              </p:cNvSpPr>
+              <p:nvPr/>
+            </p:nvSpPr>
+            <p:spPr>
+              <a:xfrm>
+                <a:off x="4031967" y="1326608"/>
+                <a:ext cx="445250" cy="288797"/>
+              </a:xfrm>
+              <a:prstGeom prst="rect">
+                <a:avLst/>
+              </a:prstGeom>
+              <a:blipFill>
+                <a:blip r:embed="rId6"/>
+                <a:stretch>
+                  <a:fillRect l="-10959" t="-8511" r="-10959" b="-6383"/>
+                </a:stretch>
+              </a:blipFill>
+            </p:spPr>
+            <p:txBody>
+              <a:bodyPr/>
+              <a:lstStyle/>
+              <a:p>
+                <a:r>
+                  <a:rPr lang="en-US">
+                    <a:noFill/>
+                  </a:rPr>
+                  <a:t> </a:t>
+                </a:r>
+              </a:p>
+            </p:txBody>
+          </p:sp>
+        </mc:Fallback>
+      </mc:AlternateContent>
+      <p:sp>
+        <p:nvSpPr>
+          <p:cNvPr id="21" name="Rectángulo 20">
+            <a:extLst>
+              <a:ext uri="{FF2B5EF4-FFF2-40B4-BE49-F238E27FC236}">
+                <a16:creationId xmlns:a16="http://schemas.microsoft.com/office/drawing/2014/main" id="{FAD1BB8D-5B8A-FB59-9255-7F476F222D65}"/>
+              </a:ext>
+            </a:extLst>
+          </p:cNvPr>
+          <p:cNvSpPr/>
+          <p:nvPr/>
+        </p:nvSpPr>
+        <p:spPr>
+          <a:xfrm>
+            <a:off x="3576638" y="2614613"/>
+            <a:ext cx="762000" cy="385762"/>
+          </a:xfrm>
+          <a:prstGeom prst="rect">
+            <a:avLst/>
+          </a:prstGeom>
+          <a:noFill/>
+          <a:ln w="19050">
+            <a:solidFill>
+              <a:srgbClr val="FF0000"/>
+            </a:solidFill>
+            <a:prstDash val="lgDash"/>
+          </a:ln>
+        </p:spPr>
+        <p:style>
+          <a:lnRef idx="2">
+            <a:schemeClr val="accent1">
+              <a:shade val="15000"/>
+            </a:schemeClr>
+          </a:lnRef>
+          <a:fillRef idx="1">
+            <a:schemeClr val="accent1"/>
+          </a:fillRef>
+          <a:effectRef idx="0">
+            <a:schemeClr val="accent1"/>
+          </a:effectRef>
+          <a:fontRef idx="minor">
+            <a:schemeClr val="lt1"/>
+          </a:fontRef>
+        </p:style>
+        <p:txBody>
+          <a:bodyPr rtlCol="0" anchor="ctr"/>
+          <a:lstStyle/>
+          <a:p>
+            <a:pPr algn="ctr"/>
+            <a:endParaRPr lang="en-US"/>
+          </a:p>
+        </p:txBody>
+      </p:sp>
+      <p:sp>
+        <p:nvSpPr>
+          <p:cNvPr id="22" name="Rectángulo 21">
+            <a:extLst>
+              <a:ext uri="{FF2B5EF4-FFF2-40B4-BE49-F238E27FC236}">
+                <a16:creationId xmlns:a16="http://schemas.microsoft.com/office/drawing/2014/main" id="{9CD95D21-5694-F587-4051-F5009511B577}"/>
+              </a:ext>
+            </a:extLst>
+          </p:cNvPr>
+          <p:cNvSpPr/>
+          <p:nvPr/>
+        </p:nvSpPr>
+        <p:spPr>
+          <a:xfrm>
+            <a:off x="3242524" y="3262778"/>
+            <a:ext cx="762000" cy="385762"/>
+          </a:xfrm>
+          <a:prstGeom prst="rect">
+            <a:avLst/>
+          </a:prstGeom>
+          <a:noFill/>
+          <a:ln w="19050">
+            <a:solidFill>
+              <a:srgbClr val="FF0000"/>
+            </a:solidFill>
+            <a:prstDash val="lgDash"/>
+          </a:ln>
+        </p:spPr>
+        <p:style>
+          <a:lnRef idx="2">
+            <a:schemeClr val="accent1">
+              <a:shade val="15000"/>
+            </a:schemeClr>
+          </a:lnRef>
+          <a:fillRef idx="1">
+            <a:schemeClr val="accent1"/>
+          </a:fillRef>
+          <a:effectRef idx="0">
+            <a:schemeClr val="accent1"/>
+          </a:effectRef>
+          <a:fontRef idx="minor">
+            <a:schemeClr val="lt1"/>
+          </a:fontRef>
+        </p:style>
+        <p:txBody>
+          <a:bodyPr rtlCol="0" anchor="ctr"/>
+          <a:lstStyle/>
+          <a:p>
+            <a:pPr algn="ctr"/>
+            <a:endParaRPr lang="en-US"/>
+          </a:p>
+        </p:txBody>
+      </p:sp>
+      <mc:AlternateContent xmlns:mc="http://schemas.openxmlformats.org/markup-compatibility/2006" xmlns:a14="http://schemas.microsoft.com/office/drawing/2010/main">
+        <mc:Choice Requires="a14">
+          <p:sp>
+            <p:nvSpPr>
+              <p:cNvPr id="23" name="CuadroTexto 22">
+                <a:extLst>
+                  <a:ext uri="{FF2B5EF4-FFF2-40B4-BE49-F238E27FC236}">
+                    <a16:creationId xmlns:a16="http://schemas.microsoft.com/office/drawing/2014/main" id="{14BF393F-7011-5BDF-FFDC-8C3DFA989FB0}"/>
+                  </a:ext>
+                </a:extLst>
+              </p:cNvPr>
+              <p:cNvSpPr txBox="1"/>
+              <p:nvPr/>
+            </p:nvSpPr>
+            <p:spPr>
+              <a:xfrm>
+                <a:off x="2046668" y="1877404"/>
+                <a:ext cx="1816395" cy="215444"/>
+              </a:xfrm>
+              <a:prstGeom prst="rect">
+                <a:avLst/>
+              </a:prstGeom>
+              <a:noFill/>
+            </p:spPr>
+            <p:txBody>
+              <a:bodyPr wrap="none" lIns="0" tIns="0" rIns="0" bIns="0" rtlCol="0">
+                <a:spAutoFit/>
+              </a:bodyPr>
+              <a:lstStyle/>
+              <a:p>
+                <a:pPr/>
+                <a14:m>
+                  <m:oMathPara xmlns:m="http://schemas.openxmlformats.org/officeDocument/2006/math">
+                    <m:oMathParaPr>
+                      <m:jc m:val="centerGroup"/>
+                    </m:oMathParaPr>
+                    <m:oMath xmlns:m="http://schemas.openxmlformats.org/officeDocument/2006/math">
+                      <m:r>
+                        <a:rPr lang="es-ES" sz="1400" b="0" i="1" smtClean="0">
+                          <a:solidFill>
+                            <a:srgbClr val="FF0000"/>
+                          </a:solidFill>
+                          <a:latin typeface="Cambria Math" panose="02040503050406030204" pitchFamily="18" charset="0"/>
+                        </a:rPr>
+                        <m:t>𝑅𝑢𝑒𝑑𝑎</m:t>
+                      </m:r>
+                      <m:r>
+                        <a:rPr lang="es-ES" sz="1400" b="0" i="1" smtClean="0">
+                          <a:solidFill>
+                            <a:srgbClr val="FF0000"/>
+                          </a:solidFill>
+                          <a:latin typeface="Cambria Math" panose="02040503050406030204" pitchFamily="18" charset="0"/>
+                        </a:rPr>
+                        <m:t> </m:t>
+                      </m:r>
+                      <m:r>
+                        <a:rPr lang="es-ES" sz="1400" b="0" i="1" smtClean="0">
+                          <a:solidFill>
+                            <a:srgbClr val="FF0000"/>
+                          </a:solidFill>
+                          <a:latin typeface="Cambria Math" panose="02040503050406030204" pitchFamily="18" charset="0"/>
+                        </a:rPr>
+                        <m:t>𝑑𝑒</m:t>
+                      </m:r>
+                      <m:r>
+                        <a:rPr lang="es-ES" sz="1400" b="0" i="1" smtClean="0">
+                          <a:solidFill>
+                            <a:srgbClr val="FF0000"/>
+                          </a:solidFill>
+                          <a:latin typeface="Cambria Math" panose="02040503050406030204" pitchFamily="18" charset="0"/>
+                        </a:rPr>
+                        <m:t> </m:t>
+                      </m:r>
+                      <m:r>
+                        <a:rPr lang="es-ES" sz="1400" b="0" i="1" smtClean="0">
+                          <a:solidFill>
+                            <a:srgbClr val="FF0000"/>
+                          </a:solidFill>
+                          <a:latin typeface="Cambria Math" panose="02040503050406030204" pitchFamily="18" charset="0"/>
+                        </a:rPr>
+                        <m:t>𝑟𝑒𝑎𝑐𝑐𝑖</m:t>
+                      </m:r>
+                      <m:r>
+                        <a:rPr lang="es-ES" sz="1400" b="0" i="1" smtClean="0">
+                          <a:solidFill>
+                            <a:srgbClr val="FF0000"/>
+                          </a:solidFill>
+                          <a:latin typeface="Cambria Math" panose="02040503050406030204" pitchFamily="18" charset="0"/>
+                        </a:rPr>
+                        <m:t>ó</m:t>
+                      </m:r>
+                      <m:r>
+                        <a:rPr lang="es-ES" sz="1400" b="0" i="1" smtClean="0">
+                          <a:solidFill>
+                            <a:srgbClr val="FF0000"/>
+                          </a:solidFill>
+                          <a:latin typeface="Cambria Math" panose="02040503050406030204" pitchFamily="18" charset="0"/>
+                        </a:rPr>
+                        <m:t>𝑛</m:t>
+                      </m:r>
+                      <m:r>
+                        <a:rPr lang="es-ES" sz="1400" b="0" i="1" smtClean="0">
+                          <a:solidFill>
+                            <a:srgbClr val="FF0000"/>
+                          </a:solidFill>
+                          <a:latin typeface="Cambria Math" panose="02040503050406030204" pitchFamily="18" charset="0"/>
+                        </a:rPr>
+                        <m:t> (1)</m:t>
+                      </m:r>
+                    </m:oMath>
+                  </m:oMathPara>
+                </a14:m>
+                <a:endParaRPr lang="en-US" sz="1400" dirty="0">
+                  <a:solidFill>
+                    <a:srgbClr val="FF0000"/>
+                  </a:solidFill>
+                </a:endParaRPr>
+              </a:p>
+            </p:txBody>
+          </p:sp>
+        </mc:Choice>
+        <mc:Fallback xmlns="">
+          <p:sp>
+            <p:nvSpPr>
+              <p:cNvPr id="23" name="CuadroTexto 22">
+                <a:extLst>
+                  <a:ext uri="{FF2B5EF4-FFF2-40B4-BE49-F238E27FC236}">
+                    <a16:creationId xmlns:a16="http://schemas.microsoft.com/office/drawing/2014/main" id="{14BF393F-7011-5BDF-FFDC-8C3DFA989FB0}"/>
+                  </a:ext>
+                </a:extLst>
+              </p:cNvPr>
+              <p:cNvSpPr txBox="1">
+                <a:spLocks noRot="1" noChangeAspect="1" noMove="1" noResize="1" noEditPoints="1" noAdjustHandles="1" noChangeArrowheads="1" noChangeShapeType="1" noTextEdit="1"/>
+              </p:cNvSpPr>
+              <p:nvPr/>
+            </p:nvSpPr>
+            <p:spPr>
+              <a:xfrm>
+                <a:off x="2046668" y="1877404"/>
+                <a:ext cx="1816395" cy="215444"/>
+              </a:xfrm>
+              <a:prstGeom prst="rect">
+                <a:avLst/>
+              </a:prstGeom>
+              <a:blipFill>
+                <a:blip r:embed="rId7"/>
+                <a:stretch>
+                  <a:fillRect l="-2013" r="-2685" b="-31429"/>
+                </a:stretch>
+              </a:blipFill>
+            </p:spPr>
+            <p:txBody>
+              <a:bodyPr/>
+              <a:lstStyle/>
+              <a:p>
+                <a:r>
+                  <a:rPr lang="en-US">
+                    <a:noFill/>
+                  </a:rPr>
+                  <a:t> </a:t>
+                </a:r>
+              </a:p>
+            </p:txBody>
+          </p:sp>
+        </mc:Fallback>
+      </mc:AlternateContent>
+      <mc:AlternateContent xmlns:mc="http://schemas.openxmlformats.org/markup-compatibility/2006" xmlns:a14="http://schemas.microsoft.com/office/drawing/2010/main">
+        <mc:Choice Requires="a14">
+          <p:sp>
+            <p:nvSpPr>
+              <p:cNvPr id="24" name="CuadroTexto 23">
+                <a:extLst>
+                  <a:ext uri="{FF2B5EF4-FFF2-40B4-BE49-F238E27FC236}">
+                    <a16:creationId xmlns:a16="http://schemas.microsoft.com/office/drawing/2014/main" id="{CFE74190-D059-9E9D-8220-D1F1CBAF3301}"/>
+                  </a:ext>
+                </a:extLst>
+              </p:cNvPr>
+              <p:cNvSpPr txBox="1"/>
+              <p:nvPr/>
+            </p:nvSpPr>
+            <p:spPr>
+              <a:xfrm>
+                <a:off x="3727669" y="4109295"/>
+                <a:ext cx="1593833" cy="215444"/>
+              </a:xfrm>
+              <a:prstGeom prst="rect">
+                <a:avLst/>
+              </a:prstGeom>
+              <a:noFill/>
+            </p:spPr>
+            <p:txBody>
+              <a:bodyPr wrap="none" lIns="0" tIns="0" rIns="0" bIns="0" rtlCol="0">
+                <a:spAutoFit/>
+              </a:bodyPr>
+              <a:lstStyle/>
+              <a:p>
+                <a:pPr/>
+                <a14:m>
+                  <m:oMathPara xmlns:m="http://schemas.openxmlformats.org/officeDocument/2006/math">
+                    <m:oMathParaPr>
+                      <m:jc m:val="centerGroup"/>
+                    </m:oMathParaPr>
+                    <m:oMath xmlns:m="http://schemas.openxmlformats.org/officeDocument/2006/math">
+                      <m:r>
+                        <a:rPr lang="es-ES" sz="1400" b="0" i="1" smtClean="0">
+                          <a:solidFill>
+                            <a:srgbClr val="FF0000"/>
+                          </a:solidFill>
+                          <a:latin typeface="Cambria Math" panose="02040503050406030204" pitchFamily="18" charset="0"/>
+                        </a:rPr>
+                        <m:t>𝑀𝑎𝑔𝑛𝑒𝑡𝑜𝑟𝑞𝑢𝑒𝑟𝑠</m:t>
+                      </m:r>
+                      <m:r>
+                        <a:rPr lang="es-ES" sz="1400" b="0" i="1" smtClean="0">
+                          <a:solidFill>
+                            <a:srgbClr val="FF0000"/>
+                          </a:solidFill>
+                          <a:latin typeface="Cambria Math" panose="02040503050406030204" pitchFamily="18" charset="0"/>
+                        </a:rPr>
+                        <m:t> (2)</m:t>
+                      </m:r>
+                    </m:oMath>
+                  </m:oMathPara>
+                </a14:m>
+                <a:endParaRPr lang="en-US" sz="1400" dirty="0"/>
+              </a:p>
+            </p:txBody>
+          </p:sp>
+        </mc:Choice>
+        <mc:Fallback xmlns="">
+          <p:sp>
+            <p:nvSpPr>
+              <p:cNvPr id="24" name="CuadroTexto 23">
+                <a:extLst>
+                  <a:ext uri="{FF2B5EF4-FFF2-40B4-BE49-F238E27FC236}">
+                    <a16:creationId xmlns:a16="http://schemas.microsoft.com/office/drawing/2014/main" id="{CFE74190-D059-9E9D-8220-D1F1CBAF3301}"/>
+                  </a:ext>
+                </a:extLst>
+              </p:cNvPr>
+              <p:cNvSpPr txBox="1">
+                <a:spLocks noRot="1" noChangeAspect="1" noMove="1" noResize="1" noEditPoints="1" noAdjustHandles="1" noChangeArrowheads="1" noChangeShapeType="1" noTextEdit="1"/>
+              </p:cNvSpPr>
+              <p:nvPr/>
+            </p:nvSpPr>
+            <p:spPr>
+              <a:xfrm>
+                <a:off x="3727669" y="4109295"/>
+                <a:ext cx="1593833" cy="215444"/>
+              </a:xfrm>
+              <a:prstGeom prst="rect">
+                <a:avLst/>
+              </a:prstGeom>
+              <a:blipFill>
+                <a:blip r:embed="rId8"/>
+                <a:stretch>
+                  <a:fillRect l="-3435" r="-3435" b="-34286"/>
+                </a:stretch>
+              </a:blipFill>
+            </p:spPr>
+            <p:txBody>
+              <a:bodyPr/>
+              <a:lstStyle/>
+              <a:p>
+                <a:r>
+                  <a:rPr lang="en-US">
+                    <a:noFill/>
+                  </a:rPr>
+                  <a:t> </a:t>
+                </a:r>
+              </a:p>
+            </p:txBody>
+          </p:sp>
+        </mc:Fallback>
+      </mc:AlternateContent>
+      <p:cxnSp>
+        <p:nvCxnSpPr>
+          <p:cNvPr id="26" name="Conector: curvado 25">
+            <a:extLst>
+              <a:ext uri="{FF2B5EF4-FFF2-40B4-BE49-F238E27FC236}">
+                <a16:creationId xmlns:a16="http://schemas.microsoft.com/office/drawing/2014/main" id="{29E8B0AE-BB75-5F67-EDFB-FC3EBD42DAB2}"/>
+              </a:ext>
+            </a:extLst>
+          </p:cNvPr>
+          <p:cNvCxnSpPr>
+            <a:cxnSpLocks/>
+            <a:stCxn id="23" idx="2"/>
+            <a:endCxn id="21" idx="1"/>
+          </p:cNvCxnSpPr>
+          <p:nvPr/>
+        </p:nvCxnSpPr>
+        <p:spPr>
+          <a:xfrm rot="16200000" flipH="1">
+            <a:off x="2908429" y="2139285"/>
+            <a:ext cx="714646" cy="621772"/>
+          </a:xfrm>
+          <a:prstGeom prst="curvedConnector2">
+            <a:avLst/>
+          </a:prstGeom>
+          <a:ln w="28575">
+            <a:solidFill>
+              <a:srgbClr val="FF0000"/>
+            </a:solidFill>
+            <a:tailEnd type="triangle"/>
+          </a:ln>
+        </p:spPr>
+        <p:style>
+          <a:lnRef idx="1">
+            <a:schemeClr val="accent1"/>
+          </a:lnRef>
+          <a:fillRef idx="0">
+            <a:schemeClr val="accent1"/>
+          </a:fillRef>
+          <a:effectRef idx="0">
+            <a:schemeClr val="accent1"/>
+          </a:effectRef>
+          <a:fontRef idx="minor">
+            <a:schemeClr val="tx1"/>
+          </a:fontRef>
+        </p:style>
+      </p:cxnSp>
+      <p:cxnSp>
+        <p:nvCxnSpPr>
+          <p:cNvPr id="30" name="Conector: curvado 29">
+            <a:extLst>
+              <a:ext uri="{FF2B5EF4-FFF2-40B4-BE49-F238E27FC236}">
+                <a16:creationId xmlns:a16="http://schemas.microsoft.com/office/drawing/2014/main" id="{CD834C55-4E54-1C30-60C1-C768C653979E}"/>
+              </a:ext>
+            </a:extLst>
+          </p:cNvPr>
+          <p:cNvCxnSpPr>
+            <a:cxnSpLocks/>
+            <a:stCxn id="24" idx="0"/>
+            <a:endCxn id="22" idx="2"/>
+          </p:cNvCxnSpPr>
+          <p:nvPr/>
+        </p:nvCxnSpPr>
+        <p:spPr>
+          <a:xfrm rot="16200000" flipV="1">
+            <a:off x="3843678" y="3428387"/>
+            <a:ext cx="460755" cy="901062"/>
+          </a:xfrm>
+          <a:prstGeom prst="curvedConnector3">
+            <a:avLst>
+              <a:gd name="adj1" fmla="val 50000"/>
+            </a:avLst>
+          </a:prstGeom>
+          <a:ln w="28575">
+            <a:solidFill>
+              <a:srgbClr val="FF0000"/>
+            </a:solidFill>
+            <a:tailEnd type="triangle"/>
+          </a:ln>
+        </p:spPr>
+        <p:style>
+          <a:lnRef idx="1">
+            <a:schemeClr val="accent1"/>
+          </a:lnRef>
+          <a:fillRef idx="0">
+            <a:schemeClr val="accent1"/>
+          </a:fillRef>
+          <a:effectRef idx="0">
+            <a:schemeClr val="accent1"/>
+          </a:effectRef>
+          <a:fontRef idx="minor">
+            <a:schemeClr val="tx1"/>
+          </a:fontRef>
+        </p:style>
+      </p:cxnSp>
+      <mc:AlternateContent xmlns:mc="http://schemas.openxmlformats.org/markup-compatibility/2006" xmlns:a14="http://schemas.microsoft.com/office/drawing/2010/main">
+        <mc:Choice Requires="a14">
+          <p:sp>
+            <p:nvSpPr>
+              <p:cNvPr id="1028" name="CuadroTexto 1027">
+                <a:extLst>
+                  <a:ext uri="{FF2B5EF4-FFF2-40B4-BE49-F238E27FC236}">
+                    <a16:creationId xmlns:a16="http://schemas.microsoft.com/office/drawing/2014/main" id="{B91310CE-6326-C735-369B-61614A1AAF1E}"/>
+                  </a:ext>
+                </a:extLst>
+              </p:cNvPr>
+              <p:cNvSpPr txBox="1"/>
+              <p:nvPr/>
+            </p:nvSpPr>
+            <p:spPr>
+              <a:xfrm>
+                <a:off x="6441859" y="741080"/>
+                <a:ext cx="2074862" cy="241605"/>
+              </a:xfrm>
+              <a:prstGeom prst="rect">
+                <a:avLst/>
+              </a:prstGeom>
+              <a:noFill/>
+            </p:spPr>
+            <p:txBody>
+              <a:bodyPr wrap="none" lIns="0" tIns="0" rIns="0" bIns="0" rtlCol="0">
+                <a:spAutoFit/>
+              </a:bodyPr>
+              <a:lstStyle/>
+              <a:p>
+                <a:pPr/>
+                <a14:m>
+                  <m:oMathPara xmlns:m="http://schemas.openxmlformats.org/officeDocument/2006/math">
+                    <m:oMathParaPr>
+                      <m:jc m:val="centerGroup"/>
+                    </m:oMathParaPr>
+                    <m:oMath xmlns:m="http://schemas.openxmlformats.org/officeDocument/2006/math">
+                      <m:sSup>
+                        <m:sSupPr>
+                          <m:ctrlPr>
+                            <a:rPr lang="es-ES" sz="1400" b="0" i="1" smtClean="0">
+                              <a:latin typeface="Cambria Math" panose="02040503050406030204" pitchFamily="18" charset="0"/>
+                            </a:rPr>
+                          </m:ctrlPr>
+                        </m:sSupPr>
+                        <m:e>
+                          <m:acc>
+                            <m:accPr>
+                              <m:chr m:val="⃗"/>
+                              <m:ctrlPr>
+                                <a:rPr lang="es-ES" sz="1400" b="0" i="1" smtClean="0">
+                                  <a:latin typeface="Cambria Math" panose="02040503050406030204" pitchFamily="18" charset="0"/>
+                                </a:rPr>
+                              </m:ctrlPr>
+                            </m:accPr>
+                            <m:e>
+                              <m:r>
+                                <a:rPr lang="es-ES" sz="1400" b="0" i="1" smtClean="0">
+                                  <a:latin typeface="Cambria Math" panose="02040503050406030204" pitchFamily="18" charset="0"/>
+                                </a:rPr>
+                                <m:t>𝐵</m:t>
+                              </m:r>
+                              <m:r>
+                                <a:rPr lang="es-ES" sz="1400" b="0" i="1" smtClean="0">
+                                  <a:latin typeface="Cambria Math" panose="02040503050406030204" pitchFamily="18" charset="0"/>
+                                </a:rPr>
+                                <m:t> </m:t>
+                              </m:r>
+                            </m:e>
+                          </m:acc>
+                          <m:r>
+                            <a:rPr lang="es-ES" sz="1400" b="0" i="1" smtClean="0">
+                              <a:latin typeface="Cambria Math" panose="02040503050406030204" pitchFamily="18" charset="0"/>
+                            </a:rPr>
+                            <m:t>:</m:t>
+                          </m:r>
+                          <m:r>
+                            <a:rPr lang="es-ES" sz="1400" b="0" i="1" smtClean="0">
+                              <a:latin typeface="Cambria Math" panose="02040503050406030204" pitchFamily="18" charset="0"/>
+                            </a:rPr>
+                            <m:t>𝐶𝑎𝑚𝑝𝑜</m:t>
+                          </m:r>
+                          <m:r>
+                            <a:rPr lang="es-ES" sz="1400" b="0" i="1" smtClean="0">
+                              <a:latin typeface="Cambria Math" panose="02040503050406030204" pitchFamily="18" charset="0"/>
+                            </a:rPr>
+                            <m:t> </m:t>
+                          </m:r>
+                          <m:r>
+                            <a:rPr lang="es-ES" sz="1400" b="0" i="1" smtClean="0">
+                              <a:latin typeface="Cambria Math" panose="02040503050406030204" pitchFamily="18" charset="0"/>
+                            </a:rPr>
+                            <m:t>𝑔𝑒𝑜𝑚𝑎𝑔𝑛</m:t>
+                          </m:r>
+                          <m:r>
+                            <a:rPr lang="es-ES" sz="1400" b="0" i="1" smtClean="0">
+                              <a:latin typeface="Cambria Math" panose="02040503050406030204" pitchFamily="18" charset="0"/>
+                            </a:rPr>
+                            <m:t>é</m:t>
+                          </m:r>
+                          <m:r>
+                            <a:rPr lang="es-ES" sz="1400" b="0" i="1" smtClean="0">
+                              <a:latin typeface="Cambria Math" panose="02040503050406030204" pitchFamily="18" charset="0"/>
+                            </a:rPr>
+                            <m:t>𝑡𝑖𝑐𝑜</m:t>
+                          </m:r>
+                        </m:e>
+                        <m:sup>
+                          <m:r>
+                            <a:rPr lang="es-ES" sz="1400" b="0" i="1" smtClean="0">
+                              <a:latin typeface="Cambria Math" panose="02040503050406030204" pitchFamily="18" charset="0"/>
+                            </a:rPr>
+                            <m:t> </m:t>
+                          </m:r>
+                        </m:sup>
+                      </m:sSup>
+                    </m:oMath>
+                  </m:oMathPara>
+                </a14:m>
+                <a:endParaRPr lang="en-US" sz="1400" dirty="0"/>
+              </a:p>
+            </p:txBody>
+          </p:sp>
+        </mc:Choice>
+        <mc:Fallback xmlns="">
           <p:sp>
             <p:nvSpPr>
               <p:cNvPr id="1028" name="CuadroTexto 1027">

</xml_diff>

<commit_message>
update corrección tabla de contenidos
</commit_message>
<xml_diff>
--- a/Escritura_Plantilla Modificada/imagenes/planteamiento_del_problema/Presentación1.pptx
+++ b/Escritura_Plantilla Modificada/imagenes/planteamiento_del_problema/Presentación1.pptx
@@ -269,7 +269,7 @@
           <a:p>
             <a:fld id="{07BB1A35-2394-4C34-9134-7D1FC92D3E74}" type="datetimeFigureOut">
               <a:rPr lang="en-US" smtClean="0"/>
-              <a:t>10/19/2023</a:t>
+              <a:t>10/25/2023</a:t>
             </a:fld>
             <a:endParaRPr lang="en-US"/>
           </a:p>
@@ -469,7 +469,7 @@
           <a:p>
             <a:fld id="{07BB1A35-2394-4C34-9134-7D1FC92D3E74}" type="datetimeFigureOut">
               <a:rPr lang="en-US" smtClean="0"/>
-              <a:t>10/19/2023</a:t>
+              <a:t>10/25/2023</a:t>
             </a:fld>
             <a:endParaRPr lang="en-US"/>
           </a:p>
@@ -679,7 +679,7 @@
           <a:p>
             <a:fld id="{07BB1A35-2394-4C34-9134-7D1FC92D3E74}" type="datetimeFigureOut">
               <a:rPr lang="en-US" smtClean="0"/>
-              <a:t>10/19/2023</a:t>
+              <a:t>10/25/2023</a:t>
             </a:fld>
             <a:endParaRPr lang="en-US"/>
           </a:p>
@@ -879,7 +879,7 @@
           <a:p>
             <a:fld id="{07BB1A35-2394-4C34-9134-7D1FC92D3E74}" type="datetimeFigureOut">
               <a:rPr lang="en-US" smtClean="0"/>
-              <a:t>10/19/2023</a:t>
+              <a:t>10/25/2023</a:t>
             </a:fld>
             <a:endParaRPr lang="en-US"/>
           </a:p>
@@ -1155,7 +1155,7 @@
           <a:p>
             <a:fld id="{07BB1A35-2394-4C34-9134-7D1FC92D3E74}" type="datetimeFigureOut">
               <a:rPr lang="en-US" smtClean="0"/>
-              <a:t>10/19/2023</a:t>
+              <a:t>10/25/2023</a:t>
             </a:fld>
             <a:endParaRPr lang="en-US"/>
           </a:p>
@@ -1423,7 +1423,7 @@
           <a:p>
             <a:fld id="{07BB1A35-2394-4C34-9134-7D1FC92D3E74}" type="datetimeFigureOut">
               <a:rPr lang="en-US" smtClean="0"/>
-              <a:t>10/19/2023</a:t>
+              <a:t>10/25/2023</a:t>
             </a:fld>
             <a:endParaRPr lang="en-US"/>
           </a:p>
@@ -1838,7 +1838,7 @@
           <a:p>
             <a:fld id="{07BB1A35-2394-4C34-9134-7D1FC92D3E74}" type="datetimeFigureOut">
               <a:rPr lang="en-US" smtClean="0"/>
-              <a:t>10/19/2023</a:t>
+              <a:t>10/25/2023</a:t>
             </a:fld>
             <a:endParaRPr lang="en-US"/>
           </a:p>
@@ -1980,7 +1980,7 @@
           <a:p>
             <a:fld id="{07BB1A35-2394-4C34-9134-7D1FC92D3E74}" type="datetimeFigureOut">
               <a:rPr lang="en-US" smtClean="0"/>
-              <a:t>10/19/2023</a:t>
+              <a:t>10/25/2023</a:t>
             </a:fld>
             <a:endParaRPr lang="en-US"/>
           </a:p>
@@ -2093,7 +2093,7 @@
           <a:p>
             <a:fld id="{07BB1A35-2394-4C34-9134-7D1FC92D3E74}" type="datetimeFigureOut">
               <a:rPr lang="en-US" smtClean="0"/>
-              <a:t>10/19/2023</a:t>
+              <a:t>10/25/2023</a:t>
             </a:fld>
             <a:endParaRPr lang="en-US"/>
           </a:p>
@@ -2406,7 +2406,7 @@
           <a:p>
             <a:fld id="{07BB1A35-2394-4C34-9134-7D1FC92D3E74}" type="datetimeFigureOut">
               <a:rPr lang="en-US" smtClean="0"/>
-              <a:t>10/19/2023</a:t>
+              <a:t>10/25/2023</a:t>
             </a:fld>
             <a:endParaRPr lang="en-US"/>
           </a:p>
@@ -2695,7 +2695,7 @@
           <a:p>
             <a:fld id="{07BB1A35-2394-4C34-9134-7D1FC92D3E74}" type="datetimeFigureOut">
               <a:rPr lang="en-US" smtClean="0"/>
-              <a:t>10/19/2023</a:t>
+              <a:t>10/25/2023</a:t>
             </a:fld>
             <a:endParaRPr lang="en-US"/>
           </a:p>
@@ -2938,7 +2938,7 @@
           <a:p>
             <a:fld id="{07BB1A35-2394-4C34-9134-7D1FC92D3E74}" type="datetimeFigureOut">
               <a:rPr lang="en-US" smtClean="0"/>
-              <a:t>10/19/2023</a:t>
+              <a:t>10/25/2023</a:t>
             </a:fld>
             <a:endParaRPr lang="en-US"/>
           </a:p>

</xml_diff>